<commit_message>
Worked on presentation in class
</commit_message>
<xml_diff>
--- a/Presentations/Final_Presentation.pptx
+++ b/Presentations/Final_Presentation.pptx
@@ -4,10 +4,25 @@
   <p:sldMasterIdLst>
     <p:sldMasterId id="2147483697" r:id="rId1"/>
   </p:sldMasterIdLst>
+  <p:notesMasterIdLst>
+    <p:notesMasterId r:id="rId17"/>
+  </p:notesMasterIdLst>
   <p:sldIdLst>
     <p:sldId id="268" r:id="rId2"/>
-    <p:sldId id="269" r:id="rId3"/>
-    <p:sldId id="270" r:id="rId4"/>
+    <p:sldId id="273" r:id="rId3"/>
+    <p:sldId id="269" r:id="rId4"/>
+    <p:sldId id="271" r:id="rId5"/>
+    <p:sldId id="272" r:id="rId6"/>
+    <p:sldId id="270" r:id="rId7"/>
+    <p:sldId id="274" r:id="rId8"/>
+    <p:sldId id="275" r:id="rId9"/>
+    <p:sldId id="276" r:id="rId10"/>
+    <p:sldId id="277" r:id="rId11"/>
+    <p:sldId id="278" r:id="rId12"/>
+    <p:sldId id="279" r:id="rId13"/>
+    <p:sldId id="280" r:id="rId14"/>
+    <p:sldId id="281" r:id="rId15"/>
+    <p:sldId id="282" r:id="rId16"/>
   </p:sldIdLst>
   <p:sldSz cx="9144000" cy="6858000" type="screen4x3"/>
   <p:notesSz cx="6858000" cy="9144000"/>
@@ -109,6 +124,452 @@
 </p:presentation>
 </file>
 
+<file path=ppt/notesMasters/notesMaster1.xml><?xml version="1.0" encoding="utf-8"?>
+<p:notesMaster xmlns:a="http://schemas.openxmlformats.org/drawingml/2006/main" xmlns:r="http://schemas.openxmlformats.org/officeDocument/2006/relationships" xmlns:p="http://schemas.openxmlformats.org/presentationml/2006/main">
+  <p:cSld>
+    <p:bg>
+      <p:bgRef idx="1001">
+        <a:schemeClr val="bg1"/>
+      </p:bgRef>
+    </p:bg>
+    <p:spTree>
+      <p:nvGrpSpPr>
+        <p:cNvPr id="1" name=""/>
+        <p:cNvGrpSpPr/>
+        <p:nvPr/>
+      </p:nvGrpSpPr>
+      <p:grpSpPr>
+        <a:xfrm>
+          <a:off x="0" y="0"/>
+          <a:ext cx="0" cy="0"/>
+          <a:chOff x="0" y="0"/>
+          <a:chExt cx="0" cy="0"/>
+        </a:xfrm>
+      </p:grpSpPr>
+      <p:sp>
+        <p:nvSpPr>
+          <p:cNvPr id="2" name="Header Placeholder 1"/>
+          <p:cNvSpPr>
+            <a:spLocks noGrp="1"/>
+          </p:cNvSpPr>
+          <p:nvPr>
+            <p:ph type="hdr" sz="quarter"/>
+          </p:nvPr>
+        </p:nvSpPr>
+        <p:spPr>
+          <a:xfrm>
+            <a:off x="0" y="0"/>
+            <a:ext cx="2971800" cy="457200"/>
+          </a:xfrm>
+          <a:prstGeom prst="rect">
+            <a:avLst/>
+          </a:prstGeom>
+        </p:spPr>
+        <p:txBody>
+          <a:bodyPr vert="horz" lIns="91440" tIns="45720" rIns="91440" bIns="45720" rtlCol="0"/>
+          <a:lstStyle>
+            <a:lvl1pPr algn="l">
+              <a:defRPr sz="1200"/>
+            </a:lvl1pPr>
+          </a:lstStyle>
+          <a:p>
+            <a:endParaRPr lang="en-US"/>
+          </a:p>
+        </p:txBody>
+      </p:sp>
+      <p:sp>
+        <p:nvSpPr>
+          <p:cNvPr id="3" name="Date Placeholder 2"/>
+          <p:cNvSpPr>
+            <a:spLocks noGrp="1"/>
+          </p:cNvSpPr>
+          <p:nvPr>
+            <p:ph type="dt" idx="1"/>
+          </p:nvPr>
+        </p:nvSpPr>
+        <p:spPr>
+          <a:xfrm>
+            <a:off x="3884613" y="0"/>
+            <a:ext cx="2971800" cy="457200"/>
+          </a:xfrm>
+          <a:prstGeom prst="rect">
+            <a:avLst/>
+          </a:prstGeom>
+        </p:spPr>
+        <p:txBody>
+          <a:bodyPr vert="horz" lIns="91440" tIns="45720" rIns="91440" bIns="45720" rtlCol="0"/>
+          <a:lstStyle>
+            <a:lvl1pPr algn="r">
+              <a:defRPr sz="1200"/>
+            </a:lvl1pPr>
+          </a:lstStyle>
+          <a:p>
+            <a:fld id="{CA7A4295-0889-E143-9C34-2B5B57D77ABA}" type="datetimeFigureOut">
+              <a:rPr lang="en-US" smtClean="0"/>
+              <a:t>5/27/16</a:t>
+            </a:fld>
+            <a:endParaRPr lang="en-US"/>
+          </a:p>
+        </p:txBody>
+      </p:sp>
+      <p:sp>
+        <p:nvSpPr>
+          <p:cNvPr id="4" name="Slide Image Placeholder 3"/>
+          <p:cNvSpPr>
+            <a:spLocks noGrp="1" noRot="1" noChangeAspect="1"/>
+          </p:cNvSpPr>
+          <p:nvPr>
+            <p:ph type="sldImg" idx="2"/>
+          </p:nvPr>
+        </p:nvSpPr>
+        <p:spPr>
+          <a:xfrm>
+            <a:off x="1143000" y="685800"/>
+            <a:ext cx="4572000" cy="3429000"/>
+          </a:xfrm>
+          <a:prstGeom prst="rect">
+            <a:avLst/>
+          </a:prstGeom>
+          <a:noFill/>
+          <a:ln w="12700">
+            <a:solidFill>
+              <a:prstClr val="black"/>
+            </a:solidFill>
+          </a:ln>
+        </p:spPr>
+        <p:txBody>
+          <a:bodyPr vert="horz" lIns="91440" tIns="45720" rIns="91440" bIns="45720" rtlCol="0" anchor="ctr"/>
+          <a:lstStyle/>
+          <a:p>
+            <a:endParaRPr lang="en-US"/>
+          </a:p>
+        </p:txBody>
+      </p:sp>
+      <p:sp>
+        <p:nvSpPr>
+          <p:cNvPr id="5" name="Notes Placeholder 4"/>
+          <p:cNvSpPr>
+            <a:spLocks noGrp="1"/>
+          </p:cNvSpPr>
+          <p:nvPr>
+            <p:ph type="body" sz="quarter" idx="3"/>
+          </p:nvPr>
+        </p:nvSpPr>
+        <p:spPr>
+          <a:xfrm>
+            <a:off x="685800" y="4343400"/>
+            <a:ext cx="5486400" cy="4114800"/>
+          </a:xfrm>
+          <a:prstGeom prst="rect">
+            <a:avLst/>
+          </a:prstGeom>
+        </p:spPr>
+        <p:txBody>
+          <a:bodyPr vert="horz" lIns="91440" tIns="45720" rIns="91440" bIns="45720" rtlCol="0"/>
+          <a:lstStyle/>
+          <a:p>
+            <a:pPr lvl="0"/>
+            <a:r>
+              <a:rPr lang="en-US" smtClean="0"/>
+              <a:t>Click to edit Master text styles</a:t>
+            </a:r>
+          </a:p>
+          <a:p>
+            <a:pPr lvl="1"/>
+            <a:r>
+              <a:rPr lang="en-US" smtClean="0"/>
+              <a:t>Second level</a:t>
+            </a:r>
+          </a:p>
+          <a:p>
+            <a:pPr lvl="2"/>
+            <a:r>
+              <a:rPr lang="en-US" smtClean="0"/>
+              <a:t>Third level</a:t>
+            </a:r>
+          </a:p>
+          <a:p>
+            <a:pPr lvl="3"/>
+            <a:r>
+              <a:rPr lang="en-US" smtClean="0"/>
+              <a:t>Fourth level</a:t>
+            </a:r>
+          </a:p>
+          <a:p>
+            <a:pPr lvl="4"/>
+            <a:r>
+              <a:rPr lang="en-US" smtClean="0"/>
+              <a:t>Fifth level</a:t>
+            </a:r>
+            <a:endParaRPr lang="en-US"/>
+          </a:p>
+        </p:txBody>
+      </p:sp>
+      <p:sp>
+        <p:nvSpPr>
+          <p:cNvPr id="6" name="Footer Placeholder 5"/>
+          <p:cNvSpPr>
+            <a:spLocks noGrp="1"/>
+          </p:cNvSpPr>
+          <p:nvPr>
+            <p:ph type="ftr" sz="quarter" idx="4"/>
+          </p:nvPr>
+        </p:nvSpPr>
+        <p:spPr>
+          <a:xfrm>
+            <a:off x="0" y="8685213"/>
+            <a:ext cx="2971800" cy="457200"/>
+          </a:xfrm>
+          <a:prstGeom prst="rect">
+            <a:avLst/>
+          </a:prstGeom>
+        </p:spPr>
+        <p:txBody>
+          <a:bodyPr vert="horz" lIns="91440" tIns="45720" rIns="91440" bIns="45720" rtlCol="0" anchor="b"/>
+          <a:lstStyle>
+            <a:lvl1pPr algn="l">
+              <a:defRPr sz="1200"/>
+            </a:lvl1pPr>
+          </a:lstStyle>
+          <a:p>
+            <a:endParaRPr lang="en-US"/>
+          </a:p>
+        </p:txBody>
+      </p:sp>
+      <p:sp>
+        <p:nvSpPr>
+          <p:cNvPr id="7" name="Slide Number Placeholder 6"/>
+          <p:cNvSpPr>
+            <a:spLocks noGrp="1"/>
+          </p:cNvSpPr>
+          <p:nvPr>
+            <p:ph type="sldNum" sz="quarter" idx="5"/>
+          </p:nvPr>
+        </p:nvSpPr>
+        <p:spPr>
+          <a:xfrm>
+            <a:off x="3884613" y="8685213"/>
+            <a:ext cx="2971800" cy="457200"/>
+          </a:xfrm>
+          <a:prstGeom prst="rect">
+            <a:avLst/>
+          </a:prstGeom>
+        </p:spPr>
+        <p:txBody>
+          <a:bodyPr vert="horz" lIns="91440" tIns="45720" rIns="91440" bIns="45720" rtlCol="0" anchor="b"/>
+          <a:lstStyle>
+            <a:lvl1pPr algn="r">
+              <a:defRPr sz="1200"/>
+            </a:lvl1pPr>
+          </a:lstStyle>
+          <a:p>
+            <a:fld id="{8C82A14D-CD87-3040-B8A6-05D9C670C6BA}" type="slidenum">
+              <a:rPr lang="en-US" smtClean="0"/>
+              <a:t>‹#›</a:t>
+            </a:fld>
+            <a:endParaRPr lang="en-US"/>
+          </a:p>
+        </p:txBody>
+      </p:sp>
+    </p:spTree>
+    <p:extLst>
+      <p:ext uri="{BB962C8B-B14F-4D97-AF65-F5344CB8AC3E}">
+        <p14:creationId xmlns:p14="http://schemas.microsoft.com/office/powerpoint/2010/main" val="1548435978"/>
+      </p:ext>
+    </p:extLst>
+  </p:cSld>
+  <p:clrMap bg1="lt1" tx1="dk1" bg2="lt2" tx2="dk2" accent1="accent1" accent2="accent2" accent3="accent3" accent4="accent4" accent5="accent5" accent6="accent6" hlink="hlink" folHlink="folHlink"/>
+  <p:notesStyle>
+    <a:lvl1pPr marL="0" algn="l" defTabSz="457200" rtl="0" eaLnBrk="1" latinLnBrk="0" hangingPunct="1">
+      <a:defRPr sz="1200" kern="1200">
+        <a:solidFill>
+          <a:schemeClr val="tx1"/>
+        </a:solidFill>
+        <a:latin typeface="+mn-lt"/>
+        <a:ea typeface="+mn-ea"/>
+        <a:cs typeface="+mn-cs"/>
+      </a:defRPr>
+    </a:lvl1pPr>
+    <a:lvl2pPr marL="457200" algn="l" defTabSz="457200" rtl="0" eaLnBrk="1" latinLnBrk="0" hangingPunct="1">
+      <a:defRPr sz="1200" kern="1200">
+        <a:solidFill>
+          <a:schemeClr val="tx1"/>
+        </a:solidFill>
+        <a:latin typeface="+mn-lt"/>
+        <a:ea typeface="+mn-ea"/>
+        <a:cs typeface="+mn-cs"/>
+      </a:defRPr>
+    </a:lvl2pPr>
+    <a:lvl3pPr marL="914400" algn="l" defTabSz="457200" rtl="0" eaLnBrk="1" latinLnBrk="0" hangingPunct="1">
+      <a:defRPr sz="1200" kern="1200">
+        <a:solidFill>
+          <a:schemeClr val="tx1"/>
+        </a:solidFill>
+        <a:latin typeface="+mn-lt"/>
+        <a:ea typeface="+mn-ea"/>
+        <a:cs typeface="+mn-cs"/>
+      </a:defRPr>
+    </a:lvl3pPr>
+    <a:lvl4pPr marL="1371600" algn="l" defTabSz="457200" rtl="0" eaLnBrk="1" latinLnBrk="0" hangingPunct="1">
+      <a:defRPr sz="1200" kern="1200">
+        <a:solidFill>
+          <a:schemeClr val="tx1"/>
+        </a:solidFill>
+        <a:latin typeface="+mn-lt"/>
+        <a:ea typeface="+mn-ea"/>
+        <a:cs typeface="+mn-cs"/>
+      </a:defRPr>
+    </a:lvl4pPr>
+    <a:lvl5pPr marL="1828800" algn="l" defTabSz="457200" rtl="0" eaLnBrk="1" latinLnBrk="0" hangingPunct="1">
+      <a:defRPr sz="1200" kern="1200">
+        <a:solidFill>
+          <a:schemeClr val="tx1"/>
+        </a:solidFill>
+        <a:latin typeface="+mn-lt"/>
+        <a:ea typeface="+mn-ea"/>
+        <a:cs typeface="+mn-cs"/>
+      </a:defRPr>
+    </a:lvl5pPr>
+    <a:lvl6pPr marL="2286000" algn="l" defTabSz="457200" rtl="0" eaLnBrk="1" latinLnBrk="0" hangingPunct="1">
+      <a:defRPr sz="1200" kern="1200">
+        <a:solidFill>
+          <a:schemeClr val="tx1"/>
+        </a:solidFill>
+        <a:latin typeface="+mn-lt"/>
+        <a:ea typeface="+mn-ea"/>
+        <a:cs typeface="+mn-cs"/>
+      </a:defRPr>
+    </a:lvl6pPr>
+    <a:lvl7pPr marL="2743200" algn="l" defTabSz="457200" rtl="0" eaLnBrk="1" latinLnBrk="0" hangingPunct="1">
+      <a:defRPr sz="1200" kern="1200">
+        <a:solidFill>
+          <a:schemeClr val="tx1"/>
+        </a:solidFill>
+        <a:latin typeface="+mn-lt"/>
+        <a:ea typeface="+mn-ea"/>
+        <a:cs typeface="+mn-cs"/>
+      </a:defRPr>
+    </a:lvl7pPr>
+    <a:lvl8pPr marL="3200400" algn="l" defTabSz="457200" rtl="0" eaLnBrk="1" latinLnBrk="0" hangingPunct="1">
+      <a:defRPr sz="1200" kern="1200">
+        <a:solidFill>
+          <a:schemeClr val="tx1"/>
+        </a:solidFill>
+        <a:latin typeface="+mn-lt"/>
+        <a:ea typeface="+mn-ea"/>
+        <a:cs typeface="+mn-cs"/>
+      </a:defRPr>
+    </a:lvl8pPr>
+    <a:lvl9pPr marL="3657600" algn="l" defTabSz="457200" rtl="0" eaLnBrk="1" latinLnBrk="0" hangingPunct="1">
+      <a:defRPr sz="1200" kern="1200">
+        <a:solidFill>
+          <a:schemeClr val="tx1"/>
+        </a:solidFill>
+        <a:latin typeface="+mn-lt"/>
+        <a:ea typeface="+mn-ea"/>
+        <a:cs typeface="+mn-cs"/>
+      </a:defRPr>
+    </a:lvl9pPr>
+  </p:notesStyle>
+</p:notesMaster>
+</file>
+
+<file path=ppt/notesSlides/notesSlide1.xml><?xml version="1.0" encoding="utf-8"?>
+<p:notes xmlns:a="http://schemas.openxmlformats.org/drawingml/2006/main" xmlns:r="http://schemas.openxmlformats.org/officeDocument/2006/relationships" xmlns:p="http://schemas.openxmlformats.org/presentationml/2006/main">
+  <p:cSld>
+    <p:spTree>
+      <p:nvGrpSpPr>
+        <p:cNvPr id="1" name=""/>
+        <p:cNvGrpSpPr/>
+        <p:nvPr/>
+      </p:nvGrpSpPr>
+      <p:grpSpPr>
+        <a:xfrm>
+          <a:off x="0" y="0"/>
+          <a:ext cx="0" cy="0"/>
+          <a:chOff x="0" y="0"/>
+          <a:chExt cx="0" cy="0"/>
+        </a:xfrm>
+      </p:grpSpPr>
+      <p:sp>
+        <p:nvSpPr>
+          <p:cNvPr id="2" name="Slide Image Placeholder 1"/>
+          <p:cNvSpPr>
+            <a:spLocks noGrp="1" noRot="1" noChangeAspect="1"/>
+          </p:cNvSpPr>
+          <p:nvPr>
+            <p:ph type="sldImg"/>
+          </p:nvPr>
+        </p:nvSpPr>
+        <p:spPr/>
+      </p:sp>
+      <p:sp>
+        <p:nvSpPr>
+          <p:cNvPr id="3" name="Notes Placeholder 2"/>
+          <p:cNvSpPr>
+            <a:spLocks noGrp="1"/>
+          </p:cNvSpPr>
+          <p:nvPr>
+            <p:ph type="body" idx="1"/>
+          </p:nvPr>
+        </p:nvSpPr>
+        <p:spPr/>
+        <p:txBody>
+          <a:bodyPr/>
+          <a:lstStyle/>
+          <a:p>
+            <a:r>
+              <a:rPr lang="en-US" dirty="0" smtClean="0"/>
+              <a:t>http://</a:t>
+            </a:r>
+            <a:r>
+              <a:rPr lang="en-US" dirty="0" err="1" smtClean="0"/>
+              <a:t>www.hypothesisjournal.com</a:t>
+            </a:r>
+            <a:r>
+              <a:rPr lang="en-US" dirty="0" smtClean="0"/>
+              <a:t>/?p=571</a:t>
+            </a:r>
+            <a:endParaRPr lang="en-US" dirty="0"/>
+          </a:p>
+        </p:txBody>
+      </p:sp>
+      <p:sp>
+        <p:nvSpPr>
+          <p:cNvPr id="4" name="Slide Number Placeholder 3"/>
+          <p:cNvSpPr>
+            <a:spLocks noGrp="1"/>
+          </p:cNvSpPr>
+          <p:nvPr>
+            <p:ph type="sldNum" sz="quarter" idx="10"/>
+          </p:nvPr>
+        </p:nvSpPr>
+        <p:spPr/>
+        <p:txBody>
+          <a:bodyPr/>
+          <a:lstStyle/>
+          <a:p>
+            <a:fld id="{8C82A14D-CD87-3040-B8A6-05D9C670C6BA}" type="slidenum">
+              <a:rPr lang="en-US" smtClean="0"/>
+              <a:t>3</a:t>
+            </a:fld>
+            <a:endParaRPr lang="en-US"/>
+          </a:p>
+        </p:txBody>
+      </p:sp>
+    </p:spTree>
+    <p:extLst>
+      <p:ext uri="{BB962C8B-B14F-4D97-AF65-F5344CB8AC3E}">
+        <p14:creationId xmlns:p14="http://schemas.microsoft.com/office/powerpoint/2010/main" val="974433049"/>
+      </p:ext>
+    </p:extLst>
+  </p:cSld>
+  <p:clrMapOvr>
+    <a:masterClrMapping/>
+  </p:clrMapOvr>
+</p:notes>
+</file>
+
 <file path=ppt/slideLayouts/slideLayout1.xml><?xml version="1.0" encoding="utf-8"?>
 <p:sldLayout xmlns:a="http://schemas.openxmlformats.org/drawingml/2006/main" xmlns:r="http://schemas.openxmlformats.org/officeDocument/2006/relationships" xmlns:p="http://schemas.openxmlformats.org/presentationml/2006/main" showMasterSp="0" type="title" preserve="1">
   <p:cSld name="Title Slide">
@@ -389,7 +850,7 @@
           <a:p>
             <a:fld id="{8A47C9AD-984C-4B40-A216-5587B3FD1516}" type="datetimeFigureOut">
               <a:rPr lang="en-US" smtClean="0"/>
-              <a:t>5/26/16</a:t>
+              <a:t>5/27/16</a:t>
             </a:fld>
             <a:endParaRPr lang="en-US"/>
           </a:p>
@@ -782,7 +1243,7 @@
           <a:p>
             <a:fld id="{8A47C9AD-984C-4B40-A216-5587B3FD1516}" type="datetimeFigureOut">
               <a:rPr lang="en-US" smtClean="0"/>
-              <a:t>5/26/16</a:t>
+              <a:t>5/27/16</a:t>
             </a:fld>
             <a:endParaRPr lang="en-US"/>
           </a:p>
@@ -1314,7 +1775,7 @@
           <a:p>
             <a:fld id="{8A47C9AD-984C-4B40-A216-5587B3FD1516}" type="datetimeFigureOut">
               <a:rPr lang="en-US" smtClean="0"/>
-              <a:t>5/26/16</a:t>
+              <a:t>5/27/16</a:t>
             </a:fld>
             <a:endParaRPr lang="en-US"/>
           </a:p>
@@ -1447,7 +1908,7 @@
           <a:p>
             <a:fld id="{8A47C9AD-984C-4B40-A216-5587B3FD1516}" type="datetimeFigureOut">
               <a:rPr lang="en-US" smtClean="0"/>
-              <a:t>5/26/16</a:t>
+              <a:t>5/27/16</a:t>
             </a:fld>
             <a:endParaRPr lang="en-US"/>
           </a:p>
@@ -1990,7 +2451,7 @@
           <a:p>
             <a:fld id="{8A47C9AD-984C-4B40-A216-5587B3FD1516}" type="datetimeFigureOut">
               <a:rPr lang="en-US" smtClean="0"/>
-              <a:t>5/26/16</a:t>
+              <a:t>5/27/16</a:t>
             </a:fld>
             <a:endParaRPr lang="en-US"/>
           </a:p>
@@ -2285,7 +2746,7 @@
           <a:p>
             <a:fld id="{8A47C9AD-984C-4B40-A216-5587B3FD1516}" type="datetimeFigureOut">
               <a:rPr lang="en-US" smtClean="0"/>
-              <a:t>5/26/16</a:t>
+              <a:t>5/27/16</a:t>
             </a:fld>
             <a:endParaRPr lang="en-US"/>
           </a:p>
@@ -2944,7 +3405,7 @@
           <a:p>
             <a:fld id="{8A47C9AD-984C-4B40-A216-5587B3FD1516}" type="datetimeFigureOut">
               <a:rPr lang="en-US" smtClean="0"/>
-              <a:t>5/26/16</a:t>
+              <a:t>5/27/16</a:t>
             </a:fld>
             <a:endParaRPr lang="en-US"/>
           </a:p>
@@ -3380,7 +3841,7 @@
           <a:p>
             <a:fld id="{8A47C9AD-984C-4B40-A216-5587B3FD1516}" type="datetimeFigureOut">
               <a:rPr lang="en-US" smtClean="0"/>
-              <a:t>5/26/16</a:t>
+              <a:t>5/27/16</a:t>
             </a:fld>
             <a:endParaRPr lang="en-US"/>
           </a:p>
@@ -3693,7 +4154,7 @@
           <a:p>
             <a:fld id="{8A47C9AD-984C-4B40-A216-5587B3FD1516}" type="datetimeFigureOut">
               <a:rPr lang="en-US" smtClean="0"/>
-              <a:t>5/26/16</a:t>
+              <a:t>5/27/16</a:t>
             </a:fld>
             <a:endParaRPr lang="en-US"/>
           </a:p>
@@ -4425,7 +4886,7 @@
           <a:p>
             <a:fld id="{8A47C9AD-984C-4B40-A216-5587B3FD1516}" type="datetimeFigureOut">
               <a:rPr lang="en-US" smtClean="0"/>
-              <a:t>5/26/16</a:t>
+              <a:t>5/27/16</a:t>
             </a:fld>
             <a:endParaRPr lang="en-US"/>
           </a:p>
@@ -5089,7 +5550,7 @@
           <a:p>
             <a:fld id="{8A47C9AD-984C-4B40-A216-5587B3FD1516}" type="datetimeFigureOut">
               <a:rPr lang="en-US" smtClean="0"/>
-              <a:t>5/26/16</a:t>
+              <a:t>5/27/16</a:t>
             </a:fld>
             <a:endParaRPr lang="en-US"/>
           </a:p>
@@ -5362,7 +5823,7 @@
           <a:p>
             <a:fld id="{8A47C9AD-984C-4B40-A216-5587B3FD1516}" type="datetimeFigureOut">
               <a:rPr lang="en-US" smtClean="0"/>
-              <a:t>5/26/16</a:t>
+              <a:t>5/27/16</a:t>
             </a:fld>
             <a:endParaRPr lang="en-US"/>
           </a:p>
@@ -6182,6 +6643,846 @@
 </p:sld>
 </file>
 
+<file path=ppt/slides/slide10.xml><?xml version="1.0" encoding="utf-8"?>
+<p:sld xmlns:a="http://schemas.openxmlformats.org/drawingml/2006/main" xmlns:r="http://schemas.openxmlformats.org/officeDocument/2006/relationships" xmlns:p="http://schemas.openxmlformats.org/presentationml/2006/main">
+  <p:cSld>
+    <p:spTree>
+      <p:nvGrpSpPr>
+        <p:cNvPr id="1" name=""/>
+        <p:cNvGrpSpPr/>
+        <p:nvPr/>
+      </p:nvGrpSpPr>
+      <p:grpSpPr>
+        <a:xfrm>
+          <a:off x="0" y="0"/>
+          <a:ext cx="0" cy="0"/>
+          <a:chOff x="0" y="0"/>
+          <a:chExt cx="0" cy="0"/>
+        </a:xfrm>
+      </p:grpSpPr>
+      <p:sp>
+        <p:nvSpPr>
+          <p:cNvPr id="2" name="Title 1"/>
+          <p:cNvSpPr>
+            <a:spLocks noGrp="1"/>
+          </p:cNvSpPr>
+          <p:nvPr>
+            <p:ph type="title"/>
+          </p:nvPr>
+        </p:nvSpPr>
+        <p:spPr/>
+        <p:txBody>
+          <a:bodyPr/>
+          <a:lstStyle/>
+          <a:p>
+            <a:r>
+              <a:rPr lang="en-US" dirty="0" smtClean="0"/>
+              <a:t>Write/edit posts</a:t>
+            </a:r>
+            <a:endParaRPr lang="en-US" dirty="0"/>
+          </a:p>
+        </p:txBody>
+      </p:sp>
+      <p:sp>
+        <p:nvSpPr>
+          <p:cNvPr id="3" name="Content Placeholder 2"/>
+          <p:cNvSpPr>
+            <a:spLocks noGrp="1"/>
+          </p:cNvSpPr>
+          <p:nvPr>
+            <p:ph sz="quarter" idx="1"/>
+          </p:nvPr>
+        </p:nvSpPr>
+        <p:spPr/>
+        <p:txBody>
+          <a:bodyPr>
+            <a:normAutofit/>
+          </a:bodyPr>
+          <a:lstStyle/>
+          <a:p>
+            <a:r>
+              <a:rPr lang="en-US" dirty="0" smtClean="0"/>
+              <a:t>Write and compile </a:t>
+            </a:r>
+            <a:r>
+              <a:rPr lang="en-US" dirty="0" err="1" smtClean="0"/>
+              <a:t>LaTeX</a:t>
+            </a:r>
+            <a:r>
+              <a:rPr lang="en-US" dirty="0" smtClean="0"/>
+              <a:t> documents as usual</a:t>
+            </a:r>
+          </a:p>
+          <a:p>
+            <a:pPr lvl="1"/>
+            <a:r>
+              <a:rPr lang="en-US" dirty="0" err="1" smtClean="0"/>
+              <a:t>BlaTeX</a:t>
+            </a:r>
+            <a:r>
+              <a:rPr lang="en-US" dirty="0" smtClean="0"/>
+              <a:t> looks in the `posts/` directory</a:t>
+            </a:r>
+          </a:p>
+          <a:p>
+            <a:r>
+              <a:rPr lang="en-US" dirty="0" smtClean="0"/>
+              <a:t>No interruption in typical workflow</a:t>
+            </a:r>
+          </a:p>
+        </p:txBody>
+      </p:sp>
+      <p:sp>
+        <p:nvSpPr>
+          <p:cNvPr id="9" name="TextBox 8"/>
+          <p:cNvSpPr txBox="1"/>
+          <p:nvPr/>
+        </p:nvSpPr>
+        <p:spPr>
+          <a:xfrm>
+            <a:off x="4438315" y="1069513"/>
+            <a:ext cx="588209" cy="400110"/>
+          </a:xfrm>
+          <a:prstGeom prst="rect">
+            <a:avLst/>
+          </a:prstGeom>
+          <a:noFill/>
+        </p:spPr>
+        <p:txBody>
+          <a:bodyPr wrap="square" rtlCol="0">
+            <a:spAutoFit/>
+          </a:bodyPr>
+          <a:lstStyle/>
+          <a:p>
+            <a:r>
+              <a:rPr lang="el-GR" sz="2000" dirty="0" smtClean="0"/>
+              <a:t>λ</a:t>
+            </a:r>
+            <a:endParaRPr lang="en-US" sz="2000" dirty="0"/>
+          </a:p>
+        </p:txBody>
+      </p:sp>
+    </p:spTree>
+    <p:extLst>
+      <p:ext uri="{BB962C8B-B14F-4D97-AF65-F5344CB8AC3E}">
+        <p14:creationId xmlns:p14="http://schemas.microsoft.com/office/powerpoint/2010/main" val="2199714623"/>
+      </p:ext>
+    </p:extLst>
+  </p:cSld>
+  <p:clrMapOvr>
+    <a:masterClrMapping/>
+  </p:clrMapOvr>
+  <p:timing>
+    <p:tnLst>
+      <p:par>
+        <p:cTn xmlns:p14="http://schemas.microsoft.com/office/powerpoint/2010/main" id="1" dur="indefinite" restart="never" nodeType="tmRoot"/>
+      </p:par>
+    </p:tnLst>
+  </p:timing>
+</p:sld>
+</file>
+
+<file path=ppt/slides/slide11.xml><?xml version="1.0" encoding="utf-8"?>
+<p:sld xmlns:a="http://schemas.openxmlformats.org/drawingml/2006/main" xmlns:r="http://schemas.openxmlformats.org/officeDocument/2006/relationships" xmlns:p="http://schemas.openxmlformats.org/presentationml/2006/main">
+  <p:cSld>
+    <p:spTree>
+      <p:nvGrpSpPr>
+        <p:cNvPr id="1" name=""/>
+        <p:cNvGrpSpPr/>
+        <p:nvPr/>
+      </p:nvGrpSpPr>
+      <p:grpSpPr>
+        <a:xfrm>
+          <a:off x="0" y="0"/>
+          <a:ext cx="0" cy="0"/>
+          <a:chOff x="0" y="0"/>
+          <a:chExt cx="0" cy="0"/>
+        </a:xfrm>
+      </p:grpSpPr>
+      <p:sp>
+        <p:nvSpPr>
+          <p:cNvPr id="2" name="Title 1"/>
+          <p:cNvSpPr>
+            <a:spLocks noGrp="1"/>
+          </p:cNvSpPr>
+          <p:nvPr>
+            <p:ph type="title"/>
+          </p:nvPr>
+        </p:nvSpPr>
+        <p:spPr/>
+        <p:txBody>
+          <a:bodyPr/>
+          <a:lstStyle/>
+          <a:p>
+            <a:r>
+              <a:rPr lang="en-US" dirty="0" smtClean="0"/>
+              <a:t>Design a static website</a:t>
+            </a:r>
+            <a:endParaRPr lang="en-US" dirty="0"/>
+          </a:p>
+        </p:txBody>
+      </p:sp>
+      <p:sp>
+        <p:nvSpPr>
+          <p:cNvPr id="3" name="Content Placeholder 2"/>
+          <p:cNvSpPr>
+            <a:spLocks noGrp="1"/>
+          </p:cNvSpPr>
+          <p:nvPr>
+            <p:ph sz="quarter" idx="1"/>
+          </p:nvPr>
+        </p:nvSpPr>
+        <p:spPr/>
+        <p:txBody>
+          <a:bodyPr>
+            <a:normAutofit/>
+          </a:bodyPr>
+          <a:lstStyle/>
+          <a:p>
+            <a:r>
+              <a:rPr lang="en-US" dirty="0" smtClean="0"/>
+              <a:t>Build your website in the `</a:t>
+            </a:r>
+            <a:r>
+              <a:rPr lang="en-US" dirty="0" err="1" smtClean="0"/>
+              <a:t>index.html.bltx</a:t>
+            </a:r>
+            <a:r>
+              <a:rPr lang="en-US" dirty="0" smtClean="0"/>
+              <a:t>` file</a:t>
+            </a:r>
+          </a:p>
+          <a:p>
+            <a:pPr lvl="1"/>
+            <a:r>
+              <a:rPr lang="en-US" dirty="0" err="1" smtClean="0"/>
+              <a:t>BlaTeX</a:t>
+            </a:r>
+            <a:r>
+              <a:rPr lang="en-US" dirty="0" smtClean="0"/>
+              <a:t> will use this template file to build your static site</a:t>
+            </a:r>
+          </a:p>
+          <a:p>
+            <a:pPr lvl="1"/>
+            <a:r>
+              <a:rPr lang="en-US" dirty="0" smtClean="0"/>
+              <a:t>Looks for the following code: `&lt;</a:t>
+            </a:r>
+            <a:r>
+              <a:rPr lang="en-US" dirty="0" err="1" smtClean="0"/>
+              <a:t>ul</a:t>
+            </a:r>
+            <a:r>
+              <a:rPr lang="en-US" dirty="0"/>
+              <a:t> </a:t>
+            </a:r>
+            <a:r>
+              <a:rPr lang="en-US" dirty="0" smtClean="0"/>
+              <a:t>id=“blog-posts”&gt;&lt;/</a:t>
+            </a:r>
+            <a:r>
+              <a:rPr lang="en-US" dirty="0" err="1" smtClean="0"/>
+              <a:t>ul</a:t>
+            </a:r>
+            <a:r>
+              <a:rPr lang="en-US" dirty="0" smtClean="0"/>
+              <a:t>&gt;`</a:t>
+            </a:r>
+          </a:p>
+          <a:p>
+            <a:r>
+              <a:rPr lang="en-US" dirty="0" smtClean="0"/>
+              <a:t>No interruption of typical workflow</a:t>
+            </a:r>
+          </a:p>
+        </p:txBody>
+      </p:sp>
+      <p:sp>
+        <p:nvSpPr>
+          <p:cNvPr id="9" name="TextBox 8"/>
+          <p:cNvSpPr txBox="1"/>
+          <p:nvPr/>
+        </p:nvSpPr>
+        <p:spPr>
+          <a:xfrm>
+            <a:off x="4438315" y="1069513"/>
+            <a:ext cx="588209" cy="400110"/>
+          </a:xfrm>
+          <a:prstGeom prst="rect">
+            <a:avLst/>
+          </a:prstGeom>
+          <a:noFill/>
+        </p:spPr>
+        <p:txBody>
+          <a:bodyPr wrap="square" rtlCol="0">
+            <a:spAutoFit/>
+          </a:bodyPr>
+          <a:lstStyle/>
+          <a:p>
+            <a:r>
+              <a:rPr lang="el-GR" sz="2000" dirty="0" smtClean="0"/>
+              <a:t>λ</a:t>
+            </a:r>
+            <a:endParaRPr lang="en-US" sz="2000" dirty="0"/>
+          </a:p>
+        </p:txBody>
+      </p:sp>
+    </p:spTree>
+    <p:extLst>
+      <p:ext uri="{BB962C8B-B14F-4D97-AF65-F5344CB8AC3E}">
+        <p14:creationId xmlns:p14="http://schemas.microsoft.com/office/powerpoint/2010/main" val="3922255865"/>
+      </p:ext>
+    </p:extLst>
+  </p:cSld>
+  <p:clrMapOvr>
+    <a:masterClrMapping/>
+  </p:clrMapOvr>
+  <p:timing>
+    <p:tnLst>
+      <p:par>
+        <p:cTn xmlns:p14="http://schemas.microsoft.com/office/powerpoint/2010/main" id="1" dur="indefinite" restart="never" nodeType="tmRoot"/>
+      </p:par>
+    </p:tnLst>
+  </p:timing>
+</p:sld>
+</file>
+
+<file path=ppt/slides/slide12.xml><?xml version="1.0" encoding="utf-8"?>
+<p:sld xmlns:a="http://schemas.openxmlformats.org/drawingml/2006/main" xmlns:r="http://schemas.openxmlformats.org/officeDocument/2006/relationships" xmlns:p="http://schemas.openxmlformats.org/presentationml/2006/main">
+  <p:cSld>
+    <p:spTree>
+      <p:nvGrpSpPr>
+        <p:cNvPr id="1" name=""/>
+        <p:cNvGrpSpPr/>
+        <p:nvPr/>
+      </p:nvGrpSpPr>
+      <p:grpSpPr>
+        <a:xfrm>
+          <a:off x="0" y="0"/>
+          <a:ext cx="0" cy="0"/>
+          <a:chOff x="0" y="0"/>
+          <a:chExt cx="0" cy="0"/>
+        </a:xfrm>
+      </p:grpSpPr>
+      <p:sp>
+        <p:nvSpPr>
+          <p:cNvPr id="2" name="Title 1"/>
+          <p:cNvSpPr>
+            <a:spLocks noGrp="1"/>
+          </p:cNvSpPr>
+          <p:nvPr>
+            <p:ph type="title"/>
+          </p:nvPr>
+        </p:nvSpPr>
+        <p:spPr/>
+        <p:txBody>
+          <a:bodyPr/>
+          <a:lstStyle/>
+          <a:p>
+            <a:r>
+              <a:rPr lang="en-US" dirty="0" smtClean="0"/>
+              <a:t>Compile your static site</a:t>
+            </a:r>
+            <a:endParaRPr lang="en-US" dirty="0"/>
+          </a:p>
+        </p:txBody>
+      </p:sp>
+      <p:sp>
+        <p:nvSpPr>
+          <p:cNvPr id="3" name="Content Placeholder 2"/>
+          <p:cNvSpPr>
+            <a:spLocks noGrp="1"/>
+          </p:cNvSpPr>
+          <p:nvPr>
+            <p:ph sz="quarter" idx="1"/>
+          </p:nvPr>
+        </p:nvSpPr>
+        <p:spPr/>
+        <p:txBody>
+          <a:bodyPr>
+            <a:normAutofit/>
+          </a:bodyPr>
+          <a:lstStyle/>
+          <a:p>
+            <a:r>
+              <a:rPr lang="en-US" dirty="0" smtClean="0"/>
+              <a:t>`</a:t>
+            </a:r>
+            <a:r>
+              <a:rPr lang="en-US" dirty="0" err="1" smtClean="0"/>
+              <a:t>blatex</a:t>
+            </a:r>
+            <a:r>
+              <a:rPr lang="en-US" dirty="0" smtClean="0"/>
+              <a:t> build`</a:t>
+            </a:r>
+          </a:p>
+          <a:p>
+            <a:pPr lvl="1"/>
+            <a:r>
+              <a:rPr lang="en-US" dirty="0" smtClean="0"/>
+              <a:t>Looks in `posts/` directory</a:t>
+            </a:r>
+            <a:r>
+              <a:rPr lang="en-US" dirty="0"/>
+              <a:t> </a:t>
+            </a:r>
+            <a:r>
+              <a:rPr lang="en-US" dirty="0" smtClean="0"/>
+              <a:t>for posts</a:t>
+            </a:r>
+          </a:p>
+          <a:p>
+            <a:pPr lvl="1"/>
+            <a:r>
+              <a:rPr lang="en-US" dirty="0" smtClean="0"/>
+              <a:t>Looks in `</a:t>
+            </a:r>
+            <a:r>
+              <a:rPr lang="en-US" dirty="0" err="1" smtClean="0"/>
+              <a:t>index.html.bltx</a:t>
+            </a:r>
+            <a:r>
+              <a:rPr lang="en-US" dirty="0" smtClean="0"/>
+              <a:t>` for site template</a:t>
+            </a:r>
+          </a:p>
+          <a:p>
+            <a:pPr lvl="1"/>
+            <a:r>
+              <a:rPr lang="en-US" dirty="0" smtClean="0"/>
+              <a:t>Produces a final static site in `</a:t>
+            </a:r>
+            <a:r>
+              <a:rPr lang="en-US" dirty="0" err="1" smtClean="0"/>
+              <a:t>index.html</a:t>
+            </a:r>
+            <a:r>
+              <a:rPr lang="en-US" dirty="0" smtClean="0"/>
+              <a:t>`</a:t>
+            </a:r>
+          </a:p>
+        </p:txBody>
+      </p:sp>
+      <p:sp>
+        <p:nvSpPr>
+          <p:cNvPr id="9" name="TextBox 8"/>
+          <p:cNvSpPr txBox="1"/>
+          <p:nvPr/>
+        </p:nvSpPr>
+        <p:spPr>
+          <a:xfrm>
+            <a:off x="4438315" y="1069513"/>
+            <a:ext cx="588209" cy="400110"/>
+          </a:xfrm>
+          <a:prstGeom prst="rect">
+            <a:avLst/>
+          </a:prstGeom>
+          <a:noFill/>
+        </p:spPr>
+        <p:txBody>
+          <a:bodyPr wrap="square" rtlCol="0">
+            <a:spAutoFit/>
+          </a:bodyPr>
+          <a:lstStyle/>
+          <a:p>
+            <a:r>
+              <a:rPr lang="el-GR" sz="2000" dirty="0" smtClean="0"/>
+              <a:t>λ</a:t>
+            </a:r>
+            <a:endParaRPr lang="en-US" sz="2000" dirty="0"/>
+          </a:p>
+        </p:txBody>
+      </p:sp>
+    </p:spTree>
+    <p:extLst>
+      <p:ext uri="{BB962C8B-B14F-4D97-AF65-F5344CB8AC3E}">
+        <p14:creationId xmlns:p14="http://schemas.microsoft.com/office/powerpoint/2010/main" val="1683762537"/>
+      </p:ext>
+    </p:extLst>
+  </p:cSld>
+  <p:clrMapOvr>
+    <a:masterClrMapping/>
+  </p:clrMapOvr>
+  <p:timing>
+    <p:tnLst>
+      <p:par>
+        <p:cTn xmlns:p14="http://schemas.microsoft.com/office/powerpoint/2010/main" id="1" dur="indefinite" restart="never" nodeType="tmRoot"/>
+      </p:par>
+    </p:tnLst>
+  </p:timing>
+</p:sld>
+</file>
+
+<file path=ppt/slides/slide13.xml><?xml version="1.0" encoding="utf-8"?>
+<p:sld xmlns:a="http://schemas.openxmlformats.org/drawingml/2006/main" xmlns:r="http://schemas.openxmlformats.org/officeDocument/2006/relationships" xmlns:p="http://schemas.openxmlformats.org/presentationml/2006/main">
+  <p:cSld>
+    <p:spTree>
+      <p:nvGrpSpPr>
+        <p:cNvPr id="1" name=""/>
+        <p:cNvGrpSpPr/>
+        <p:nvPr/>
+      </p:nvGrpSpPr>
+      <p:grpSpPr>
+        <a:xfrm>
+          <a:off x="0" y="0"/>
+          <a:ext cx="0" cy="0"/>
+          <a:chOff x="0" y="0"/>
+          <a:chExt cx="0" cy="0"/>
+        </a:xfrm>
+      </p:grpSpPr>
+      <p:sp>
+        <p:nvSpPr>
+          <p:cNvPr id="2" name="Title 1"/>
+          <p:cNvSpPr>
+            <a:spLocks noGrp="1"/>
+          </p:cNvSpPr>
+          <p:nvPr>
+            <p:ph type="title"/>
+          </p:nvPr>
+        </p:nvSpPr>
+        <p:spPr/>
+        <p:txBody>
+          <a:bodyPr/>
+          <a:lstStyle/>
+          <a:p>
+            <a:r>
+              <a:rPr lang="en-US" dirty="0" smtClean="0"/>
+              <a:t>Possible Errors</a:t>
+            </a:r>
+            <a:endParaRPr lang="en-US" dirty="0"/>
+          </a:p>
+        </p:txBody>
+      </p:sp>
+      <p:sp>
+        <p:nvSpPr>
+          <p:cNvPr id="3" name="Content Placeholder 2"/>
+          <p:cNvSpPr>
+            <a:spLocks noGrp="1"/>
+          </p:cNvSpPr>
+          <p:nvPr>
+            <p:ph sz="quarter" idx="1"/>
+          </p:nvPr>
+        </p:nvSpPr>
+        <p:spPr/>
+        <p:txBody>
+          <a:bodyPr>
+            <a:normAutofit/>
+          </a:bodyPr>
+          <a:lstStyle/>
+          <a:p>
+            <a:r>
+              <a:rPr lang="en-US" dirty="0" smtClean="0"/>
+              <a:t>`Either` as an instance of an Applicative </a:t>
+            </a:r>
+            <a:r>
+              <a:rPr lang="en-US" dirty="0" err="1" smtClean="0"/>
+              <a:t>Functor</a:t>
+            </a:r>
+            <a:r>
+              <a:rPr lang="en-US" dirty="0" smtClean="0"/>
+              <a:t> </a:t>
+            </a:r>
+          </a:p>
+        </p:txBody>
+      </p:sp>
+      <p:sp>
+        <p:nvSpPr>
+          <p:cNvPr id="9" name="TextBox 8"/>
+          <p:cNvSpPr txBox="1"/>
+          <p:nvPr/>
+        </p:nvSpPr>
+        <p:spPr>
+          <a:xfrm>
+            <a:off x="4438315" y="1069513"/>
+            <a:ext cx="588209" cy="400110"/>
+          </a:xfrm>
+          <a:prstGeom prst="rect">
+            <a:avLst/>
+          </a:prstGeom>
+          <a:noFill/>
+        </p:spPr>
+        <p:txBody>
+          <a:bodyPr wrap="square" rtlCol="0">
+            <a:spAutoFit/>
+          </a:bodyPr>
+          <a:lstStyle/>
+          <a:p>
+            <a:r>
+              <a:rPr lang="el-GR" sz="2000" dirty="0" smtClean="0"/>
+              <a:t>λ</a:t>
+            </a:r>
+            <a:endParaRPr lang="en-US" sz="2000" dirty="0"/>
+          </a:p>
+        </p:txBody>
+      </p:sp>
+      <p:pic>
+        <p:nvPicPr>
+          <p:cNvPr id="7" name="Picture 6" descr="Screen Shot 2016-05-31 at 3.13.15 PM.png"/>
+          <p:cNvPicPr>
+            <a:picLocks noChangeAspect="1"/>
+          </p:cNvPicPr>
+          <p:nvPr/>
+        </p:nvPicPr>
+        <p:blipFill>
+          <a:blip r:embed="rId2">
+            <a:extLst>
+              <a:ext uri="{28A0092B-C50C-407E-A947-70E740481C1C}">
+                <a14:useLocalDpi xmlns:a14="http://schemas.microsoft.com/office/drawing/2010/main" val="0"/>
+              </a:ext>
+            </a:extLst>
+          </a:blip>
+          <a:stretch>
+            <a:fillRect/>
+          </a:stretch>
+        </p:blipFill>
+        <p:spPr>
+          <a:xfrm>
+            <a:off x="1249947" y="2620210"/>
+            <a:ext cx="6622765" cy="2869865"/>
+          </a:xfrm>
+          <a:prstGeom prst="rect">
+            <a:avLst/>
+          </a:prstGeom>
+        </p:spPr>
+      </p:pic>
+    </p:spTree>
+    <p:extLst>
+      <p:ext uri="{BB962C8B-B14F-4D97-AF65-F5344CB8AC3E}">
+        <p14:creationId xmlns:p14="http://schemas.microsoft.com/office/powerpoint/2010/main" val="2666914859"/>
+      </p:ext>
+    </p:extLst>
+  </p:cSld>
+  <p:clrMapOvr>
+    <a:masterClrMapping/>
+  </p:clrMapOvr>
+  <p:timing>
+    <p:tnLst>
+      <p:par>
+        <p:cTn xmlns:p14="http://schemas.microsoft.com/office/powerpoint/2010/main" id="1" dur="indefinite" restart="never" nodeType="tmRoot"/>
+      </p:par>
+    </p:tnLst>
+  </p:timing>
+</p:sld>
+</file>
+
+<file path=ppt/slides/slide14.xml><?xml version="1.0" encoding="utf-8"?>
+<p:sld xmlns:a="http://schemas.openxmlformats.org/drawingml/2006/main" xmlns:r="http://schemas.openxmlformats.org/officeDocument/2006/relationships" xmlns:p="http://schemas.openxmlformats.org/presentationml/2006/main">
+  <p:cSld>
+    <p:spTree>
+      <p:nvGrpSpPr>
+        <p:cNvPr id="1" name=""/>
+        <p:cNvGrpSpPr/>
+        <p:nvPr/>
+      </p:nvGrpSpPr>
+      <p:grpSpPr>
+        <a:xfrm>
+          <a:off x="0" y="0"/>
+          <a:ext cx="0" cy="0"/>
+          <a:chOff x="0" y="0"/>
+          <a:chExt cx="0" cy="0"/>
+        </a:xfrm>
+      </p:grpSpPr>
+      <p:sp>
+        <p:nvSpPr>
+          <p:cNvPr id="2" name="Title 1"/>
+          <p:cNvSpPr>
+            <a:spLocks noGrp="1"/>
+          </p:cNvSpPr>
+          <p:nvPr>
+            <p:ph type="title"/>
+          </p:nvPr>
+        </p:nvSpPr>
+        <p:spPr/>
+        <p:txBody>
+          <a:bodyPr/>
+          <a:lstStyle/>
+          <a:p>
+            <a:r>
+              <a:rPr lang="en-US" dirty="0" smtClean="0"/>
+              <a:t>Compiled Site</a:t>
+            </a:r>
+            <a:endParaRPr lang="en-US" dirty="0"/>
+          </a:p>
+        </p:txBody>
+      </p:sp>
+      <p:sp>
+        <p:nvSpPr>
+          <p:cNvPr id="3" name="Content Placeholder 2"/>
+          <p:cNvSpPr>
+            <a:spLocks noGrp="1"/>
+          </p:cNvSpPr>
+          <p:nvPr>
+            <p:ph sz="quarter" idx="1"/>
+          </p:nvPr>
+        </p:nvSpPr>
+        <p:spPr/>
+        <p:txBody>
+          <a:bodyPr>
+            <a:normAutofit/>
+          </a:bodyPr>
+          <a:lstStyle/>
+          <a:p>
+            <a:r>
+              <a:rPr lang="en-US" dirty="0" err="1" smtClean="0"/>
+              <a:t>Open`index.html</a:t>
+            </a:r>
+            <a:r>
+              <a:rPr lang="en-US" dirty="0" smtClean="0"/>
+              <a:t>` in browser</a:t>
+            </a:r>
+          </a:p>
+        </p:txBody>
+      </p:sp>
+      <p:sp>
+        <p:nvSpPr>
+          <p:cNvPr id="9" name="TextBox 8"/>
+          <p:cNvSpPr txBox="1"/>
+          <p:nvPr/>
+        </p:nvSpPr>
+        <p:spPr>
+          <a:xfrm>
+            <a:off x="4438315" y="1069513"/>
+            <a:ext cx="588209" cy="400110"/>
+          </a:xfrm>
+          <a:prstGeom prst="rect">
+            <a:avLst/>
+          </a:prstGeom>
+          <a:noFill/>
+        </p:spPr>
+        <p:txBody>
+          <a:bodyPr wrap="square" rtlCol="0">
+            <a:spAutoFit/>
+          </a:bodyPr>
+          <a:lstStyle/>
+          <a:p>
+            <a:r>
+              <a:rPr lang="el-GR" sz="2000" dirty="0" smtClean="0"/>
+              <a:t>λ</a:t>
+            </a:r>
+            <a:endParaRPr lang="en-US" sz="2000" dirty="0"/>
+          </a:p>
+        </p:txBody>
+      </p:sp>
+      <p:pic>
+        <p:nvPicPr>
+          <p:cNvPr id="4" name="Picture 3" descr="Screen Shot 2016-05-31 at 3.20.53 PM.png"/>
+          <p:cNvPicPr>
+            <a:picLocks noChangeAspect="1"/>
+          </p:cNvPicPr>
+          <p:nvPr/>
+        </p:nvPicPr>
+        <p:blipFill>
+          <a:blip r:embed="rId2">
+            <a:extLst>
+              <a:ext uri="{28A0092B-C50C-407E-A947-70E740481C1C}">
+                <a14:useLocalDpi xmlns:a14="http://schemas.microsoft.com/office/drawing/2010/main" val="0"/>
+              </a:ext>
+            </a:extLst>
+          </a:blip>
+          <a:stretch>
+            <a:fillRect/>
+          </a:stretch>
+        </p:blipFill>
+        <p:spPr>
+          <a:xfrm>
+            <a:off x="1149684" y="2129921"/>
+            <a:ext cx="6857626" cy="4286017"/>
+          </a:xfrm>
+          <a:prstGeom prst="rect">
+            <a:avLst/>
+          </a:prstGeom>
+        </p:spPr>
+      </p:pic>
+    </p:spTree>
+    <p:extLst>
+      <p:ext uri="{BB962C8B-B14F-4D97-AF65-F5344CB8AC3E}">
+        <p14:creationId xmlns:p14="http://schemas.microsoft.com/office/powerpoint/2010/main" val="2979430487"/>
+      </p:ext>
+    </p:extLst>
+  </p:cSld>
+  <p:clrMapOvr>
+    <a:masterClrMapping/>
+  </p:clrMapOvr>
+  <p:timing>
+    <p:tnLst>
+      <p:par>
+        <p:cTn xmlns:p14="http://schemas.microsoft.com/office/powerpoint/2010/main" id="1" dur="indefinite" restart="never" nodeType="tmRoot"/>
+      </p:par>
+    </p:tnLst>
+  </p:timing>
+</p:sld>
+</file>
+
+<file path=ppt/slides/slide15.xml><?xml version="1.0" encoding="utf-8"?>
+<p:sld xmlns:a="http://schemas.openxmlformats.org/drawingml/2006/main" xmlns:r="http://schemas.openxmlformats.org/officeDocument/2006/relationships" xmlns:p="http://schemas.openxmlformats.org/presentationml/2006/main">
+  <p:cSld>
+    <p:spTree>
+      <p:nvGrpSpPr>
+        <p:cNvPr id="1" name=""/>
+        <p:cNvGrpSpPr/>
+        <p:nvPr/>
+      </p:nvGrpSpPr>
+      <p:grpSpPr>
+        <a:xfrm>
+          <a:off x="0" y="0"/>
+          <a:ext cx="0" cy="0"/>
+          <a:chOff x="0" y="0"/>
+          <a:chExt cx="0" cy="0"/>
+        </a:xfrm>
+      </p:grpSpPr>
+      <p:sp>
+        <p:nvSpPr>
+          <p:cNvPr id="2" name="Title 1"/>
+          <p:cNvSpPr>
+            <a:spLocks noGrp="1"/>
+          </p:cNvSpPr>
+          <p:nvPr>
+            <p:ph type="title"/>
+          </p:nvPr>
+        </p:nvSpPr>
+        <p:spPr/>
+        <p:txBody>
+          <a:bodyPr/>
+          <a:lstStyle/>
+          <a:p>
+            <a:endParaRPr lang="en-US"/>
+          </a:p>
+        </p:txBody>
+      </p:sp>
+      <p:sp>
+        <p:nvSpPr>
+          <p:cNvPr id="5" name="Content Placeholder 4"/>
+          <p:cNvSpPr>
+            <a:spLocks noGrp="1"/>
+          </p:cNvSpPr>
+          <p:nvPr>
+            <p:ph sz="quarter" idx="1"/>
+          </p:nvPr>
+        </p:nvSpPr>
+        <p:spPr/>
+        <p:txBody>
+          <a:bodyPr/>
+          <a:lstStyle/>
+          <a:p>
+            <a:endParaRPr lang="en-US"/>
+          </a:p>
+        </p:txBody>
+      </p:sp>
+    </p:spTree>
+    <p:extLst>
+      <p:ext uri="{BB962C8B-B14F-4D97-AF65-F5344CB8AC3E}">
+        <p14:creationId xmlns:p14="http://schemas.microsoft.com/office/powerpoint/2010/main" val="983560918"/>
+      </p:ext>
+    </p:extLst>
+  </p:cSld>
+  <p:clrMapOvr>
+    <a:masterClrMapping/>
+  </p:clrMapOvr>
+</p:sld>
+</file>
+
 <file path=ppt/slides/slide2.xml><?xml version="1.0" encoding="utf-8"?>
 <p:sld xmlns:a="http://schemas.openxmlformats.org/drawingml/2006/main" xmlns:r="http://schemas.openxmlformats.org/officeDocument/2006/relationships" xmlns:p="http://schemas.openxmlformats.org/presentationml/2006/main">
   <p:cSld>
@@ -6238,30 +7539,18 @@
           <a:lstStyle/>
           <a:p>
             <a:r>
-              <a:rPr lang="en-US" dirty="0" err="1" smtClean="0"/>
-              <a:t>LaTeX</a:t>
-            </a:r>
-            <a:r>
               <a:rPr lang="en-US" dirty="0" smtClean="0"/>
-              <a:t> (compare to Markdown)</a:t>
+              <a:t>Static sites (</a:t>
+            </a:r>
+            <a:r>
+              <a:rPr lang="en-US" dirty="0"/>
+              <a:t>compare to </a:t>
+            </a:r>
+            <a:r>
+              <a:rPr lang="en-US" dirty="0" smtClean="0"/>
+              <a:t>dynamic sites)</a:t>
             </a:r>
             <a:endParaRPr lang="en-US" dirty="0"/>
-          </a:p>
-          <a:p>
-            <a:r>
-              <a:rPr lang="en-US" dirty="0"/>
-              <a:t>PDFs (compare to HTML</a:t>
-            </a:r>
-            <a:r>
-              <a:rPr lang="en-US" dirty="0" smtClean="0"/>
-              <a:t>)</a:t>
-            </a:r>
-          </a:p>
-          <a:p>
-            <a:r>
-              <a:rPr lang="en-US" dirty="0" smtClean="0"/>
-              <a:t>Haskell (compare to Java)</a:t>
-            </a:r>
           </a:p>
         </p:txBody>
       </p:sp>
@@ -6298,7 +7587,7 @@
     </p:spTree>
     <p:extLst>
       <p:ext uri="{BB962C8B-B14F-4D97-AF65-F5344CB8AC3E}">
-        <p14:creationId xmlns:p14="http://schemas.microsoft.com/office/powerpoint/2010/main" val="1212657636"/>
+        <p14:creationId xmlns:p14="http://schemas.microsoft.com/office/powerpoint/2010/main" val="522541982"/>
       </p:ext>
     </p:extLst>
   </p:cSld>
@@ -6341,8 +7630,8 @@
           <a:lstStyle/>
           <a:p>
             <a:r>
-              <a:rPr lang="en-US" dirty="0" err="1" smtClean="0"/>
-              <a:t>BlaTeX</a:t>
+              <a:rPr lang="en-US" dirty="0" smtClean="0"/>
+              <a:t>Background</a:t>
             </a:r>
             <a:endParaRPr lang="en-US" dirty="0"/>
           </a:p>
@@ -6363,17 +7652,17 @@
           <a:bodyPr/>
           <a:lstStyle/>
           <a:p>
-            <a:r>
-              <a:rPr lang="en-US" dirty="0" smtClean="0"/>
-              <a:t>Static site compiler written in Haskell for </a:t>
-            </a:r>
             <a:r>
               <a:rPr lang="en-US" dirty="0" err="1" smtClean="0"/>
               <a:t>LaTeX</a:t>
             </a:r>
             <a:r>
               <a:rPr lang="en-US" dirty="0" smtClean="0"/>
-              <a:t> documents</a:t>
+              <a:t> (compare to Markdown</a:t>
+            </a:r>
+            <a:r>
+              <a:rPr lang="en-US" dirty="0" smtClean="0"/>
+              <a:t>)</a:t>
             </a:r>
           </a:p>
         </p:txBody>
@@ -6408,6 +7697,30 @@
           </a:p>
         </p:txBody>
       </p:sp>
+      <p:pic>
+        <p:nvPicPr>
+          <p:cNvPr id="4" name="Picture 3"/>
+          <p:cNvPicPr>
+            <a:picLocks noChangeAspect="1"/>
+          </p:cNvPicPr>
+          <p:nvPr/>
+        </p:nvPicPr>
+        <p:blipFill>
+          <a:blip r:embed="rId3"/>
+          <a:stretch>
+            <a:fillRect/>
+          </a:stretch>
+        </p:blipFill>
+        <p:spPr>
+          <a:xfrm>
+            <a:off x="828842" y="2123796"/>
+            <a:ext cx="7807158" cy="3662858"/>
+          </a:xfrm>
+          <a:prstGeom prst="rect">
+            <a:avLst/>
+          </a:prstGeom>
+        </p:spPr>
+      </p:pic>
     </p:spTree>
     <p:extLst>
       <p:ext uri="{BB962C8B-B14F-4D97-AF65-F5344CB8AC3E}">
@@ -6418,6 +7731,940 @@
   <p:clrMapOvr>
     <a:masterClrMapping/>
   </p:clrMapOvr>
+</p:sld>
+</file>
+
+<file path=ppt/slides/slide4.xml><?xml version="1.0" encoding="utf-8"?>
+<p:sld xmlns:a="http://schemas.openxmlformats.org/drawingml/2006/main" xmlns:r="http://schemas.openxmlformats.org/officeDocument/2006/relationships" xmlns:p="http://schemas.openxmlformats.org/presentationml/2006/main">
+  <p:cSld>
+    <p:spTree>
+      <p:nvGrpSpPr>
+        <p:cNvPr id="1" name=""/>
+        <p:cNvGrpSpPr/>
+        <p:nvPr/>
+      </p:nvGrpSpPr>
+      <p:grpSpPr>
+        <a:xfrm>
+          <a:off x="0" y="0"/>
+          <a:ext cx="0" cy="0"/>
+          <a:chOff x="0" y="0"/>
+          <a:chExt cx="0" cy="0"/>
+        </a:xfrm>
+      </p:grpSpPr>
+      <p:sp>
+        <p:nvSpPr>
+          <p:cNvPr id="2" name="Title 1"/>
+          <p:cNvSpPr>
+            <a:spLocks noGrp="1"/>
+          </p:cNvSpPr>
+          <p:nvPr>
+            <p:ph type="title"/>
+          </p:nvPr>
+        </p:nvSpPr>
+        <p:spPr/>
+        <p:txBody>
+          <a:bodyPr/>
+          <a:lstStyle/>
+          <a:p>
+            <a:r>
+              <a:rPr lang="en-US" dirty="0" smtClean="0"/>
+              <a:t>Background</a:t>
+            </a:r>
+            <a:endParaRPr lang="en-US" dirty="0"/>
+          </a:p>
+        </p:txBody>
+      </p:sp>
+      <p:sp>
+        <p:nvSpPr>
+          <p:cNvPr id="3" name="Content Placeholder 2"/>
+          <p:cNvSpPr>
+            <a:spLocks noGrp="1"/>
+          </p:cNvSpPr>
+          <p:nvPr>
+            <p:ph sz="quarter" idx="1"/>
+          </p:nvPr>
+        </p:nvSpPr>
+        <p:spPr/>
+        <p:txBody>
+          <a:bodyPr/>
+          <a:lstStyle/>
+          <a:p>
+            <a:r>
+              <a:rPr lang="en-US" dirty="0" smtClean="0"/>
+              <a:t>PDFs </a:t>
+            </a:r>
+            <a:r>
+              <a:rPr lang="en-US" dirty="0"/>
+              <a:t>(compare to HTML</a:t>
+            </a:r>
+            <a:r>
+              <a:rPr lang="en-US" dirty="0" smtClean="0"/>
+              <a:t>)</a:t>
+            </a:r>
+            <a:endParaRPr lang="en-US" dirty="0" smtClean="0"/>
+          </a:p>
+        </p:txBody>
+      </p:sp>
+      <p:sp>
+        <p:nvSpPr>
+          <p:cNvPr id="9" name="TextBox 8"/>
+          <p:cNvSpPr txBox="1"/>
+          <p:nvPr/>
+        </p:nvSpPr>
+        <p:spPr>
+          <a:xfrm>
+            <a:off x="4438315" y="1069513"/>
+            <a:ext cx="588209" cy="400110"/>
+          </a:xfrm>
+          <a:prstGeom prst="rect">
+            <a:avLst/>
+          </a:prstGeom>
+          <a:noFill/>
+        </p:spPr>
+        <p:txBody>
+          <a:bodyPr wrap="square" rtlCol="0">
+            <a:spAutoFit/>
+          </a:bodyPr>
+          <a:lstStyle/>
+          <a:p>
+            <a:r>
+              <a:rPr lang="el-GR" sz="2000" dirty="0" smtClean="0"/>
+              <a:t>λ</a:t>
+            </a:r>
+            <a:endParaRPr lang="en-US" sz="2000" dirty="0"/>
+          </a:p>
+        </p:txBody>
+      </p:sp>
+    </p:spTree>
+    <p:extLst>
+      <p:ext uri="{BB962C8B-B14F-4D97-AF65-F5344CB8AC3E}">
+        <p14:creationId xmlns:p14="http://schemas.microsoft.com/office/powerpoint/2010/main" val="1985539233"/>
+      </p:ext>
+    </p:extLst>
+  </p:cSld>
+  <p:clrMapOvr>
+    <a:masterClrMapping/>
+  </p:clrMapOvr>
+</p:sld>
+</file>
+
+<file path=ppt/slides/slide5.xml><?xml version="1.0" encoding="utf-8"?>
+<p:sld xmlns:a="http://schemas.openxmlformats.org/drawingml/2006/main" xmlns:r="http://schemas.openxmlformats.org/officeDocument/2006/relationships" xmlns:p="http://schemas.openxmlformats.org/presentationml/2006/main">
+  <p:cSld>
+    <p:spTree>
+      <p:nvGrpSpPr>
+        <p:cNvPr id="1" name=""/>
+        <p:cNvGrpSpPr/>
+        <p:nvPr/>
+      </p:nvGrpSpPr>
+      <p:grpSpPr>
+        <a:xfrm>
+          <a:off x="0" y="0"/>
+          <a:ext cx="0" cy="0"/>
+          <a:chOff x="0" y="0"/>
+          <a:chExt cx="0" cy="0"/>
+        </a:xfrm>
+      </p:grpSpPr>
+      <p:sp>
+        <p:nvSpPr>
+          <p:cNvPr id="2" name="Title 1"/>
+          <p:cNvSpPr>
+            <a:spLocks noGrp="1"/>
+          </p:cNvSpPr>
+          <p:nvPr>
+            <p:ph type="title"/>
+          </p:nvPr>
+        </p:nvSpPr>
+        <p:spPr/>
+        <p:txBody>
+          <a:bodyPr/>
+          <a:lstStyle/>
+          <a:p>
+            <a:r>
+              <a:rPr lang="en-US" dirty="0" smtClean="0"/>
+              <a:t>Background</a:t>
+            </a:r>
+            <a:endParaRPr lang="en-US" dirty="0"/>
+          </a:p>
+        </p:txBody>
+      </p:sp>
+      <p:sp>
+        <p:nvSpPr>
+          <p:cNvPr id="3" name="Content Placeholder 2"/>
+          <p:cNvSpPr>
+            <a:spLocks noGrp="1"/>
+          </p:cNvSpPr>
+          <p:nvPr>
+            <p:ph sz="quarter" idx="1"/>
+          </p:nvPr>
+        </p:nvSpPr>
+        <p:spPr/>
+        <p:txBody>
+          <a:bodyPr/>
+          <a:lstStyle/>
+          <a:p>
+            <a:r>
+              <a:rPr lang="en-US" dirty="0"/>
+              <a:t>Haskell (compare to Java)</a:t>
+            </a:r>
+          </a:p>
+        </p:txBody>
+      </p:sp>
+      <p:sp>
+        <p:nvSpPr>
+          <p:cNvPr id="9" name="TextBox 8"/>
+          <p:cNvSpPr txBox="1"/>
+          <p:nvPr/>
+        </p:nvSpPr>
+        <p:spPr>
+          <a:xfrm>
+            <a:off x="4438315" y="1069513"/>
+            <a:ext cx="588209" cy="400110"/>
+          </a:xfrm>
+          <a:prstGeom prst="rect">
+            <a:avLst/>
+          </a:prstGeom>
+          <a:noFill/>
+        </p:spPr>
+        <p:txBody>
+          <a:bodyPr wrap="square" rtlCol="0">
+            <a:spAutoFit/>
+          </a:bodyPr>
+          <a:lstStyle/>
+          <a:p>
+            <a:r>
+              <a:rPr lang="el-GR" sz="2000" dirty="0" smtClean="0"/>
+              <a:t>λ</a:t>
+            </a:r>
+            <a:endParaRPr lang="en-US" sz="2000" dirty="0"/>
+          </a:p>
+        </p:txBody>
+      </p:sp>
+    </p:spTree>
+    <p:extLst>
+      <p:ext uri="{BB962C8B-B14F-4D97-AF65-F5344CB8AC3E}">
+        <p14:creationId xmlns:p14="http://schemas.microsoft.com/office/powerpoint/2010/main" val="135324916"/>
+      </p:ext>
+    </p:extLst>
+  </p:cSld>
+  <p:clrMapOvr>
+    <a:masterClrMapping/>
+  </p:clrMapOvr>
+</p:sld>
+</file>
+
+<file path=ppt/slides/slide6.xml><?xml version="1.0" encoding="utf-8"?>
+<p:sld xmlns:a="http://schemas.openxmlformats.org/drawingml/2006/main" xmlns:r="http://schemas.openxmlformats.org/officeDocument/2006/relationships" xmlns:p="http://schemas.openxmlformats.org/presentationml/2006/main">
+  <p:cSld>
+    <p:spTree>
+      <p:nvGrpSpPr>
+        <p:cNvPr id="1" name=""/>
+        <p:cNvGrpSpPr/>
+        <p:nvPr/>
+      </p:nvGrpSpPr>
+      <p:grpSpPr>
+        <a:xfrm>
+          <a:off x="0" y="0"/>
+          <a:ext cx="0" cy="0"/>
+          <a:chOff x="0" y="0"/>
+          <a:chExt cx="0" cy="0"/>
+        </a:xfrm>
+      </p:grpSpPr>
+      <p:sp>
+        <p:nvSpPr>
+          <p:cNvPr id="2" name="Title 1"/>
+          <p:cNvSpPr>
+            <a:spLocks noGrp="1"/>
+          </p:cNvSpPr>
+          <p:nvPr>
+            <p:ph type="title"/>
+          </p:nvPr>
+        </p:nvSpPr>
+        <p:spPr/>
+        <p:txBody>
+          <a:bodyPr/>
+          <a:lstStyle/>
+          <a:p>
+            <a:r>
+              <a:rPr lang="en-US" dirty="0" err="1" smtClean="0"/>
+              <a:t>BlaTeX</a:t>
+            </a:r>
+            <a:endParaRPr lang="en-US" dirty="0"/>
+          </a:p>
+        </p:txBody>
+      </p:sp>
+      <p:sp>
+        <p:nvSpPr>
+          <p:cNvPr id="3" name="Content Placeholder 2"/>
+          <p:cNvSpPr>
+            <a:spLocks noGrp="1"/>
+          </p:cNvSpPr>
+          <p:nvPr>
+            <p:ph sz="quarter" idx="1"/>
+          </p:nvPr>
+        </p:nvSpPr>
+        <p:spPr/>
+        <p:txBody>
+          <a:bodyPr/>
+          <a:lstStyle/>
+          <a:p>
+            <a:r>
+              <a:rPr lang="en-US" dirty="0" smtClean="0"/>
+              <a:t>Static site compiler written in Haskell for </a:t>
+            </a:r>
+            <a:r>
+              <a:rPr lang="en-US" dirty="0" err="1" smtClean="0"/>
+              <a:t>LaTeX</a:t>
+            </a:r>
+            <a:r>
+              <a:rPr lang="en-US" dirty="0" smtClean="0"/>
+              <a:t> documents</a:t>
+            </a:r>
+          </a:p>
+        </p:txBody>
+      </p:sp>
+      <p:sp>
+        <p:nvSpPr>
+          <p:cNvPr id="9" name="TextBox 8"/>
+          <p:cNvSpPr txBox="1"/>
+          <p:nvPr/>
+        </p:nvSpPr>
+        <p:spPr>
+          <a:xfrm>
+            <a:off x="4438315" y="1069513"/>
+            <a:ext cx="588209" cy="400110"/>
+          </a:xfrm>
+          <a:prstGeom prst="rect">
+            <a:avLst/>
+          </a:prstGeom>
+          <a:noFill/>
+        </p:spPr>
+        <p:txBody>
+          <a:bodyPr wrap="square" rtlCol="0">
+            <a:spAutoFit/>
+          </a:bodyPr>
+          <a:lstStyle/>
+          <a:p>
+            <a:r>
+              <a:rPr lang="el-GR" sz="2000" dirty="0" smtClean="0"/>
+              <a:t>λ</a:t>
+            </a:r>
+            <a:endParaRPr lang="en-US" sz="2000" dirty="0"/>
+          </a:p>
+        </p:txBody>
+      </p:sp>
+    </p:spTree>
+    <p:extLst>
+      <p:ext uri="{BB962C8B-B14F-4D97-AF65-F5344CB8AC3E}">
+        <p14:creationId xmlns:p14="http://schemas.microsoft.com/office/powerpoint/2010/main" val="1212657636"/>
+      </p:ext>
+    </p:extLst>
+  </p:cSld>
+  <p:clrMapOvr>
+    <a:masterClrMapping/>
+  </p:clrMapOvr>
+  <p:timing>
+    <p:tnLst>
+      <p:par>
+        <p:cTn xmlns:p14="http://schemas.microsoft.com/office/powerpoint/2010/main" id="1" dur="indefinite" restart="never" nodeType="tmRoot"/>
+      </p:par>
+    </p:tnLst>
+  </p:timing>
+</p:sld>
+</file>
+
+<file path=ppt/slides/slide7.xml><?xml version="1.0" encoding="utf-8"?>
+<p:sld xmlns:a="http://schemas.openxmlformats.org/drawingml/2006/main" xmlns:r="http://schemas.openxmlformats.org/officeDocument/2006/relationships" xmlns:p="http://schemas.openxmlformats.org/presentationml/2006/main">
+  <p:cSld>
+    <p:spTree>
+      <p:nvGrpSpPr>
+        <p:cNvPr id="1" name=""/>
+        <p:cNvGrpSpPr/>
+        <p:nvPr/>
+      </p:nvGrpSpPr>
+      <p:grpSpPr>
+        <a:xfrm>
+          <a:off x="0" y="0"/>
+          <a:ext cx="0" cy="0"/>
+          <a:chOff x="0" y="0"/>
+          <a:chExt cx="0" cy="0"/>
+        </a:xfrm>
+      </p:grpSpPr>
+      <p:sp>
+        <p:nvSpPr>
+          <p:cNvPr id="2" name="Title 1"/>
+          <p:cNvSpPr>
+            <a:spLocks noGrp="1"/>
+          </p:cNvSpPr>
+          <p:nvPr>
+            <p:ph type="title"/>
+          </p:nvPr>
+        </p:nvSpPr>
+        <p:spPr/>
+        <p:txBody>
+          <a:bodyPr/>
+          <a:lstStyle/>
+          <a:p>
+            <a:r>
+              <a:rPr lang="en-US" dirty="0" smtClean="0"/>
+              <a:t>How it Works</a:t>
+            </a:r>
+            <a:endParaRPr lang="en-US" dirty="0"/>
+          </a:p>
+        </p:txBody>
+      </p:sp>
+      <p:sp>
+        <p:nvSpPr>
+          <p:cNvPr id="3" name="Content Placeholder 2"/>
+          <p:cNvSpPr>
+            <a:spLocks noGrp="1"/>
+          </p:cNvSpPr>
+          <p:nvPr>
+            <p:ph sz="quarter" idx="1"/>
+          </p:nvPr>
+        </p:nvSpPr>
+        <p:spPr/>
+        <p:txBody>
+          <a:bodyPr>
+            <a:normAutofit/>
+          </a:bodyPr>
+          <a:lstStyle/>
+          <a:p>
+            <a:r>
+              <a:rPr lang="en-US" dirty="0" smtClean="0"/>
+              <a:t>`cabal install </a:t>
+            </a:r>
+            <a:r>
+              <a:rPr lang="en-US" dirty="0" err="1" smtClean="0"/>
+              <a:t>blatex</a:t>
+            </a:r>
+            <a:r>
+              <a:rPr lang="en-US" dirty="0" smtClean="0"/>
+              <a:t>`</a:t>
+            </a:r>
+          </a:p>
+          <a:p>
+            <a:r>
+              <a:rPr lang="en-US" dirty="0" smtClean="0"/>
+              <a:t>`</a:t>
+            </a:r>
+            <a:r>
+              <a:rPr lang="en-US" dirty="0" err="1" smtClean="0"/>
+              <a:t>blatex</a:t>
+            </a:r>
+            <a:r>
+              <a:rPr lang="en-US" dirty="0" smtClean="0"/>
+              <a:t> </a:t>
+            </a:r>
+            <a:r>
+              <a:rPr lang="en-US" dirty="0" err="1" smtClean="0"/>
+              <a:t>init</a:t>
+            </a:r>
+            <a:r>
+              <a:rPr lang="en-US" dirty="0" smtClean="0"/>
+              <a:t>`</a:t>
+            </a:r>
+          </a:p>
+          <a:p>
+            <a:pPr lvl="1"/>
+            <a:r>
+              <a:rPr lang="en-US" dirty="0" smtClean="0"/>
+              <a:t>Initialize a couple of boilerplate files and the skeleton structure</a:t>
+            </a:r>
+          </a:p>
+          <a:p>
+            <a:r>
+              <a:rPr lang="en-US" dirty="0" smtClean="0"/>
+              <a:t>Write/edit posts</a:t>
+            </a:r>
+          </a:p>
+          <a:p>
+            <a:pPr lvl="1"/>
+            <a:r>
+              <a:rPr lang="en-US" dirty="0" smtClean="0"/>
+              <a:t>Find </a:t>
+            </a:r>
+            <a:r>
+              <a:rPr lang="en-US" dirty="0" err="1" smtClean="0"/>
+              <a:t>in`posts</a:t>
+            </a:r>
+            <a:r>
+              <a:rPr lang="en-US" dirty="0" smtClean="0"/>
+              <a:t>/</a:t>
+            </a:r>
+            <a:r>
+              <a:rPr lang="en-US" dirty="0" err="1" smtClean="0"/>
+              <a:t>FILENAME.tex</a:t>
+            </a:r>
+            <a:r>
+              <a:rPr lang="en-US" dirty="0" smtClean="0"/>
+              <a:t>`</a:t>
+            </a:r>
+            <a:endParaRPr lang="en-US" dirty="0"/>
+          </a:p>
+          <a:p>
+            <a:r>
+              <a:rPr lang="en-US" dirty="0"/>
+              <a:t>Make your website pretty </a:t>
+            </a:r>
+            <a:endParaRPr lang="en-US" dirty="0" smtClean="0"/>
+          </a:p>
+          <a:p>
+            <a:pPr lvl="1"/>
+            <a:r>
+              <a:rPr lang="en-US" dirty="0" smtClean="0"/>
+              <a:t>Edit the </a:t>
+            </a:r>
+            <a:r>
+              <a:rPr lang="en-US" dirty="0" smtClean="0"/>
+              <a:t>layout file in `</a:t>
+            </a:r>
+            <a:r>
+              <a:rPr lang="en-US" dirty="0" err="1" smtClean="0"/>
+              <a:t>index.html.bltx</a:t>
+            </a:r>
+            <a:r>
+              <a:rPr lang="en-US" dirty="0" smtClean="0"/>
+              <a:t>`</a:t>
+            </a:r>
+            <a:endParaRPr lang="en-US" dirty="0" smtClean="0"/>
+          </a:p>
+          <a:p>
+            <a:r>
+              <a:rPr lang="en-US" dirty="0" smtClean="0"/>
+              <a:t>`</a:t>
+            </a:r>
+            <a:r>
+              <a:rPr lang="en-US" dirty="0" err="1" smtClean="0"/>
+              <a:t>blate</a:t>
+            </a:r>
+            <a:r>
+              <a:rPr lang="en-US" dirty="0" err="1" smtClean="0"/>
+              <a:t>x</a:t>
+            </a:r>
+            <a:r>
+              <a:rPr lang="en-US" dirty="0" smtClean="0"/>
+              <a:t> build`</a:t>
+            </a:r>
+          </a:p>
+          <a:p>
+            <a:r>
+              <a:rPr lang="en-US" dirty="0" smtClean="0"/>
+              <a:t>Open your static site at </a:t>
+            </a:r>
+            <a:r>
+              <a:rPr lang="en-US" dirty="0" smtClean="0"/>
+              <a:t>`</a:t>
+            </a:r>
+            <a:r>
+              <a:rPr lang="en-US" dirty="0" err="1" smtClean="0"/>
+              <a:t>index.html</a:t>
+            </a:r>
+            <a:r>
+              <a:rPr lang="en-US" dirty="0" smtClean="0"/>
+              <a:t>`</a:t>
+            </a:r>
+            <a:endParaRPr lang="en-US" dirty="0" smtClean="0"/>
+          </a:p>
+          <a:p>
+            <a:endParaRPr lang="en-US" dirty="0" smtClean="0"/>
+          </a:p>
+        </p:txBody>
+      </p:sp>
+      <p:sp>
+        <p:nvSpPr>
+          <p:cNvPr id="9" name="TextBox 8"/>
+          <p:cNvSpPr txBox="1"/>
+          <p:nvPr/>
+        </p:nvSpPr>
+        <p:spPr>
+          <a:xfrm>
+            <a:off x="4438315" y="1069513"/>
+            <a:ext cx="588209" cy="400110"/>
+          </a:xfrm>
+          <a:prstGeom prst="rect">
+            <a:avLst/>
+          </a:prstGeom>
+          <a:noFill/>
+        </p:spPr>
+        <p:txBody>
+          <a:bodyPr wrap="square" rtlCol="0">
+            <a:spAutoFit/>
+          </a:bodyPr>
+          <a:lstStyle/>
+          <a:p>
+            <a:r>
+              <a:rPr lang="el-GR" sz="2000" dirty="0" smtClean="0"/>
+              <a:t>λ</a:t>
+            </a:r>
+            <a:endParaRPr lang="en-US" sz="2000" dirty="0"/>
+          </a:p>
+        </p:txBody>
+      </p:sp>
+    </p:spTree>
+    <p:extLst>
+      <p:ext uri="{BB962C8B-B14F-4D97-AF65-F5344CB8AC3E}">
+        <p14:creationId xmlns:p14="http://schemas.microsoft.com/office/powerpoint/2010/main" val="1150960263"/>
+      </p:ext>
+    </p:extLst>
+  </p:cSld>
+  <p:clrMapOvr>
+    <a:masterClrMapping/>
+  </p:clrMapOvr>
+  <p:timing>
+    <p:tnLst>
+      <p:par>
+        <p:cTn xmlns:p14="http://schemas.microsoft.com/office/powerpoint/2010/main" id="1" dur="indefinite" restart="never" nodeType="tmRoot"/>
+      </p:par>
+    </p:tnLst>
+  </p:timing>
+</p:sld>
+</file>
+
+<file path=ppt/slides/slide8.xml><?xml version="1.0" encoding="utf-8"?>
+<p:sld xmlns:a="http://schemas.openxmlformats.org/drawingml/2006/main" xmlns:r="http://schemas.openxmlformats.org/officeDocument/2006/relationships" xmlns:p="http://schemas.openxmlformats.org/presentationml/2006/main">
+  <p:cSld>
+    <p:spTree>
+      <p:nvGrpSpPr>
+        <p:cNvPr id="1" name=""/>
+        <p:cNvGrpSpPr/>
+        <p:nvPr/>
+      </p:nvGrpSpPr>
+      <p:grpSpPr>
+        <a:xfrm>
+          <a:off x="0" y="0"/>
+          <a:ext cx="0" cy="0"/>
+          <a:chOff x="0" y="0"/>
+          <a:chExt cx="0" cy="0"/>
+        </a:xfrm>
+      </p:grpSpPr>
+      <p:sp>
+        <p:nvSpPr>
+          <p:cNvPr id="2" name="Title 1"/>
+          <p:cNvSpPr>
+            <a:spLocks noGrp="1"/>
+          </p:cNvSpPr>
+          <p:nvPr>
+            <p:ph type="title"/>
+          </p:nvPr>
+        </p:nvSpPr>
+        <p:spPr/>
+        <p:txBody>
+          <a:bodyPr/>
+          <a:lstStyle/>
+          <a:p>
+            <a:r>
+              <a:rPr lang="en-US" dirty="0" smtClean="0"/>
+              <a:t>Install </a:t>
+            </a:r>
+            <a:r>
+              <a:rPr lang="en-US" dirty="0" err="1"/>
+              <a:t>H</a:t>
+            </a:r>
+            <a:r>
+              <a:rPr lang="en-US" dirty="0" err="1" smtClean="0"/>
+              <a:t>ackage</a:t>
+            </a:r>
+            <a:r>
+              <a:rPr lang="en-US" dirty="0" smtClean="0"/>
+              <a:t> package</a:t>
+            </a:r>
+            <a:endParaRPr lang="en-US" dirty="0"/>
+          </a:p>
+        </p:txBody>
+      </p:sp>
+      <p:sp>
+        <p:nvSpPr>
+          <p:cNvPr id="3" name="Content Placeholder 2"/>
+          <p:cNvSpPr>
+            <a:spLocks noGrp="1"/>
+          </p:cNvSpPr>
+          <p:nvPr>
+            <p:ph sz="quarter" idx="1"/>
+          </p:nvPr>
+        </p:nvSpPr>
+        <p:spPr/>
+        <p:txBody>
+          <a:bodyPr>
+            <a:normAutofit/>
+          </a:bodyPr>
+          <a:lstStyle/>
+          <a:p>
+            <a:r>
+              <a:rPr lang="en-US" dirty="0" smtClean="0"/>
+              <a:t>`cabal install </a:t>
+            </a:r>
+            <a:r>
+              <a:rPr lang="en-US" dirty="0" err="1" smtClean="0"/>
+              <a:t>blatex</a:t>
+            </a:r>
+            <a:r>
+              <a:rPr lang="en-US" dirty="0" smtClean="0"/>
+              <a:t>`</a:t>
+            </a:r>
+            <a:endParaRPr lang="en-US" dirty="0" smtClean="0"/>
+          </a:p>
+        </p:txBody>
+      </p:sp>
+      <p:sp>
+        <p:nvSpPr>
+          <p:cNvPr id="9" name="TextBox 8"/>
+          <p:cNvSpPr txBox="1"/>
+          <p:nvPr/>
+        </p:nvSpPr>
+        <p:spPr>
+          <a:xfrm>
+            <a:off x="4438315" y="1069513"/>
+            <a:ext cx="588209" cy="400110"/>
+          </a:xfrm>
+          <a:prstGeom prst="rect">
+            <a:avLst/>
+          </a:prstGeom>
+          <a:noFill/>
+        </p:spPr>
+        <p:txBody>
+          <a:bodyPr wrap="square" rtlCol="0">
+            <a:spAutoFit/>
+          </a:bodyPr>
+          <a:lstStyle/>
+          <a:p>
+            <a:r>
+              <a:rPr lang="el-GR" sz="2000" dirty="0" smtClean="0"/>
+              <a:t>λ</a:t>
+            </a:r>
+            <a:endParaRPr lang="en-US" sz="2000" dirty="0"/>
+          </a:p>
+        </p:txBody>
+      </p:sp>
+      <p:pic>
+        <p:nvPicPr>
+          <p:cNvPr id="4" name="Picture 3" descr="Screen Shot 2016-05-31 at 3.14.56 PM.png"/>
+          <p:cNvPicPr>
+            <a:picLocks noChangeAspect="1"/>
+          </p:cNvPicPr>
+          <p:nvPr/>
+        </p:nvPicPr>
+        <p:blipFill>
+          <a:blip r:embed="rId2">
+            <a:extLst>
+              <a:ext uri="{28A0092B-C50C-407E-A947-70E740481C1C}">
+                <a14:useLocalDpi xmlns:a14="http://schemas.microsoft.com/office/drawing/2010/main" val="0"/>
+              </a:ext>
+            </a:extLst>
+          </a:blip>
+          <a:stretch>
+            <a:fillRect/>
+          </a:stretch>
+        </p:blipFill>
+        <p:spPr>
+          <a:xfrm>
+            <a:off x="1122949" y="2072106"/>
+            <a:ext cx="6897692" cy="3475790"/>
+          </a:xfrm>
+          <a:prstGeom prst="rect">
+            <a:avLst/>
+          </a:prstGeom>
+        </p:spPr>
+      </p:pic>
+    </p:spTree>
+    <p:extLst>
+      <p:ext uri="{BB962C8B-B14F-4D97-AF65-F5344CB8AC3E}">
+        <p14:creationId xmlns:p14="http://schemas.microsoft.com/office/powerpoint/2010/main" val="1499124322"/>
+      </p:ext>
+    </p:extLst>
+  </p:cSld>
+  <p:clrMapOvr>
+    <a:masterClrMapping/>
+  </p:clrMapOvr>
+  <p:timing>
+    <p:tnLst>
+      <p:par>
+        <p:cTn xmlns:p14="http://schemas.microsoft.com/office/powerpoint/2010/main" id="1" dur="indefinite" restart="never" nodeType="tmRoot"/>
+      </p:par>
+    </p:tnLst>
+  </p:timing>
+</p:sld>
+</file>
+
+<file path=ppt/slides/slide9.xml><?xml version="1.0" encoding="utf-8"?>
+<p:sld xmlns:a="http://schemas.openxmlformats.org/drawingml/2006/main" xmlns:r="http://schemas.openxmlformats.org/officeDocument/2006/relationships" xmlns:p="http://schemas.openxmlformats.org/presentationml/2006/main">
+  <p:cSld>
+    <p:spTree>
+      <p:nvGrpSpPr>
+        <p:cNvPr id="1" name=""/>
+        <p:cNvGrpSpPr/>
+        <p:nvPr/>
+      </p:nvGrpSpPr>
+      <p:grpSpPr>
+        <a:xfrm>
+          <a:off x="0" y="0"/>
+          <a:ext cx="0" cy="0"/>
+          <a:chOff x="0" y="0"/>
+          <a:chExt cx="0" cy="0"/>
+        </a:xfrm>
+      </p:grpSpPr>
+      <p:sp>
+        <p:nvSpPr>
+          <p:cNvPr id="2" name="Title 1"/>
+          <p:cNvSpPr>
+            <a:spLocks noGrp="1"/>
+          </p:cNvSpPr>
+          <p:nvPr>
+            <p:ph type="title"/>
+          </p:nvPr>
+        </p:nvSpPr>
+        <p:spPr/>
+        <p:txBody>
+          <a:bodyPr/>
+          <a:lstStyle/>
+          <a:p>
+            <a:r>
+              <a:rPr lang="en-US" dirty="0" smtClean="0"/>
+              <a:t>Initialize site</a:t>
+            </a:r>
+            <a:endParaRPr lang="en-US" dirty="0"/>
+          </a:p>
+        </p:txBody>
+      </p:sp>
+      <p:sp>
+        <p:nvSpPr>
+          <p:cNvPr id="3" name="Content Placeholder 2"/>
+          <p:cNvSpPr>
+            <a:spLocks noGrp="1"/>
+          </p:cNvSpPr>
+          <p:nvPr>
+            <p:ph sz="quarter" idx="1"/>
+          </p:nvPr>
+        </p:nvSpPr>
+        <p:spPr/>
+        <p:txBody>
+          <a:bodyPr>
+            <a:normAutofit/>
+          </a:bodyPr>
+          <a:lstStyle/>
+          <a:p>
+            <a:r>
+              <a:rPr lang="en-US" dirty="0" smtClean="0"/>
+              <a:t>`</a:t>
+            </a:r>
+            <a:r>
+              <a:rPr lang="en-US" dirty="0" err="1" smtClean="0"/>
+              <a:t>blatex</a:t>
+            </a:r>
+            <a:r>
+              <a:rPr lang="en-US" dirty="0" smtClean="0"/>
+              <a:t> </a:t>
+            </a:r>
+            <a:r>
+              <a:rPr lang="en-US" dirty="0" err="1" smtClean="0"/>
+              <a:t>init</a:t>
+            </a:r>
+            <a:r>
+              <a:rPr lang="en-US" dirty="0" smtClean="0"/>
+              <a:t>`</a:t>
+            </a:r>
+          </a:p>
+          <a:p>
+            <a:pPr lvl="1"/>
+            <a:r>
+              <a:rPr lang="en-US" dirty="0" smtClean="0"/>
+              <a:t>`</a:t>
+            </a:r>
+            <a:r>
+              <a:rPr lang="en-US" dirty="0" err="1" smtClean="0"/>
+              <a:t>index.html.bltx</a:t>
+            </a:r>
+            <a:r>
+              <a:rPr lang="en-US" dirty="0" smtClean="0"/>
+              <a:t>`</a:t>
+            </a:r>
+          </a:p>
+          <a:p>
+            <a:pPr lvl="1"/>
+            <a:r>
+              <a:rPr lang="en-US" dirty="0" smtClean="0"/>
+              <a:t>`posts/` directory</a:t>
+            </a:r>
+          </a:p>
+          <a:p>
+            <a:pPr lvl="1"/>
+            <a:r>
+              <a:rPr lang="en-US" dirty="0" smtClean="0"/>
+              <a:t>`posts/example-</a:t>
+            </a:r>
+            <a:r>
+              <a:rPr lang="en-US" dirty="0" err="1" smtClean="0"/>
+              <a:t>post.tex</a:t>
+            </a:r>
+            <a:r>
+              <a:rPr lang="en-US" dirty="0" smtClean="0"/>
+              <a:t>` file</a:t>
+            </a:r>
+          </a:p>
+          <a:p>
+            <a:pPr lvl="1"/>
+            <a:r>
+              <a:rPr lang="en-US" dirty="0" smtClean="0"/>
+              <a:t>`posts/example-</a:t>
+            </a:r>
+            <a:r>
+              <a:rPr lang="en-US" dirty="0" err="1" smtClean="0"/>
+              <a:t>post.pdf</a:t>
+            </a:r>
+            <a:r>
+              <a:rPr lang="en-US" dirty="0" smtClean="0"/>
+              <a:t>` file</a:t>
+            </a:r>
+          </a:p>
+        </p:txBody>
+      </p:sp>
+      <p:sp>
+        <p:nvSpPr>
+          <p:cNvPr id="9" name="TextBox 8"/>
+          <p:cNvSpPr txBox="1"/>
+          <p:nvPr/>
+        </p:nvSpPr>
+        <p:spPr>
+          <a:xfrm>
+            <a:off x="4438315" y="1069513"/>
+            <a:ext cx="588209" cy="400110"/>
+          </a:xfrm>
+          <a:prstGeom prst="rect">
+            <a:avLst/>
+          </a:prstGeom>
+          <a:noFill/>
+        </p:spPr>
+        <p:txBody>
+          <a:bodyPr wrap="square" rtlCol="0">
+            <a:spAutoFit/>
+          </a:bodyPr>
+          <a:lstStyle/>
+          <a:p>
+            <a:r>
+              <a:rPr lang="el-GR" sz="2000" dirty="0" smtClean="0"/>
+              <a:t>λ</a:t>
+            </a:r>
+            <a:endParaRPr lang="en-US" sz="2000" dirty="0"/>
+          </a:p>
+        </p:txBody>
+      </p:sp>
+    </p:spTree>
+    <p:extLst>
+      <p:ext uri="{BB962C8B-B14F-4D97-AF65-F5344CB8AC3E}">
+        <p14:creationId xmlns:p14="http://schemas.microsoft.com/office/powerpoint/2010/main" val="1277433532"/>
+      </p:ext>
+    </p:extLst>
+  </p:cSld>
+  <p:clrMapOvr>
+    <a:masterClrMapping/>
+  </p:clrMapOvr>
+  <p:timing>
+    <p:tnLst>
+      <p:par>
+        <p:cTn xmlns:p14="http://schemas.microsoft.com/office/powerpoint/2010/main" id="1" dur="indefinite" restart="never" nodeType="tmRoot"/>
+      </p:par>
+    </p:tnLst>
+  </p:timing>
 </p:sld>
 </file>
 
@@ -6709,4 +8956,324 @@
   </a:objectDefaults>
   <a:extraClrSchemeLst/>
 </a:theme>
+</file>
+
+<file path=ppt/theme/theme2.xml><?xml version="1.0" encoding="utf-8"?>
+<a:theme xmlns:a="http://schemas.openxmlformats.org/drawingml/2006/main" name="Office Theme">
+  <a:themeElements>
+    <a:clrScheme name="Office">
+      <a:dk1>
+        <a:sysClr val="windowText" lastClr="000000"/>
+      </a:dk1>
+      <a:lt1>
+        <a:sysClr val="window" lastClr="FFFFFF"/>
+      </a:lt1>
+      <a:dk2>
+        <a:srgbClr val="1F497D"/>
+      </a:dk2>
+      <a:lt2>
+        <a:srgbClr val="EEECE1"/>
+      </a:lt2>
+      <a:accent1>
+        <a:srgbClr val="4F81BD"/>
+      </a:accent1>
+      <a:accent2>
+        <a:srgbClr val="C0504D"/>
+      </a:accent2>
+      <a:accent3>
+        <a:srgbClr val="9BBB59"/>
+      </a:accent3>
+      <a:accent4>
+        <a:srgbClr val="8064A2"/>
+      </a:accent4>
+      <a:accent5>
+        <a:srgbClr val="4BACC6"/>
+      </a:accent5>
+      <a:accent6>
+        <a:srgbClr val="F79646"/>
+      </a:accent6>
+      <a:hlink>
+        <a:srgbClr val="0000FF"/>
+      </a:hlink>
+      <a:folHlink>
+        <a:srgbClr val="800080"/>
+      </a:folHlink>
+    </a:clrScheme>
+    <a:fontScheme name="Office">
+      <a:majorFont>
+        <a:latin typeface="Calibri"/>
+        <a:ea typeface=""/>
+        <a:cs typeface=""/>
+        <a:font script="Jpan" typeface="ＭＳ Ｐゴシック"/>
+        <a:font script="Hang" typeface="맑은 고딕"/>
+        <a:font script="Hans" typeface="宋体"/>
+        <a:font script="Hant" typeface="新細明體"/>
+        <a:font script="Arab" typeface="Times New Roman"/>
+        <a:font script="Hebr" typeface="Times New Roman"/>
+        <a:font script="Thai" typeface="Angsana New"/>
+        <a:font script="Ethi" typeface="Nyala"/>
+        <a:font script="Beng" typeface="Vrinda"/>
+        <a:font script="Gujr" typeface="Shruti"/>
+        <a:font script="Khmr" typeface="MoolBoran"/>
+        <a:font script="Knda" typeface="Tunga"/>
+        <a:font script="Guru" typeface="Raavi"/>
+        <a:font script="Cans" typeface="Euphemia"/>
+        <a:font script="Cher" typeface="Plantagenet Cherokee"/>
+        <a:font script="Yiii" typeface="Microsoft Yi Baiti"/>
+        <a:font script="Tibt" typeface="Microsoft Himalaya"/>
+        <a:font script="Thaa" typeface="MV Boli"/>
+        <a:font script="Deva" typeface="Mangal"/>
+        <a:font script="Telu" typeface="Gautami"/>
+        <a:font script="Taml" typeface="Latha"/>
+        <a:font script="Syrc" typeface="Estrangelo Edessa"/>
+        <a:font script="Orya" typeface="Kalinga"/>
+        <a:font script="Mlym" typeface="Kartika"/>
+        <a:font script="Laoo" typeface="DokChampa"/>
+        <a:font script="Sinh" typeface="Iskoola Pota"/>
+        <a:font script="Mong" typeface="Mongolian Baiti"/>
+        <a:font script="Viet" typeface="Times New Roman"/>
+        <a:font script="Uigh" typeface="Microsoft Uighur"/>
+        <a:font script="Geor" typeface="Sylfaen"/>
+      </a:majorFont>
+      <a:minorFont>
+        <a:latin typeface="Calibri"/>
+        <a:ea typeface=""/>
+        <a:cs typeface=""/>
+        <a:font script="Jpan" typeface="ＭＳ Ｐゴシック"/>
+        <a:font script="Hang" typeface="맑은 고딕"/>
+        <a:font script="Hans" typeface="宋体"/>
+        <a:font script="Hant" typeface="新細明體"/>
+        <a:font script="Arab" typeface="Arial"/>
+        <a:font script="Hebr" typeface="Arial"/>
+        <a:font script="Thai" typeface="Cordia New"/>
+        <a:font script="Ethi" typeface="Nyala"/>
+        <a:font script="Beng" typeface="Vrinda"/>
+        <a:font script="Gujr" typeface="Shruti"/>
+        <a:font script="Khmr" typeface="DaunPenh"/>
+        <a:font script="Knda" typeface="Tunga"/>
+        <a:font script="Guru" typeface="Raavi"/>
+        <a:font script="Cans" typeface="Euphemia"/>
+        <a:font script="Cher" typeface="Plantagenet Cherokee"/>
+        <a:font script="Yiii" typeface="Microsoft Yi Baiti"/>
+        <a:font script="Tibt" typeface="Microsoft Himalaya"/>
+        <a:font script="Thaa" typeface="MV Boli"/>
+        <a:font script="Deva" typeface="Mangal"/>
+        <a:font script="Telu" typeface="Gautami"/>
+        <a:font script="Taml" typeface="Latha"/>
+        <a:font script="Syrc" typeface="Estrangelo Edessa"/>
+        <a:font script="Orya" typeface="Kalinga"/>
+        <a:font script="Mlym" typeface="Kartika"/>
+        <a:font script="Laoo" typeface="DokChampa"/>
+        <a:font script="Sinh" typeface="Iskoola Pota"/>
+        <a:font script="Mong" typeface="Mongolian Baiti"/>
+        <a:font script="Viet" typeface="Arial"/>
+        <a:font script="Uigh" typeface="Microsoft Uighur"/>
+        <a:font script="Geor" typeface="Sylfaen"/>
+      </a:minorFont>
+    </a:fontScheme>
+    <a:fmtScheme name="Office">
+      <a:fillStyleLst>
+        <a:solidFill>
+          <a:schemeClr val="phClr"/>
+        </a:solidFill>
+        <a:gradFill rotWithShape="1">
+          <a:gsLst>
+            <a:gs pos="0">
+              <a:schemeClr val="phClr">
+                <a:tint val="50000"/>
+                <a:satMod val="300000"/>
+              </a:schemeClr>
+            </a:gs>
+            <a:gs pos="35000">
+              <a:schemeClr val="phClr">
+                <a:tint val="37000"/>
+                <a:satMod val="300000"/>
+              </a:schemeClr>
+            </a:gs>
+            <a:gs pos="100000">
+              <a:schemeClr val="phClr">
+                <a:tint val="15000"/>
+                <a:satMod val="350000"/>
+              </a:schemeClr>
+            </a:gs>
+          </a:gsLst>
+          <a:lin ang="16200000" scaled="1"/>
+        </a:gradFill>
+        <a:gradFill rotWithShape="1">
+          <a:gsLst>
+            <a:gs pos="0">
+              <a:schemeClr val="phClr">
+                <a:tint val="100000"/>
+                <a:shade val="100000"/>
+                <a:satMod val="130000"/>
+              </a:schemeClr>
+            </a:gs>
+            <a:gs pos="100000">
+              <a:schemeClr val="phClr">
+                <a:tint val="50000"/>
+                <a:shade val="100000"/>
+                <a:satMod val="350000"/>
+              </a:schemeClr>
+            </a:gs>
+          </a:gsLst>
+          <a:lin ang="16200000" scaled="0"/>
+        </a:gradFill>
+      </a:fillStyleLst>
+      <a:lnStyleLst>
+        <a:ln w="9525" cap="flat" cmpd="sng" algn="ctr">
+          <a:solidFill>
+            <a:schemeClr val="phClr">
+              <a:shade val="95000"/>
+              <a:satMod val="105000"/>
+            </a:schemeClr>
+          </a:solidFill>
+          <a:prstDash val="solid"/>
+        </a:ln>
+        <a:ln w="25400" cap="flat" cmpd="sng" algn="ctr">
+          <a:solidFill>
+            <a:schemeClr val="phClr"/>
+          </a:solidFill>
+          <a:prstDash val="solid"/>
+        </a:ln>
+        <a:ln w="38100" cap="flat" cmpd="sng" algn="ctr">
+          <a:solidFill>
+            <a:schemeClr val="phClr"/>
+          </a:solidFill>
+          <a:prstDash val="solid"/>
+        </a:ln>
+      </a:lnStyleLst>
+      <a:effectStyleLst>
+        <a:effectStyle>
+          <a:effectLst>
+            <a:outerShdw blurRad="40000" dist="20000" dir="5400000" rotWithShape="0">
+              <a:srgbClr val="000000">
+                <a:alpha val="38000"/>
+              </a:srgbClr>
+            </a:outerShdw>
+          </a:effectLst>
+        </a:effectStyle>
+        <a:effectStyle>
+          <a:effectLst>
+            <a:outerShdw blurRad="40000" dist="23000" dir="5400000" rotWithShape="0">
+              <a:srgbClr val="000000">
+                <a:alpha val="35000"/>
+              </a:srgbClr>
+            </a:outerShdw>
+          </a:effectLst>
+        </a:effectStyle>
+        <a:effectStyle>
+          <a:effectLst>
+            <a:outerShdw blurRad="40000" dist="23000" dir="5400000" rotWithShape="0">
+              <a:srgbClr val="000000">
+                <a:alpha val="35000"/>
+              </a:srgbClr>
+            </a:outerShdw>
+          </a:effectLst>
+          <a:scene3d>
+            <a:camera prst="orthographicFront">
+              <a:rot lat="0" lon="0" rev="0"/>
+            </a:camera>
+            <a:lightRig rig="threePt" dir="t">
+              <a:rot lat="0" lon="0" rev="1200000"/>
+            </a:lightRig>
+          </a:scene3d>
+          <a:sp3d>
+            <a:bevelT w="63500" h="25400"/>
+          </a:sp3d>
+        </a:effectStyle>
+      </a:effectStyleLst>
+      <a:bgFillStyleLst>
+        <a:solidFill>
+          <a:schemeClr val="phClr"/>
+        </a:solidFill>
+        <a:gradFill rotWithShape="1">
+          <a:gsLst>
+            <a:gs pos="0">
+              <a:schemeClr val="phClr">
+                <a:tint val="40000"/>
+                <a:satMod val="350000"/>
+              </a:schemeClr>
+            </a:gs>
+            <a:gs pos="40000">
+              <a:schemeClr val="phClr">
+                <a:tint val="45000"/>
+                <a:shade val="99000"/>
+                <a:satMod val="350000"/>
+              </a:schemeClr>
+            </a:gs>
+            <a:gs pos="100000">
+              <a:schemeClr val="phClr">
+                <a:shade val="20000"/>
+                <a:satMod val="255000"/>
+              </a:schemeClr>
+            </a:gs>
+          </a:gsLst>
+          <a:path path="circle">
+            <a:fillToRect l="50000" t="-80000" r="50000" b="180000"/>
+          </a:path>
+        </a:gradFill>
+        <a:gradFill rotWithShape="1">
+          <a:gsLst>
+            <a:gs pos="0">
+              <a:schemeClr val="phClr">
+                <a:tint val="80000"/>
+                <a:satMod val="300000"/>
+              </a:schemeClr>
+            </a:gs>
+            <a:gs pos="100000">
+              <a:schemeClr val="phClr">
+                <a:shade val="30000"/>
+                <a:satMod val="200000"/>
+              </a:schemeClr>
+            </a:gs>
+          </a:gsLst>
+          <a:path path="circle">
+            <a:fillToRect l="50000" t="50000" r="50000" b="50000"/>
+          </a:path>
+        </a:gradFill>
+      </a:bgFillStyleLst>
+    </a:fmtScheme>
+  </a:themeElements>
+  <a:objectDefaults>
+    <a:spDef>
+      <a:spPr/>
+      <a:bodyPr/>
+      <a:lstStyle/>
+      <a:style>
+        <a:lnRef idx="1">
+          <a:schemeClr val="accent1"/>
+        </a:lnRef>
+        <a:fillRef idx="3">
+          <a:schemeClr val="accent1"/>
+        </a:fillRef>
+        <a:effectRef idx="2">
+          <a:schemeClr val="accent1"/>
+        </a:effectRef>
+        <a:fontRef idx="minor">
+          <a:schemeClr val="lt1"/>
+        </a:fontRef>
+      </a:style>
+    </a:spDef>
+    <a:lnDef>
+      <a:spPr/>
+      <a:bodyPr/>
+      <a:lstStyle/>
+      <a:style>
+        <a:lnRef idx="2">
+          <a:schemeClr val="accent1"/>
+        </a:lnRef>
+        <a:fillRef idx="0">
+          <a:schemeClr val="accent1"/>
+        </a:fillRef>
+        <a:effectRef idx="1">
+          <a:schemeClr val="accent1"/>
+        </a:effectRef>
+        <a:fontRef idx="minor">
+          <a:schemeClr val="tx1"/>
+        </a:fontRef>
+      </a:style>
+    </a:lnDef>
+  </a:objectDefaults>
+  <a:extraClrSchemeLst/>
+</a:theme>
 </file>
</xml_diff>

<commit_message>
First draft of complete presentation
</commit_message>
<xml_diff>
--- a/Presentations/Final_Presentation.pptx
+++ b/Presentations/Final_Presentation.pptx
@@ -5,24 +5,22 @@
     <p:sldMasterId id="2147483697" r:id="rId1"/>
   </p:sldMasterIdLst>
   <p:notesMasterIdLst>
-    <p:notesMasterId r:id="rId17"/>
+    <p:notesMasterId r:id="rId15"/>
   </p:notesMasterIdLst>
   <p:sldIdLst>
     <p:sldId id="268" r:id="rId2"/>
-    <p:sldId id="273" r:id="rId3"/>
-    <p:sldId id="269" r:id="rId4"/>
-    <p:sldId id="271" r:id="rId5"/>
-    <p:sldId id="272" r:id="rId6"/>
-    <p:sldId id="270" r:id="rId7"/>
-    <p:sldId id="274" r:id="rId8"/>
-    <p:sldId id="275" r:id="rId9"/>
-    <p:sldId id="276" r:id="rId10"/>
-    <p:sldId id="277" r:id="rId11"/>
-    <p:sldId id="278" r:id="rId12"/>
-    <p:sldId id="279" r:id="rId13"/>
-    <p:sldId id="280" r:id="rId14"/>
-    <p:sldId id="281" r:id="rId15"/>
-    <p:sldId id="282" r:id="rId16"/>
+    <p:sldId id="270" r:id="rId3"/>
+    <p:sldId id="273" r:id="rId4"/>
+    <p:sldId id="274" r:id="rId5"/>
+    <p:sldId id="275" r:id="rId6"/>
+    <p:sldId id="276" r:id="rId7"/>
+    <p:sldId id="277" r:id="rId8"/>
+    <p:sldId id="278" r:id="rId9"/>
+    <p:sldId id="283" r:id="rId10"/>
+    <p:sldId id="279" r:id="rId11"/>
+    <p:sldId id="280" r:id="rId12"/>
+    <p:sldId id="281" r:id="rId13"/>
+    <p:sldId id="284" r:id="rId14"/>
   </p:sldIdLst>
   <p:sldSz cx="9144000" cy="6858000" type="screen4x3"/>
   <p:notesSz cx="6858000" cy="9144000"/>
@@ -472,102 +470,6 @@
     </a:lvl9pPr>
   </p:notesStyle>
 </p:notesMaster>
-</file>
-
-<file path=ppt/notesSlides/notesSlide1.xml><?xml version="1.0" encoding="utf-8"?>
-<p:notes xmlns:a="http://schemas.openxmlformats.org/drawingml/2006/main" xmlns:r="http://schemas.openxmlformats.org/officeDocument/2006/relationships" xmlns:p="http://schemas.openxmlformats.org/presentationml/2006/main">
-  <p:cSld>
-    <p:spTree>
-      <p:nvGrpSpPr>
-        <p:cNvPr id="1" name=""/>
-        <p:cNvGrpSpPr/>
-        <p:nvPr/>
-      </p:nvGrpSpPr>
-      <p:grpSpPr>
-        <a:xfrm>
-          <a:off x="0" y="0"/>
-          <a:ext cx="0" cy="0"/>
-          <a:chOff x="0" y="0"/>
-          <a:chExt cx="0" cy="0"/>
-        </a:xfrm>
-      </p:grpSpPr>
-      <p:sp>
-        <p:nvSpPr>
-          <p:cNvPr id="2" name="Slide Image Placeholder 1"/>
-          <p:cNvSpPr>
-            <a:spLocks noGrp="1" noRot="1" noChangeAspect="1"/>
-          </p:cNvSpPr>
-          <p:nvPr>
-            <p:ph type="sldImg"/>
-          </p:nvPr>
-        </p:nvSpPr>
-        <p:spPr/>
-      </p:sp>
-      <p:sp>
-        <p:nvSpPr>
-          <p:cNvPr id="3" name="Notes Placeholder 2"/>
-          <p:cNvSpPr>
-            <a:spLocks noGrp="1"/>
-          </p:cNvSpPr>
-          <p:nvPr>
-            <p:ph type="body" idx="1"/>
-          </p:nvPr>
-        </p:nvSpPr>
-        <p:spPr/>
-        <p:txBody>
-          <a:bodyPr/>
-          <a:lstStyle/>
-          <a:p>
-            <a:r>
-              <a:rPr lang="en-US" dirty="0" smtClean="0"/>
-              <a:t>http://</a:t>
-            </a:r>
-            <a:r>
-              <a:rPr lang="en-US" dirty="0" err="1" smtClean="0"/>
-              <a:t>www.hypothesisjournal.com</a:t>
-            </a:r>
-            <a:r>
-              <a:rPr lang="en-US" dirty="0" smtClean="0"/>
-              <a:t>/?p=571</a:t>
-            </a:r>
-            <a:endParaRPr lang="en-US" dirty="0"/>
-          </a:p>
-        </p:txBody>
-      </p:sp>
-      <p:sp>
-        <p:nvSpPr>
-          <p:cNvPr id="4" name="Slide Number Placeholder 3"/>
-          <p:cNvSpPr>
-            <a:spLocks noGrp="1"/>
-          </p:cNvSpPr>
-          <p:nvPr>
-            <p:ph type="sldNum" sz="quarter" idx="10"/>
-          </p:nvPr>
-        </p:nvSpPr>
-        <p:spPr/>
-        <p:txBody>
-          <a:bodyPr/>
-          <a:lstStyle/>
-          <a:p>
-            <a:fld id="{8C82A14D-CD87-3040-B8A6-05D9C670C6BA}" type="slidenum">
-              <a:rPr lang="en-US" smtClean="0"/>
-              <a:t>3</a:t>
-            </a:fld>
-            <a:endParaRPr lang="en-US"/>
-          </a:p>
-        </p:txBody>
-      </p:sp>
-    </p:spTree>
-    <p:extLst>
-      <p:ext uri="{BB962C8B-B14F-4D97-AF65-F5344CB8AC3E}">
-        <p14:creationId xmlns:p14="http://schemas.microsoft.com/office/powerpoint/2010/main" val="974433049"/>
-      </p:ext>
-    </p:extLst>
-  </p:cSld>
-  <p:clrMapOvr>
-    <a:masterClrMapping/>
-  </p:clrMapOvr>
-</p:notes>
 </file>
 
 <file path=ppt/slideLayouts/slideLayout1.xml><?xml version="1.0" encoding="utf-8"?>
@@ -6640,6 +6542,13 @@
   <p:clrMapOvr>
     <a:masterClrMapping/>
   </p:clrMapOvr>
+  <p:timing>
+    <p:tnLst>
+      <p:par>
+        <p:cTn xmlns:p14="http://schemas.microsoft.com/office/powerpoint/2010/main" id="1" dur="indefinite" restart="never" nodeType="tmRoot"/>
+      </p:par>
+    </p:tnLst>
+  </p:timing>
 </p:sld>
 </file>
 
@@ -6677,7 +6586,7 @@
           <a:p>
             <a:r>
               <a:rPr lang="en-US" dirty="0" smtClean="0"/>
-              <a:t>Write/edit posts</a:t>
+              <a:t>Compile your static site</a:t>
             </a:r>
             <a:endParaRPr lang="en-US" dirty="0"/>
           </a:p>
@@ -6702,32 +6611,60 @@
           <a:p>
             <a:r>
               <a:rPr lang="en-US" dirty="0" smtClean="0"/>
-              <a:t>Write and compile </a:t>
+              <a:t>`</a:t>
             </a:r>
             <a:r>
               <a:rPr lang="en-US" dirty="0" err="1" smtClean="0"/>
-              <a:t>LaTeX</a:t>
+              <a:t>blatex</a:t>
             </a:r>
             <a:r>
               <a:rPr lang="en-US" dirty="0" smtClean="0"/>
-              <a:t> documents as usual</a:t>
+              <a:t> build`</a:t>
             </a:r>
           </a:p>
           <a:p>
             <a:pPr lvl="1"/>
             <a:r>
+              <a:rPr lang="en-US" dirty="0" smtClean="0"/>
+              <a:t>Looks in `posts/` directory</a:t>
+            </a:r>
+            <a:r>
+              <a:rPr lang="en-US" dirty="0"/>
+              <a:t> </a:t>
+            </a:r>
+            <a:r>
+              <a:rPr lang="en-US" dirty="0" smtClean="0"/>
+              <a:t>for posts</a:t>
+            </a:r>
+          </a:p>
+          <a:p>
+            <a:pPr lvl="1"/>
+            <a:r>
+              <a:rPr lang="en-US" dirty="0" smtClean="0"/>
+              <a:t>Looks in `</a:t>
+            </a:r>
+            <a:r>
               <a:rPr lang="en-US" dirty="0" err="1" smtClean="0"/>
-              <a:t>BlaTeX</a:t>
+              <a:t>index.html.bltx</a:t>
             </a:r>
             <a:r>
               <a:rPr lang="en-US" dirty="0" smtClean="0"/>
-              <a:t> looks in the `posts/` directory</a:t>
-            </a:r>
-          </a:p>
-          <a:p>
+              <a:t>` for site template</a:t>
+            </a:r>
+          </a:p>
+          <a:p>
+            <a:pPr lvl="1"/>
             <a:r>
               <a:rPr lang="en-US" dirty="0" smtClean="0"/>
-              <a:t>No interruption in typical workflow</a:t>
+              <a:t>Produces a final static site in `</a:t>
+            </a:r>
+            <a:r>
+              <a:rPr lang="en-US" dirty="0" err="1" smtClean="0"/>
+              <a:t>index.html</a:t>
+            </a:r>
+            <a:r>
+              <a:rPr lang="en-US" dirty="0" smtClean="0"/>
+              <a:t>`</a:t>
             </a:r>
           </a:p>
         </p:txBody>
@@ -6765,7 +6702,7 @@
     </p:spTree>
     <p:extLst>
       <p:ext uri="{BB962C8B-B14F-4D97-AF65-F5344CB8AC3E}">
-        <p14:creationId xmlns:p14="http://schemas.microsoft.com/office/powerpoint/2010/main" val="2199714623"/>
+        <p14:creationId xmlns:p14="http://schemas.microsoft.com/office/powerpoint/2010/main" val="1683762537"/>
       </p:ext>
     </p:extLst>
   </p:cSld>
@@ -6816,7 +6753,7 @@
           <a:p>
             <a:r>
               <a:rPr lang="en-US" dirty="0" smtClean="0"/>
-              <a:t>Design a static website</a:t>
+              <a:t>Possible Errors</a:t>
             </a:r>
             <a:endParaRPr lang="en-US" dirty="0"/>
           </a:p>
@@ -6841,59 +6778,15 @@
           <a:p>
             <a:r>
               <a:rPr lang="en-US" dirty="0" smtClean="0"/>
-              <a:t>Build your website in the `</a:t>
+              <a:t>`Either` as an instance of an Applicative </a:t>
             </a:r>
             <a:r>
               <a:rPr lang="en-US" dirty="0" err="1" smtClean="0"/>
-              <a:t>index.html.bltx</a:t>
+              <a:t>Functor</a:t>
             </a:r>
             <a:r>
               <a:rPr lang="en-US" dirty="0" smtClean="0"/>
-              <a:t>` file</a:t>
-            </a:r>
-          </a:p>
-          <a:p>
-            <a:pPr lvl="1"/>
-            <a:r>
-              <a:rPr lang="en-US" dirty="0" err="1" smtClean="0"/>
-              <a:t>BlaTeX</a:t>
-            </a:r>
-            <a:r>
-              <a:rPr lang="en-US" dirty="0" smtClean="0"/>
-              <a:t> will use this template file to build your static site</a:t>
-            </a:r>
-          </a:p>
-          <a:p>
-            <a:pPr lvl="1"/>
-            <a:r>
-              <a:rPr lang="en-US" dirty="0" smtClean="0"/>
-              <a:t>Looks for the following code: `&lt;</a:t>
-            </a:r>
-            <a:r>
-              <a:rPr lang="en-US" dirty="0" err="1" smtClean="0"/>
-              <a:t>ul</a:t>
-            </a:r>
-            <a:r>
-              <a:rPr lang="en-US" dirty="0"/>
               <a:t> </a:t>
-            </a:r>
-            <a:r>
-              <a:rPr lang="en-US" dirty="0" smtClean="0"/>
-              <a:t>id=“blog-posts”&gt;&lt;/</a:t>
-            </a:r>
-            <a:r>
-              <a:rPr lang="en-US" dirty="0" err="1" smtClean="0"/>
-              <a:t>ul</a:t>
-            </a:r>
-            <a:r>
-              <a:rPr lang="en-US" dirty="0" smtClean="0"/>
-              <a:t>&gt;`</a:t>
-            </a:r>
-          </a:p>
-          <a:p>
-            <a:r>
-              <a:rPr lang="en-US" dirty="0" smtClean="0"/>
-              <a:t>No interruption of typical workflow</a:t>
             </a:r>
           </a:p>
         </p:txBody>
@@ -6928,10 +6821,40 @@
           </a:p>
         </p:txBody>
       </p:sp>
+      <p:pic>
+        <p:nvPicPr>
+          <p:cNvPr id="7" name="Picture 6" descr="Screen Shot 2016-05-31 at 3.13.15 PM.png"/>
+          <p:cNvPicPr>
+            <a:picLocks noChangeAspect="1"/>
+          </p:cNvPicPr>
+          <p:nvPr/>
+        </p:nvPicPr>
+        <p:blipFill>
+          <a:blip r:embed="rId2">
+            <a:extLst>
+              <a:ext uri="{28A0092B-C50C-407E-A947-70E740481C1C}">
+                <a14:useLocalDpi xmlns:a14="http://schemas.microsoft.com/office/drawing/2010/main" val="0"/>
+              </a:ext>
+            </a:extLst>
+          </a:blip>
+          <a:stretch>
+            <a:fillRect/>
+          </a:stretch>
+        </p:blipFill>
+        <p:spPr>
+          <a:xfrm>
+            <a:off x="1249947" y="2620210"/>
+            <a:ext cx="6622765" cy="2869865"/>
+          </a:xfrm>
+          <a:prstGeom prst="rect">
+            <a:avLst/>
+          </a:prstGeom>
+        </p:spPr>
+      </p:pic>
     </p:spTree>
     <p:extLst>
       <p:ext uri="{BB962C8B-B14F-4D97-AF65-F5344CB8AC3E}">
-        <p14:creationId xmlns:p14="http://schemas.microsoft.com/office/powerpoint/2010/main" val="3922255865"/>
+        <p14:creationId xmlns:p14="http://schemas.microsoft.com/office/powerpoint/2010/main" val="2666914859"/>
       </p:ext>
     </p:extLst>
   </p:cSld>
@@ -6982,7 +6905,7 @@
           <a:p>
             <a:r>
               <a:rPr lang="en-US" dirty="0" smtClean="0"/>
-              <a:t>Compile your static site</a:t>
+              <a:t>Compiled Site</a:t>
             </a:r>
             <a:endParaRPr lang="en-US" dirty="0"/>
           </a:p>
@@ -7006,61 +6929,12 @@
           <a:lstStyle/>
           <a:p>
             <a:r>
+              <a:rPr lang="en-US" dirty="0" err="1" smtClean="0"/>
+              <a:t>Open`index.html</a:t>
+            </a:r>
+            <a:r>
               <a:rPr lang="en-US" dirty="0" smtClean="0"/>
-              <a:t>`</a:t>
-            </a:r>
-            <a:r>
-              <a:rPr lang="en-US" dirty="0" err="1" smtClean="0"/>
-              <a:t>blatex</a:t>
-            </a:r>
-            <a:r>
-              <a:rPr lang="en-US" dirty="0" smtClean="0"/>
-              <a:t> build`</a:t>
-            </a:r>
-          </a:p>
-          <a:p>
-            <a:pPr lvl="1"/>
-            <a:r>
-              <a:rPr lang="en-US" dirty="0" smtClean="0"/>
-              <a:t>Looks in `posts/` directory</a:t>
-            </a:r>
-            <a:r>
-              <a:rPr lang="en-US" dirty="0"/>
-              <a:t> </a:t>
-            </a:r>
-            <a:r>
-              <a:rPr lang="en-US" dirty="0" smtClean="0"/>
-              <a:t>for posts</a:t>
-            </a:r>
-          </a:p>
-          <a:p>
-            <a:pPr lvl="1"/>
-            <a:r>
-              <a:rPr lang="en-US" dirty="0" smtClean="0"/>
-              <a:t>Looks in `</a:t>
-            </a:r>
-            <a:r>
-              <a:rPr lang="en-US" dirty="0" err="1" smtClean="0"/>
-              <a:t>index.html.bltx</a:t>
-            </a:r>
-            <a:r>
-              <a:rPr lang="en-US" dirty="0" smtClean="0"/>
-              <a:t>` for site template</a:t>
-            </a:r>
-          </a:p>
-          <a:p>
-            <a:pPr lvl="1"/>
-            <a:r>
-              <a:rPr lang="en-US" dirty="0" smtClean="0"/>
-              <a:t>Produces a final static site in `</a:t>
-            </a:r>
-            <a:r>
-              <a:rPr lang="en-US" dirty="0" err="1" smtClean="0"/>
-              <a:t>index.html</a:t>
-            </a:r>
-            <a:r>
-              <a:rPr lang="en-US" dirty="0" smtClean="0"/>
-              <a:t>`</a:t>
+              <a:t>` in browser</a:t>
             </a:r>
           </a:p>
         </p:txBody>
@@ -7095,10 +6969,40 @@
           </a:p>
         </p:txBody>
       </p:sp>
+      <p:pic>
+        <p:nvPicPr>
+          <p:cNvPr id="5" name="Picture 4" descr="BlaTeX_screenshot.png"/>
+          <p:cNvPicPr>
+            <a:picLocks noChangeAspect="1"/>
+          </p:cNvPicPr>
+          <p:nvPr/>
+        </p:nvPicPr>
+        <p:blipFill>
+          <a:blip r:embed="rId2">
+            <a:extLst>
+              <a:ext uri="{28A0092B-C50C-407E-A947-70E740481C1C}">
+                <a14:useLocalDpi xmlns:a14="http://schemas.microsoft.com/office/drawing/2010/main" val="0"/>
+              </a:ext>
+            </a:extLst>
+          </a:blip>
+          <a:stretch>
+            <a:fillRect/>
+          </a:stretch>
+        </p:blipFill>
+        <p:spPr>
+          <a:xfrm>
+            <a:off x="975894" y="2150352"/>
+            <a:ext cx="7305100" cy="4109119"/>
+          </a:xfrm>
+          <a:prstGeom prst="rect">
+            <a:avLst/>
+          </a:prstGeom>
+        </p:spPr>
+      </p:pic>
     </p:spTree>
     <p:extLst>
       <p:ext uri="{BB962C8B-B14F-4D97-AF65-F5344CB8AC3E}">
-        <p14:creationId xmlns:p14="http://schemas.microsoft.com/office/powerpoint/2010/main" val="1683762537"/>
+        <p14:creationId xmlns:p14="http://schemas.microsoft.com/office/powerpoint/2010/main" val="2979430487"/>
       </p:ext>
     </p:extLst>
   </p:cSld>
@@ -7148,8 +7052,16 @@
           <a:lstStyle/>
           <a:p>
             <a:r>
+              <a:rPr lang="en-US" dirty="0"/>
+              <a:t>Public </a:t>
+            </a:r>
+            <a:r>
               <a:rPr lang="en-US" dirty="0" smtClean="0"/>
-              <a:t>Possible Errors</a:t>
+              <a:t>Reception of </a:t>
+            </a:r>
+            <a:r>
+              <a:rPr lang="en-US" dirty="0" err="1" smtClean="0"/>
+              <a:t>BlaTeX</a:t>
             </a:r>
             <a:endParaRPr lang="en-US" dirty="0"/>
           </a:p>
@@ -7173,17 +7085,39 @@
           <a:lstStyle/>
           <a:p>
             <a:r>
-              <a:rPr lang="en-US" dirty="0" smtClean="0"/>
-              <a:t>`Either` as an instance of an Applicative </a:t>
-            </a:r>
-            <a:r>
-              <a:rPr lang="en-US" dirty="0" err="1" smtClean="0"/>
-              <a:t>Functor</a:t>
-            </a:r>
-            <a:r>
-              <a:rPr lang="en-US" dirty="0" smtClean="0"/>
-              <a:t> </a:t>
-            </a:r>
+              <a:rPr lang="en-US" dirty="0" err="1"/>
+              <a:t>Github</a:t>
+            </a:r>
+            <a:endParaRPr lang="en-US" dirty="0"/>
+          </a:p>
+          <a:p>
+            <a:r>
+              <a:rPr lang="en-US" dirty="0"/>
+              <a:t>Facebook</a:t>
+            </a:r>
+          </a:p>
+          <a:p>
+            <a:r>
+              <a:rPr lang="en-US" dirty="0"/>
+              <a:t>DC Hack and Tell </a:t>
+            </a:r>
+          </a:p>
+          <a:p>
+            <a:r>
+              <a:rPr lang="en-US" dirty="0" err="1"/>
+              <a:t>tjSTAR</a:t>
+            </a:r>
+            <a:r>
+              <a:rPr lang="en-US" dirty="0"/>
+              <a:t> Reception</a:t>
+            </a:r>
+          </a:p>
+          <a:p>
+            <a:r>
+              <a:rPr lang="en-US" dirty="0" err="1"/>
+              <a:t>tjSTAR</a:t>
+            </a:r>
+            <a:endParaRPr lang="en-US" dirty="0"/>
           </a:p>
         </p:txBody>
       </p:sp>
@@ -7219,7 +7153,7 @@
       </p:sp>
       <p:pic>
         <p:nvPicPr>
-          <p:cNvPr id="7" name="Picture 6" descr="Screen Shot 2016-05-31 at 3.13.15 PM.png"/>
+          <p:cNvPr id="6" name="Picture 5" descr="facebook.png"/>
           <p:cNvPicPr>
             <a:picLocks noChangeAspect="1"/>
           </p:cNvPicPr>
@@ -7239,8 +7173,8 @@
         </p:blipFill>
         <p:spPr>
           <a:xfrm>
-            <a:off x="1249947" y="2620210"/>
-            <a:ext cx="6622765" cy="2869865"/>
+            <a:off x="4224421" y="1803247"/>
+            <a:ext cx="4609432" cy="4295801"/>
           </a:xfrm>
           <a:prstGeom prst="rect">
             <a:avLst/>
@@ -7250,7 +7184,7 @@
     </p:spTree>
     <p:extLst>
       <p:ext uri="{BB962C8B-B14F-4D97-AF65-F5344CB8AC3E}">
-        <p14:creationId xmlns:p14="http://schemas.microsoft.com/office/powerpoint/2010/main" val="2666914859"/>
+        <p14:creationId xmlns:p14="http://schemas.microsoft.com/office/powerpoint/2010/main" val="2291260965"/>
       </p:ext>
     </p:extLst>
   </p:cSld>
@@ -7264,222 +7198,6 @@
       </p:par>
     </p:tnLst>
   </p:timing>
-</p:sld>
-</file>
-
-<file path=ppt/slides/slide14.xml><?xml version="1.0" encoding="utf-8"?>
-<p:sld xmlns:a="http://schemas.openxmlformats.org/drawingml/2006/main" xmlns:r="http://schemas.openxmlformats.org/officeDocument/2006/relationships" xmlns:p="http://schemas.openxmlformats.org/presentationml/2006/main">
-  <p:cSld>
-    <p:spTree>
-      <p:nvGrpSpPr>
-        <p:cNvPr id="1" name=""/>
-        <p:cNvGrpSpPr/>
-        <p:nvPr/>
-      </p:nvGrpSpPr>
-      <p:grpSpPr>
-        <a:xfrm>
-          <a:off x="0" y="0"/>
-          <a:ext cx="0" cy="0"/>
-          <a:chOff x="0" y="0"/>
-          <a:chExt cx="0" cy="0"/>
-        </a:xfrm>
-      </p:grpSpPr>
-      <p:sp>
-        <p:nvSpPr>
-          <p:cNvPr id="2" name="Title 1"/>
-          <p:cNvSpPr>
-            <a:spLocks noGrp="1"/>
-          </p:cNvSpPr>
-          <p:nvPr>
-            <p:ph type="title"/>
-          </p:nvPr>
-        </p:nvSpPr>
-        <p:spPr/>
-        <p:txBody>
-          <a:bodyPr/>
-          <a:lstStyle/>
-          <a:p>
-            <a:r>
-              <a:rPr lang="en-US" dirty="0" smtClean="0"/>
-              <a:t>Compiled Site</a:t>
-            </a:r>
-            <a:endParaRPr lang="en-US" dirty="0"/>
-          </a:p>
-        </p:txBody>
-      </p:sp>
-      <p:sp>
-        <p:nvSpPr>
-          <p:cNvPr id="3" name="Content Placeholder 2"/>
-          <p:cNvSpPr>
-            <a:spLocks noGrp="1"/>
-          </p:cNvSpPr>
-          <p:nvPr>
-            <p:ph sz="quarter" idx="1"/>
-          </p:nvPr>
-        </p:nvSpPr>
-        <p:spPr/>
-        <p:txBody>
-          <a:bodyPr>
-            <a:normAutofit/>
-          </a:bodyPr>
-          <a:lstStyle/>
-          <a:p>
-            <a:r>
-              <a:rPr lang="en-US" dirty="0" err="1" smtClean="0"/>
-              <a:t>Open`index.html</a:t>
-            </a:r>
-            <a:r>
-              <a:rPr lang="en-US" dirty="0" smtClean="0"/>
-              <a:t>` in browser</a:t>
-            </a:r>
-          </a:p>
-        </p:txBody>
-      </p:sp>
-      <p:sp>
-        <p:nvSpPr>
-          <p:cNvPr id="9" name="TextBox 8"/>
-          <p:cNvSpPr txBox="1"/>
-          <p:nvPr/>
-        </p:nvSpPr>
-        <p:spPr>
-          <a:xfrm>
-            <a:off x="4438315" y="1069513"/>
-            <a:ext cx="588209" cy="400110"/>
-          </a:xfrm>
-          <a:prstGeom prst="rect">
-            <a:avLst/>
-          </a:prstGeom>
-          <a:noFill/>
-        </p:spPr>
-        <p:txBody>
-          <a:bodyPr wrap="square" rtlCol="0">
-            <a:spAutoFit/>
-          </a:bodyPr>
-          <a:lstStyle/>
-          <a:p>
-            <a:r>
-              <a:rPr lang="el-GR" sz="2000" dirty="0" smtClean="0"/>
-              <a:t>λ</a:t>
-            </a:r>
-            <a:endParaRPr lang="en-US" sz="2000" dirty="0"/>
-          </a:p>
-        </p:txBody>
-      </p:sp>
-      <p:pic>
-        <p:nvPicPr>
-          <p:cNvPr id="4" name="Picture 3" descr="Screen Shot 2016-05-31 at 3.20.53 PM.png"/>
-          <p:cNvPicPr>
-            <a:picLocks noChangeAspect="1"/>
-          </p:cNvPicPr>
-          <p:nvPr/>
-        </p:nvPicPr>
-        <p:blipFill>
-          <a:blip r:embed="rId2">
-            <a:extLst>
-              <a:ext uri="{28A0092B-C50C-407E-A947-70E740481C1C}">
-                <a14:useLocalDpi xmlns:a14="http://schemas.microsoft.com/office/drawing/2010/main" val="0"/>
-              </a:ext>
-            </a:extLst>
-          </a:blip>
-          <a:stretch>
-            <a:fillRect/>
-          </a:stretch>
-        </p:blipFill>
-        <p:spPr>
-          <a:xfrm>
-            <a:off x="1149684" y="2129921"/>
-            <a:ext cx="6857626" cy="4286017"/>
-          </a:xfrm>
-          <a:prstGeom prst="rect">
-            <a:avLst/>
-          </a:prstGeom>
-        </p:spPr>
-      </p:pic>
-    </p:spTree>
-    <p:extLst>
-      <p:ext uri="{BB962C8B-B14F-4D97-AF65-F5344CB8AC3E}">
-        <p14:creationId xmlns:p14="http://schemas.microsoft.com/office/powerpoint/2010/main" val="2979430487"/>
-      </p:ext>
-    </p:extLst>
-  </p:cSld>
-  <p:clrMapOvr>
-    <a:masterClrMapping/>
-  </p:clrMapOvr>
-  <p:timing>
-    <p:tnLst>
-      <p:par>
-        <p:cTn xmlns:p14="http://schemas.microsoft.com/office/powerpoint/2010/main" id="1" dur="indefinite" restart="never" nodeType="tmRoot"/>
-      </p:par>
-    </p:tnLst>
-  </p:timing>
-</p:sld>
-</file>
-
-<file path=ppt/slides/slide15.xml><?xml version="1.0" encoding="utf-8"?>
-<p:sld xmlns:a="http://schemas.openxmlformats.org/drawingml/2006/main" xmlns:r="http://schemas.openxmlformats.org/officeDocument/2006/relationships" xmlns:p="http://schemas.openxmlformats.org/presentationml/2006/main">
-  <p:cSld>
-    <p:spTree>
-      <p:nvGrpSpPr>
-        <p:cNvPr id="1" name=""/>
-        <p:cNvGrpSpPr/>
-        <p:nvPr/>
-      </p:nvGrpSpPr>
-      <p:grpSpPr>
-        <a:xfrm>
-          <a:off x="0" y="0"/>
-          <a:ext cx="0" cy="0"/>
-          <a:chOff x="0" y="0"/>
-          <a:chExt cx="0" cy="0"/>
-        </a:xfrm>
-      </p:grpSpPr>
-      <p:sp>
-        <p:nvSpPr>
-          <p:cNvPr id="2" name="Title 1"/>
-          <p:cNvSpPr>
-            <a:spLocks noGrp="1"/>
-          </p:cNvSpPr>
-          <p:nvPr>
-            <p:ph type="title"/>
-          </p:nvPr>
-        </p:nvSpPr>
-        <p:spPr/>
-        <p:txBody>
-          <a:bodyPr/>
-          <a:lstStyle/>
-          <a:p>
-            <a:endParaRPr lang="en-US"/>
-          </a:p>
-        </p:txBody>
-      </p:sp>
-      <p:sp>
-        <p:nvSpPr>
-          <p:cNvPr id="5" name="Content Placeholder 4"/>
-          <p:cNvSpPr>
-            <a:spLocks noGrp="1"/>
-          </p:cNvSpPr>
-          <p:nvPr>
-            <p:ph sz="quarter" idx="1"/>
-          </p:nvPr>
-        </p:nvSpPr>
-        <p:spPr/>
-        <p:txBody>
-          <a:bodyPr/>
-          <a:lstStyle/>
-          <a:p>
-            <a:endParaRPr lang="en-US"/>
-          </a:p>
-        </p:txBody>
-      </p:sp>
-    </p:spTree>
-    <p:extLst>
-      <p:ext uri="{BB962C8B-B14F-4D97-AF65-F5344CB8AC3E}">
-        <p14:creationId xmlns:p14="http://schemas.microsoft.com/office/powerpoint/2010/main" val="983560918"/>
-      </p:ext>
-    </p:extLst>
-  </p:cSld>
-  <p:clrMapOvr>
-    <a:masterClrMapping/>
-  </p:clrMapOvr>
 </p:sld>
 </file>
 
@@ -7516,41 +7234,40 @@
           <a:lstStyle/>
           <a:p>
             <a:r>
+              <a:rPr lang="en-US" dirty="0" err="1" smtClean="0"/>
+              <a:t>BlaTeX</a:t>
+            </a:r>
+            <a:endParaRPr lang="en-US" dirty="0"/>
+          </a:p>
+        </p:txBody>
+      </p:sp>
+      <p:sp>
+        <p:nvSpPr>
+          <p:cNvPr id="3" name="Content Placeholder 2"/>
+          <p:cNvSpPr>
+            <a:spLocks noGrp="1"/>
+          </p:cNvSpPr>
+          <p:nvPr>
+            <p:ph sz="quarter" idx="1"/>
+          </p:nvPr>
+        </p:nvSpPr>
+        <p:spPr/>
+        <p:txBody>
+          <a:bodyPr/>
+          <a:lstStyle/>
+          <a:p>
+            <a:r>
               <a:rPr lang="en-US" dirty="0" smtClean="0"/>
-              <a:t>Background</a:t>
-            </a:r>
-            <a:endParaRPr lang="en-US" dirty="0"/>
-          </a:p>
-        </p:txBody>
-      </p:sp>
-      <p:sp>
-        <p:nvSpPr>
-          <p:cNvPr id="3" name="Content Placeholder 2"/>
-          <p:cNvSpPr>
-            <a:spLocks noGrp="1"/>
-          </p:cNvSpPr>
-          <p:nvPr>
-            <p:ph sz="quarter" idx="1"/>
-          </p:nvPr>
-        </p:nvSpPr>
-        <p:spPr/>
-        <p:txBody>
-          <a:bodyPr/>
-          <a:lstStyle/>
-          <a:p>
+              <a:t>Static site compiler written in Haskell for </a:t>
+            </a:r>
+            <a:r>
+              <a:rPr lang="en-US" dirty="0" err="1" smtClean="0"/>
+              <a:t>LaTeX</a:t>
+            </a:r>
             <a:r>
               <a:rPr lang="en-US" dirty="0" smtClean="0"/>
-              <a:t>Static sites (</a:t>
-            </a:r>
-            <a:r>
-              <a:rPr lang="en-US" dirty="0"/>
-              <a:t>compare to </a:t>
-            </a:r>
-            <a:r>
-              <a:rPr lang="en-US" dirty="0" smtClean="0"/>
-              <a:t>dynamic sites)</a:t>
-            </a:r>
-            <a:endParaRPr lang="en-US" dirty="0"/>
+              <a:t> documents</a:t>
+            </a:r>
           </a:p>
         </p:txBody>
       </p:sp>
@@ -7587,13 +7304,20 @@
     </p:spTree>
     <p:extLst>
       <p:ext uri="{BB962C8B-B14F-4D97-AF65-F5344CB8AC3E}">
-        <p14:creationId xmlns:p14="http://schemas.microsoft.com/office/powerpoint/2010/main" val="522541982"/>
+        <p14:creationId xmlns:p14="http://schemas.microsoft.com/office/powerpoint/2010/main" val="1212657636"/>
       </p:ext>
     </p:extLst>
   </p:cSld>
   <p:clrMapOvr>
     <a:masterClrMapping/>
   </p:clrMapOvr>
+  <p:timing>
+    <p:tnLst>
+      <p:par>
+        <p:cTn xmlns:p14="http://schemas.microsoft.com/office/powerpoint/2010/main" id="1" dur="indefinite" restart="never" nodeType="tmRoot"/>
+      </p:par>
+    </p:tnLst>
+  </p:timing>
 </p:sld>
 </file>
 
@@ -7647,23 +7371,45 @@
             <p:ph sz="quarter" idx="1"/>
           </p:nvPr>
         </p:nvSpPr>
-        <p:spPr/>
+        <p:spPr>
+          <a:xfrm>
+            <a:off x="141331" y="1527048"/>
+            <a:ext cx="4978774" cy="4572000"/>
+          </a:xfrm>
+        </p:spPr>
         <p:txBody>
           <a:bodyPr/>
           <a:lstStyle/>
           <a:p>
             <a:r>
-              <a:rPr lang="en-US" dirty="0" err="1" smtClean="0"/>
+              <a:rPr lang="en-US" sz="2000" dirty="0" smtClean="0"/>
+              <a:t>Static sites (</a:t>
+            </a:r>
+            <a:r>
+              <a:rPr lang="en-US" sz="2000" dirty="0"/>
+              <a:t>compare to </a:t>
+            </a:r>
+            <a:r>
+              <a:rPr lang="en-US" sz="2000" dirty="0" smtClean="0"/>
+              <a:t>dynamic sites)</a:t>
+            </a:r>
+          </a:p>
+          <a:p>
+            <a:r>
+              <a:rPr lang="en-US" sz="2000" dirty="0" err="1" smtClean="0"/>
               <a:t>LaTeX</a:t>
             </a:r>
             <a:r>
-              <a:rPr lang="en-US" dirty="0" smtClean="0"/>
-              <a:t> (compare to Markdown</a:t>
-            </a:r>
-            <a:r>
-              <a:rPr lang="en-US" dirty="0" smtClean="0"/>
-              <a:t>)</a:t>
-            </a:r>
+              <a:rPr lang="en-US" sz="2000" dirty="0" smtClean="0"/>
+              <a:t> </a:t>
+            </a:r>
+            <a:r>
+              <a:rPr lang="en-US" sz="2000" dirty="0"/>
+              <a:t>(compare to Markdown)</a:t>
+            </a:r>
+          </a:p>
+          <a:p>
+            <a:endParaRPr lang="en-US" sz="2000" dirty="0"/>
           </a:p>
         </p:txBody>
       </p:sp>
@@ -7699,38 +7445,266 @@
       </p:sp>
       <p:pic>
         <p:nvPicPr>
-          <p:cNvPr id="4" name="Picture 3"/>
+          <p:cNvPr id="5" name="Picture 4"/>
           <p:cNvPicPr>
             <a:picLocks noChangeAspect="1"/>
           </p:cNvPicPr>
           <p:nvPr/>
         </p:nvPicPr>
         <p:blipFill>
-          <a:blip r:embed="rId3"/>
+          <a:blip r:embed="rId2"/>
           <a:stretch>
             <a:fillRect/>
           </a:stretch>
         </p:blipFill>
         <p:spPr>
           <a:xfrm>
-            <a:off x="828842" y="2123796"/>
-            <a:ext cx="7807158" cy="3662858"/>
+            <a:off x="451154" y="2540000"/>
+            <a:ext cx="7974322" cy="3741286"/>
           </a:xfrm>
           <a:prstGeom prst="rect">
             <a:avLst/>
           </a:prstGeom>
         </p:spPr>
       </p:pic>
+      <p:sp>
+        <p:nvSpPr>
+          <p:cNvPr id="6" name="Content Placeholder 2"/>
+          <p:cNvSpPr txBox="1">
+            <a:spLocks/>
+          </p:cNvSpPr>
+          <p:nvPr/>
+        </p:nvSpPr>
+        <p:spPr>
+          <a:xfrm>
+            <a:off x="5026523" y="1538544"/>
+            <a:ext cx="3954755" cy="4572000"/>
+          </a:xfrm>
+          <a:prstGeom prst="rect">
+            <a:avLst/>
+          </a:prstGeom>
+        </p:spPr>
+        <p:txBody>
+          <a:bodyPr vert="horz">
+            <a:normAutofit/>
+          </a:bodyPr>
+          <a:lstStyle>
+            <a:lvl1pPr marL="274320" indent="-274320" algn="l" rtl="0" eaLnBrk="1" latinLnBrk="0" hangingPunct="1">
+              <a:spcBef>
+                <a:spcPct val="20000"/>
+              </a:spcBef>
+              <a:buClr>
+                <a:schemeClr val="accent1"/>
+              </a:buClr>
+              <a:buSzPct val="85000"/>
+              <a:buFont typeface="Wingdings 2"/>
+              <a:buChar char=""/>
+              <a:defRPr kumimoji="0" sz="2700" kern="1200">
+                <a:solidFill>
+                  <a:schemeClr val="tx1"/>
+                </a:solidFill>
+                <a:latin typeface="+mn-lt"/>
+                <a:ea typeface="+mn-ea"/>
+                <a:cs typeface="+mn-cs"/>
+              </a:defRPr>
+            </a:lvl1pPr>
+            <a:lvl2pPr marL="548640" indent="-274320" algn="l" rtl="0" eaLnBrk="1" latinLnBrk="0" hangingPunct="1">
+              <a:spcBef>
+                <a:spcPct val="20000"/>
+              </a:spcBef>
+              <a:buClr>
+                <a:schemeClr val="accent2"/>
+              </a:buClr>
+              <a:buSzPct val="70000"/>
+              <a:buFont typeface="Wingdings"/>
+              <a:buChar char=""/>
+              <a:defRPr kumimoji="0" sz="2200" kern="1200">
+                <a:solidFill>
+                  <a:schemeClr val="tx2"/>
+                </a:solidFill>
+                <a:latin typeface="+mn-lt"/>
+                <a:ea typeface="+mn-ea"/>
+                <a:cs typeface="+mn-cs"/>
+              </a:defRPr>
+            </a:lvl2pPr>
+            <a:lvl3pPr marL="822960" indent="-228600" algn="l" rtl="0" eaLnBrk="1" latinLnBrk="0" hangingPunct="1">
+              <a:spcBef>
+                <a:spcPct val="20000"/>
+              </a:spcBef>
+              <a:buClr>
+                <a:schemeClr val="accent3"/>
+              </a:buClr>
+              <a:buSzPct val="75000"/>
+              <a:buFont typeface="Wingdings 2"/>
+              <a:buChar char=""/>
+              <a:defRPr kumimoji="0" sz="2000" kern="1200">
+                <a:solidFill>
+                  <a:schemeClr val="tx1"/>
+                </a:solidFill>
+                <a:latin typeface="+mn-lt"/>
+                <a:ea typeface="+mn-ea"/>
+                <a:cs typeface="+mn-cs"/>
+              </a:defRPr>
+            </a:lvl3pPr>
+            <a:lvl4pPr marL="1097280" indent="-228600" algn="l" rtl="0" eaLnBrk="1" latinLnBrk="0" hangingPunct="1">
+              <a:spcBef>
+                <a:spcPct val="20000"/>
+              </a:spcBef>
+              <a:buClr>
+                <a:schemeClr val="accent4"/>
+              </a:buClr>
+              <a:buSzPct val="70000"/>
+              <a:buFont typeface="Wingdings"/>
+              <a:buChar char=""/>
+              <a:defRPr kumimoji="0" sz="2000" kern="1200">
+                <a:solidFill>
+                  <a:schemeClr val="tx2"/>
+                </a:solidFill>
+                <a:latin typeface="+mn-lt"/>
+                <a:ea typeface="+mn-ea"/>
+                <a:cs typeface="+mn-cs"/>
+              </a:defRPr>
+            </a:lvl4pPr>
+            <a:lvl5pPr marL="1371600" indent="-228600" algn="l" rtl="0" eaLnBrk="1" latinLnBrk="0" hangingPunct="1">
+              <a:spcBef>
+                <a:spcPct val="20000"/>
+              </a:spcBef>
+              <a:buClr>
+                <a:schemeClr val="accent5"/>
+              </a:buClr>
+              <a:buFontTx/>
+              <a:buChar char="•"/>
+              <a:defRPr kumimoji="0" sz="1800" kern="1200">
+                <a:solidFill>
+                  <a:schemeClr val="tx1"/>
+                </a:solidFill>
+                <a:latin typeface="+mn-lt"/>
+                <a:ea typeface="+mn-ea"/>
+                <a:cs typeface="+mn-cs"/>
+              </a:defRPr>
+            </a:lvl5pPr>
+            <a:lvl6pPr marL="1645920" indent="-182880" algn="l" rtl="0" eaLnBrk="1" latinLnBrk="0" hangingPunct="1">
+              <a:spcBef>
+                <a:spcPct val="20000"/>
+              </a:spcBef>
+              <a:buClr>
+                <a:schemeClr val="accent6"/>
+              </a:buClr>
+              <a:buSzPct val="80000"/>
+              <a:buFont typeface="Wingdings 2"/>
+              <a:buChar char=""/>
+              <a:defRPr kumimoji="0" sz="1800" kern="1200">
+                <a:solidFill>
+                  <a:schemeClr val="tx1"/>
+                </a:solidFill>
+                <a:latin typeface="+mn-lt"/>
+                <a:ea typeface="+mn-ea"/>
+                <a:cs typeface="+mn-cs"/>
+              </a:defRPr>
+            </a:lvl6pPr>
+            <a:lvl7pPr marL="1920240" indent="-182880" algn="l" rtl="0" eaLnBrk="1" latinLnBrk="0" hangingPunct="1">
+              <a:spcBef>
+                <a:spcPct val="20000"/>
+              </a:spcBef>
+              <a:buClr>
+                <a:schemeClr val="accent1">
+                  <a:shade val="75000"/>
+                </a:schemeClr>
+              </a:buClr>
+              <a:buSzPct val="90000"/>
+              <a:buChar char="•"/>
+              <a:defRPr kumimoji="0" sz="1600" kern="1200" baseline="0">
+                <a:solidFill>
+                  <a:schemeClr val="tx1"/>
+                </a:solidFill>
+                <a:latin typeface="+mn-lt"/>
+                <a:ea typeface="+mn-ea"/>
+                <a:cs typeface="+mn-cs"/>
+              </a:defRPr>
+            </a:lvl7pPr>
+            <a:lvl8pPr marL="2103120" indent="-182880" algn="l" rtl="0" eaLnBrk="1" latinLnBrk="0" hangingPunct="1">
+              <a:spcBef>
+                <a:spcPct val="20000"/>
+              </a:spcBef>
+              <a:buClr>
+                <a:schemeClr val="accent4">
+                  <a:shade val="75000"/>
+                </a:schemeClr>
+              </a:buClr>
+              <a:buChar char="•"/>
+              <a:defRPr kumimoji="0" sz="1600" kern="1200">
+                <a:solidFill>
+                  <a:schemeClr val="tx1"/>
+                </a:solidFill>
+                <a:latin typeface="+mn-lt"/>
+                <a:ea typeface="+mn-ea"/>
+                <a:cs typeface="+mn-cs"/>
+              </a:defRPr>
+            </a:lvl8pPr>
+            <a:lvl9pPr marL="2377440" indent="-182880" algn="l" rtl="0" eaLnBrk="1" latinLnBrk="0" hangingPunct="1">
+              <a:spcBef>
+                <a:spcPct val="20000"/>
+              </a:spcBef>
+              <a:buClr>
+                <a:schemeClr val="accent2">
+                  <a:shade val="75000"/>
+                </a:schemeClr>
+              </a:buClr>
+              <a:buSzPct val="90000"/>
+              <a:buChar char="•"/>
+              <a:defRPr kumimoji="0" sz="1400" kern="1200" cap="all" baseline="0">
+                <a:solidFill>
+                  <a:schemeClr val="tx1"/>
+                </a:solidFill>
+                <a:latin typeface="+mn-lt"/>
+                <a:ea typeface="+mn-ea"/>
+                <a:cs typeface="+mn-cs"/>
+              </a:defRPr>
+            </a:lvl9pPr>
+          </a:lstStyle>
+          <a:p>
+            <a:r>
+              <a:rPr lang="en-US" sz="2000" dirty="0" smtClean="0"/>
+              <a:t>Haskell (compare to Java)</a:t>
+            </a:r>
+          </a:p>
+          <a:p>
+            <a:r>
+              <a:rPr lang="en-US" sz="2000" dirty="0"/>
+              <a:t>PDFs (compare to HTML)</a:t>
+            </a:r>
+          </a:p>
+          <a:p>
+            <a:pPr marL="0" indent="0">
+              <a:buNone/>
+            </a:pPr>
+            <a:endParaRPr lang="en-US" sz="2000" dirty="0" smtClean="0"/>
+          </a:p>
+          <a:p>
+            <a:endParaRPr lang="en-US" dirty="0" smtClean="0"/>
+          </a:p>
+          <a:p>
+            <a:endParaRPr lang="en-US" dirty="0"/>
+          </a:p>
+        </p:txBody>
+      </p:sp>
     </p:spTree>
     <p:extLst>
       <p:ext uri="{BB962C8B-B14F-4D97-AF65-F5344CB8AC3E}">
-        <p14:creationId xmlns:p14="http://schemas.microsoft.com/office/powerpoint/2010/main" val="1212657636"/>
+        <p14:creationId xmlns:p14="http://schemas.microsoft.com/office/powerpoint/2010/main" val="522541982"/>
       </p:ext>
     </p:extLst>
   </p:cSld>
   <p:clrMapOvr>
     <a:masterClrMapping/>
   </p:clrMapOvr>
+  <p:timing>
+    <p:tnLst>
+      <p:par>
+        <p:cTn xmlns:p14="http://schemas.microsoft.com/office/powerpoint/2010/main" id="1" dur="indefinite" restart="never" nodeType="tmRoot"/>
+      </p:par>
+    </p:tnLst>
+  </p:timing>
 </p:sld>
 </file>
 
@@ -7768,7 +7742,7 @@
           <a:p>
             <a:r>
               <a:rPr lang="en-US" dirty="0" smtClean="0"/>
-              <a:t>Background</a:t>
+              <a:t>How it Works</a:t>
             </a:r>
             <a:endParaRPr lang="en-US" dirty="0"/>
           </a:p>
@@ -7786,21 +7760,50 @@
         </p:nvSpPr>
         <p:spPr/>
         <p:txBody>
-          <a:bodyPr/>
+          <a:bodyPr>
+            <a:normAutofit/>
+          </a:bodyPr>
           <a:lstStyle/>
           <a:p>
             <a:r>
               <a:rPr lang="en-US" dirty="0" smtClean="0"/>
-              <a:t>PDFs </a:t>
-            </a:r>
-            <a:r>
-              <a:rPr lang="en-US" dirty="0"/>
-              <a:t>(compare to HTML</a:t>
-            </a:r>
+              <a:t>Install</a:t>
+            </a:r>
+          </a:p>
+          <a:p>
             <a:r>
               <a:rPr lang="en-US" dirty="0" smtClean="0"/>
-              <a:t>)</a:t>
-            </a:r>
+              <a:t>Initialize</a:t>
+            </a:r>
+            <a:endParaRPr lang="en-US" dirty="0" smtClean="0"/>
+          </a:p>
+          <a:p>
+            <a:r>
+              <a:rPr lang="en-US" dirty="0" smtClean="0"/>
+              <a:t>Write/edit posts</a:t>
+            </a:r>
+          </a:p>
+          <a:p>
+            <a:r>
+              <a:rPr lang="en-US" dirty="0" smtClean="0"/>
+              <a:t>Design website</a:t>
+            </a:r>
+          </a:p>
+          <a:p>
+            <a:r>
+              <a:rPr lang="en-US" dirty="0" smtClean="0"/>
+              <a:t>Compile site</a:t>
+            </a:r>
+            <a:endParaRPr lang="en-US" dirty="0" smtClean="0"/>
+          </a:p>
+          <a:p>
+            <a:r>
+              <a:rPr lang="en-US" dirty="0" smtClean="0"/>
+              <a:t>Host resulting static site</a:t>
+            </a:r>
+            <a:endParaRPr lang="en-US" dirty="0" smtClean="0"/>
+          </a:p>
+          <a:p>
             <a:endParaRPr lang="en-US" dirty="0" smtClean="0"/>
           </a:p>
         </p:txBody>
@@ -7838,13 +7841,20 @@
     </p:spTree>
     <p:extLst>
       <p:ext uri="{BB962C8B-B14F-4D97-AF65-F5344CB8AC3E}">
-        <p14:creationId xmlns:p14="http://schemas.microsoft.com/office/powerpoint/2010/main" val="1985539233"/>
+        <p14:creationId xmlns:p14="http://schemas.microsoft.com/office/powerpoint/2010/main" val="1150960263"/>
       </p:ext>
     </p:extLst>
   </p:cSld>
   <p:clrMapOvr>
     <a:masterClrMapping/>
   </p:clrMapOvr>
+  <p:timing>
+    <p:tnLst>
+      <p:par>
+        <p:cTn xmlns:p14="http://schemas.microsoft.com/office/powerpoint/2010/main" id="1" dur="indefinite" restart="never" nodeType="tmRoot"/>
+      </p:par>
+    </p:tnLst>
+  </p:timing>
 </p:sld>
 </file>
 
@@ -7882,7 +7892,19 @@
           <a:p>
             <a:r>
               <a:rPr lang="en-US" dirty="0" smtClean="0"/>
-              <a:t>Background</a:t>
+              <a:t>Install </a:t>
+            </a:r>
+            <a:r>
+              <a:rPr lang="en-US" dirty="0" err="1"/>
+              <a:t>H</a:t>
+            </a:r>
+            <a:r>
+              <a:rPr lang="en-US" dirty="0" err="1" smtClean="0"/>
+              <a:t>ackage</a:t>
+            </a:r>
+            <a:r>
+              <a:rPr lang="en-US" dirty="0" smtClean="0"/>
+              <a:t> package</a:t>
             </a:r>
             <a:endParaRPr lang="en-US" dirty="0"/>
           </a:p>
@@ -7900,13 +7922,24 @@
         </p:nvSpPr>
         <p:spPr/>
         <p:txBody>
-          <a:bodyPr/>
-          <a:lstStyle/>
-          <a:p>
-            <a:r>
-              <a:rPr lang="en-US" dirty="0"/>
-              <a:t>Haskell (compare to Java)</a:t>
-            </a:r>
+          <a:bodyPr>
+            <a:normAutofit/>
+          </a:bodyPr>
+          <a:lstStyle/>
+          <a:p>
+            <a:r>
+              <a:rPr lang="en-US" dirty="0" smtClean="0"/>
+              <a:t>`cabal install </a:t>
+            </a:r>
+            <a:r>
+              <a:rPr lang="en-US" dirty="0" err="1" smtClean="0"/>
+              <a:t>blatex</a:t>
+            </a:r>
+            <a:r>
+              <a:rPr lang="en-US" dirty="0" smtClean="0"/>
+              <a:t>`</a:t>
+            </a:r>
+            <a:endParaRPr lang="en-US" dirty="0" smtClean="0"/>
           </a:p>
         </p:txBody>
       </p:sp>
@@ -7940,16 +7973,53 @@
           </a:p>
         </p:txBody>
       </p:sp>
+      <p:pic>
+        <p:nvPicPr>
+          <p:cNvPr id="4" name="Picture 3" descr="Screen Shot 2016-05-31 at 3.14.56 PM.png"/>
+          <p:cNvPicPr>
+            <a:picLocks noChangeAspect="1"/>
+          </p:cNvPicPr>
+          <p:nvPr/>
+        </p:nvPicPr>
+        <p:blipFill>
+          <a:blip r:embed="rId2">
+            <a:extLst>
+              <a:ext uri="{28A0092B-C50C-407E-A947-70E740481C1C}">
+                <a14:useLocalDpi xmlns:a14="http://schemas.microsoft.com/office/drawing/2010/main" val="0"/>
+              </a:ext>
+            </a:extLst>
+          </a:blip>
+          <a:stretch>
+            <a:fillRect/>
+          </a:stretch>
+        </p:blipFill>
+        <p:spPr>
+          <a:xfrm>
+            <a:off x="1122949" y="2072106"/>
+            <a:ext cx="6897692" cy="3475790"/>
+          </a:xfrm>
+          <a:prstGeom prst="rect">
+            <a:avLst/>
+          </a:prstGeom>
+        </p:spPr>
+      </p:pic>
     </p:spTree>
     <p:extLst>
       <p:ext uri="{BB962C8B-B14F-4D97-AF65-F5344CB8AC3E}">
-        <p14:creationId xmlns:p14="http://schemas.microsoft.com/office/powerpoint/2010/main" val="135324916"/>
+        <p14:creationId xmlns:p14="http://schemas.microsoft.com/office/powerpoint/2010/main" val="1499124322"/>
       </p:ext>
     </p:extLst>
   </p:cSld>
   <p:clrMapOvr>
     <a:masterClrMapping/>
   </p:clrMapOvr>
+  <p:timing>
+    <p:tnLst>
+      <p:par>
+        <p:cTn xmlns:p14="http://schemas.microsoft.com/office/powerpoint/2010/main" id="1" dur="indefinite" restart="never" nodeType="tmRoot"/>
+      </p:par>
+    </p:tnLst>
+  </p:timing>
 </p:sld>
 </file>
 
@@ -7986,39 +8056,101 @@
           <a:lstStyle/>
           <a:p>
             <a:r>
+              <a:rPr lang="en-US" dirty="0" smtClean="0"/>
+              <a:t>Initialize site</a:t>
+            </a:r>
+            <a:endParaRPr lang="en-US" dirty="0"/>
+          </a:p>
+        </p:txBody>
+      </p:sp>
+      <p:sp>
+        <p:nvSpPr>
+          <p:cNvPr id="3" name="Content Placeholder 2"/>
+          <p:cNvSpPr>
+            <a:spLocks noGrp="1"/>
+          </p:cNvSpPr>
+          <p:nvPr>
+            <p:ph sz="quarter" idx="1"/>
+          </p:nvPr>
+        </p:nvSpPr>
+        <p:spPr/>
+        <p:txBody>
+          <a:bodyPr>
+            <a:normAutofit/>
+          </a:bodyPr>
+          <a:lstStyle/>
+          <a:p>
+            <a:r>
+              <a:rPr lang="en-US" dirty="0" smtClean="0"/>
+              <a:t>`</a:t>
+            </a:r>
+            <a:r>
               <a:rPr lang="en-US" dirty="0" err="1" smtClean="0"/>
-              <a:t>BlaTeX</a:t>
-            </a:r>
-            <a:endParaRPr lang="en-US" dirty="0"/>
-          </a:p>
-        </p:txBody>
-      </p:sp>
-      <p:sp>
-        <p:nvSpPr>
-          <p:cNvPr id="3" name="Content Placeholder 2"/>
-          <p:cNvSpPr>
-            <a:spLocks noGrp="1"/>
-          </p:cNvSpPr>
-          <p:nvPr>
-            <p:ph sz="quarter" idx="1"/>
-          </p:nvPr>
-        </p:nvSpPr>
-        <p:spPr/>
-        <p:txBody>
-          <a:bodyPr/>
-          <a:lstStyle/>
-          <a:p>
+              <a:t>blatex</a:t>
+            </a:r>
             <a:r>
               <a:rPr lang="en-US" dirty="0" smtClean="0"/>
-              <a:t>Static site compiler written in Haskell for </a:t>
+              <a:t> </a:t>
             </a:r>
             <a:r>
               <a:rPr lang="en-US" dirty="0" err="1" smtClean="0"/>
-              <a:t>LaTeX</a:t>
+              <a:t>init</a:t>
             </a:r>
             <a:r>
               <a:rPr lang="en-US" dirty="0" smtClean="0"/>
-              <a:t> documents</a:t>
+              <a:t>`</a:t>
+            </a:r>
+          </a:p>
+          <a:p>
+            <a:pPr lvl="1"/>
+            <a:r>
+              <a:rPr lang="en-US" dirty="0" smtClean="0"/>
+              <a:t>`</a:t>
+            </a:r>
+            <a:r>
+              <a:rPr lang="en-US" dirty="0" err="1" smtClean="0"/>
+              <a:t>index.html.bltx</a:t>
+            </a:r>
+            <a:r>
+              <a:rPr lang="en-US" dirty="0" smtClean="0"/>
+              <a:t>`</a:t>
+            </a:r>
+          </a:p>
+          <a:p>
+            <a:pPr lvl="1"/>
+            <a:r>
+              <a:rPr lang="en-US" dirty="0" smtClean="0"/>
+              <a:t>`posts/` directory</a:t>
+            </a:r>
+          </a:p>
+          <a:p>
+            <a:pPr lvl="1"/>
+            <a:r>
+              <a:rPr lang="en-US" dirty="0" smtClean="0"/>
+              <a:t>`posts/example-</a:t>
+            </a:r>
+            <a:r>
+              <a:rPr lang="en-US" dirty="0" err="1" smtClean="0"/>
+              <a:t>post.tex</a:t>
+            </a:r>
+            <a:r>
+              <a:rPr lang="en-US" dirty="0" smtClean="0"/>
+              <a:t>` file</a:t>
+            </a:r>
+          </a:p>
+          <a:p>
+            <a:pPr lvl="1"/>
+            <a:r>
+              <a:rPr lang="en-US" dirty="0" smtClean="0"/>
+              <a:t>`posts/example-</a:t>
+            </a:r>
+            <a:r>
+              <a:rPr lang="en-US" dirty="0" err="1" smtClean="0"/>
+              <a:t>post.pdf</a:t>
+            </a:r>
+            <a:r>
+              <a:rPr lang="en-US" dirty="0" smtClean="0"/>
+              <a:t>` file</a:t>
             </a:r>
           </a:p>
         </p:txBody>
@@ -8056,7 +8188,7 @@
     </p:spTree>
     <p:extLst>
       <p:ext uri="{BB962C8B-B14F-4D97-AF65-F5344CB8AC3E}">
-        <p14:creationId xmlns:p14="http://schemas.microsoft.com/office/powerpoint/2010/main" val="1212657636"/>
+        <p14:creationId xmlns:p14="http://schemas.microsoft.com/office/powerpoint/2010/main" val="1277433532"/>
       </p:ext>
     </p:extLst>
   </p:cSld>
@@ -8107,7 +8239,7 @@
           <a:p>
             <a:r>
               <a:rPr lang="en-US" dirty="0" smtClean="0"/>
-              <a:t>How it Works</a:t>
+              <a:t>Write/edit posts</a:t>
             </a:r>
             <a:endParaRPr lang="en-US" dirty="0"/>
           </a:p>
@@ -8132,142 +8264,33 @@
           <a:p>
             <a:r>
               <a:rPr lang="en-US" dirty="0" smtClean="0"/>
-              <a:t>`cabal install </a:t>
+              <a:t>Write and compile </a:t>
             </a:r>
             <a:r>
               <a:rPr lang="en-US" dirty="0" err="1" smtClean="0"/>
-              <a:t>blatex</a:t>
+              <a:t>LaTeX</a:t>
             </a:r>
             <a:r>
               <a:rPr lang="en-US" dirty="0" smtClean="0"/>
-              <a:t>`</a:t>
-            </a:r>
-          </a:p>
-          <a:p>
+              <a:t> documents as usual</a:t>
+            </a:r>
+          </a:p>
+          <a:p>
+            <a:pPr lvl="1"/>
+            <a:r>
+              <a:rPr lang="en-US" dirty="0" err="1" smtClean="0"/>
+              <a:t>BlaTeX</a:t>
+            </a:r>
             <a:r>
               <a:rPr lang="en-US" dirty="0" smtClean="0"/>
-              <a:t>`</a:t>
-            </a:r>
-            <a:r>
-              <a:rPr lang="en-US" dirty="0" err="1" smtClean="0"/>
-              <a:t>blatex</a:t>
-            </a:r>
+              <a:t> looks in the `posts/` directory</a:t>
+            </a:r>
+          </a:p>
+          <a:p>
             <a:r>
               <a:rPr lang="en-US" dirty="0" smtClean="0"/>
-              <a:t> </a:t>
-            </a:r>
-            <a:r>
-              <a:rPr lang="en-US" dirty="0" err="1" smtClean="0"/>
-              <a:t>init</a:t>
-            </a:r>
-            <a:r>
-              <a:rPr lang="en-US" dirty="0" smtClean="0"/>
-              <a:t>`</a:t>
-            </a:r>
-          </a:p>
-          <a:p>
-            <a:pPr lvl="1"/>
-            <a:r>
-              <a:rPr lang="en-US" dirty="0" smtClean="0"/>
-              <a:t>Initialize a couple of boilerplate files and the skeleton structure</a:t>
-            </a:r>
-          </a:p>
-          <a:p>
-            <a:r>
-              <a:rPr lang="en-US" dirty="0" smtClean="0"/>
-              <a:t>Write/edit posts</a:t>
-            </a:r>
-          </a:p>
-          <a:p>
-            <a:pPr lvl="1"/>
-            <a:r>
-              <a:rPr lang="en-US" dirty="0" smtClean="0"/>
-              <a:t>Find </a:t>
-            </a:r>
-            <a:r>
-              <a:rPr lang="en-US" dirty="0" err="1" smtClean="0"/>
-              <a:t>in`posts</a:t>
-            </a:r>
-            <a:r>
-              <a:rPr lang="en-US" dirty="0" smtClean="0"/>
-              <a:t>/</a:t>
-            </a:r>
-            <a:r>
-              <a:rPr lang="en-US" dirty="0" err="1" smtClean="0"/>
-              <a:t>FILENAME.tex</a:t>
-            </a:r>
-            <a:r>
-              <a:rPr lang="en-US" dirty="0" smtClean="0"/>
-              <a:t>`</a:t>
-            </a:r>
-            <a:endParaRPr lang="en-US" dirty="0"/>
-          </a:p>
-          <a:p>
-            <a:r>
-              <a:rPr lang="en-US" dirty="0"/>
-              <a:t>Make your website pretty </a:t>
-            </a:r>
-            <a:endParaRPr lang="en-US" dirty="0" smtClean="0"/>
-          </a:p>
-          <a:p>
-            <a:pPr lvl="1"/>
-            <a:r>
-              <a:rPr lang="en-US" dirty="0" smtClean="0"/>
-              <a:t>Edit the </a:t>
-            </a:r>
-            <a:r>
-              <a:rPr lang="en-US" dirty="0" smtClean="0"/>
-              <a:t>layout file in `</a:t>
-            </a:r>
-            <a:r>
-              <a:rPr lang="en-US" dirty="0" err="1" smtClean="0"/>
-              <a:t>index.html.bltx</a:t>
-            </a:r>
-            <a:r>
-              <a:rPr lang="en-US" dirty="0" smtClean="0"/>
-              <a:t>`</a:t>
-            </a:r>
-            <a:endParaRPr lang="en-US" dirty="0" smtClean="0"/>
-          </a:p>
-          <a:p>
-            <a:r>
-              <a:rPr lang="en-US" dirty="0" smtClean="0"/>
-              <a:t>`</a:t>
-            </a:r>
-            <a:r>
-              <a:rPr lang="en-US" dirty="0" err="1" smtClean="0"/>
-              <a:t>blate</a:t>
-            </a:r>
-            <a:r>
-              <a:rPr lang="en-US" dirty="0" err="1" smtClean="0"/>
-              <a:t>x</a:t>
-            </a:r>
-            <a:r>
-              <a:rPr lang="en-US" dirty="0" smtClean="0"/>
-              <a:t> build`</a:t>
-            </a:r>
-          </a:p>
-          <a:p>
-            <a:r>
-              <a:rPr lang="en-US" dirty="0" smtClean="0"/>
-              <a:t>Open your static site at </a:t>
-            </a:r>
-            <a:r>
-              <a:rPr lang="en-US" dirty="0" smtClean="0"/>
-              <a:t>`</a:t>
-            </a:r>
-            <a:r>
-              <a:rPr lang="en-US" dirty="0" err="1" smtClean="0"/>
-              <a:t>index.html</a:t>
-            </a:r>
-            <a:r>
-              <a:rPr lang="en-US" dirty="0" smtClean="0"/>
-              <a:t>`</a:t>
-            </a:r>
-            <a:endParaRPr lang="en-US" dirty="0" smtClean="0"/>
-          </a:p>
-          <a:p>
-            <a:endParaRPr lang="en-US" dirty="0" smtClean="0"/>
+              <a:t>No interruption in typical workflow</a:t>
+            </a:r>
           </a:p>
         </p:txBody>
       </p:sp>
@@ -8304,7 +8327,7 @@
     </p:spTree>
     <p:extLst>
       <p:ext uri="{BB962C8B-B14F-4D97-AF65-F5344CB8AC3E}">
-        <p14:creationId xmlns:p14="http://schemas.microsoft.com/office/powerpoint/2010/main" val="1150960263"/>
+        <p14:creationId xmlns:p14="http://schemas.microsoft.com/office/powerpoint/2010/main" val="2199714623"/>
       </p:ext>
     </p:extLst>
   </p:cSld>
@@ -8355,19 +8378,7 @@
           <a:p>
             <a:r>
               <a:rPr lang="en-US" dirty="0" smtClean="0"/>
-              <a:t>Install </a:t>
-            </a:r>
-            <a:r>
-              <a:rPr lang="en-US" dirty="0" err="1"/>
-              <a:t>H</a:t>
-            </a:r>
-            <a:r>
-              <a:rPr lang="en-US" dirty="0" err="1" smtClean="0"/>
-              <a:t>ackage</a:t>
-            </a:r>
-            <a:r>
-              <a:rPr lang="en-US" dirty="0" smtClean="0"/>
-              <a:t> package</a:t>
+              <a:t>Design a static website</a:t>
             </a:r>
             <a:endParaRPr lang="en-US" dirty="0"/>
           </a:p>
@@ -8392,17 +8403,54 @@
           <a:p>
             <a:r>
               <a:rPr lang="en-US" dirty="0" smtClean="0"/>
-              <a:t>`cabal install </a:t>
+              <a:t>Build your website in the `</a:t>
             </a:r>
             <a:r>
               <a:rPr lang="en-US" dirty="0" err="1" smtClean="0"/>
-              <a:t>blatex</a:t>
+              <a:t>index.html.bltx</a:t>
             </a:r>
             <a:r>
               <a:rPr lang="en-US" dirty="0" smtClean="0"/>
-              <a:t>`</a:t>
-            </a:r>
-            <a:endParaRPr lang="en-US" dirty="0" smtClean="0"/>
+              <a:t>` file</a:t>
+            </a:r>
+          </a:p>
+          <a:p>
+            <a:pPr lvl="1"/>
+            <a:r>
+              <a:rPr lang="en-US" dirty="0" err="1" smtClean="0"/>
+              <a:t>BlaTeX</a:t>
+            </a:r>
+            <a:r>
+              <a:rPr lang="en-US" dirty="0" smtClean="0"/>
+              <a:t> will use this template file to build your static site</a:t>
+            </a:r>
+          </a:p>
+          <a:p>
+            <a:pPr lvl="1"/>
+            <a:r>
+              <a:rPr lang="en-US" dirty="0" smtClean="0"/>
+              <a:t>Looks for the following code: `&lt;</a:t>
+            </a:r>
+            <a:r>
+              <a:rPr lang="en-US" dirty="0" err="1" smtClean="0"/>
+              <a:t>ul</a:t>
+            </a:r>
+            <a:r>
+              <a:rPr lang="en-US" dirty="0"/>
+              <a:t> </a:t>
+            </a:r>
+            <a:r>
+              <a:rPr lang="en-US" dirty="0" smtClean="0"/>
+              <a:t>id=“blog-posts”&gt;&lt;/</a:t>
+            </a:r>
+            <a:r>
+              <a:rPr lang="en-US" dirty="0" err="1" smtClean="0"/>
+              <a:t>ul</a:t>
+            </a:r>
+            <a:r>
+              <a:rPr lang="en-US" dirty="0" smtClean="0"/>
+              <a:t>&gt;`</a:t>
+            </a:r>
           </a:p>
         </p:txBody>
       </p:sp>
@@ -8436,40 +8484,10 @@
           </a:p>
         </p:txBody>
       </p:sp>
-      <p:pic>
-        <p:nvPicPr>
-          <p:cNvPr id="4" name="Picture 3" descr="Screen Shot 2016-05-31 at 3.14.56 PM.png"/>
-          <p:cNvPicPr>
-            <a:picLocks noChangeAspect="1"/>
-          </p:cNvPicPr>
-          <p:nvPr/>
-        </p:nvPicPr>
-        <p:blipFill>
-          <a:blip r:embed="rId2">
-            <a:extLst>
-              <a:ext uri="{28A0092B-C50C-407E-A947-70E740481C1C}">
-                <a14:useLocalDpi xmlns:a14="http://schemas.microsoft.com/office/drawing/2010/main" val="0"/>
-              </a:ext>
-            </a:extLst>
-          </a:blip>
-          <a:stretch>
-            <a:fillRect/>
-          </a:stretch>
-        </p:blipFill>
-        <p:spPr>
-          <a:xfrm>
-            <a:off x="1122949" y="2072106"/>
-            <a:ext cx="6897692" cy="3475790"/>
-          </a:xfrm>
-          <a:prstGeom prst="rect">
-            <a:avLst/>
-          </a:prstGeom>
-        </p:spPr>
-      </p:pic>
     </p:spTree>
     <p:extLst>
       <p:ext uri="{BB962C8B-B14F-4D97-AF65-F5344CB8AC3E}">
-        <p14:creationId xmlns:p14="http://schemas.microsoft.com/office/powerpoint/2010/main" val="1499124322"/>
+        <p14:creationId xmlns:p14="http://schemas.microsoft.com/office/powerpoint/2010/main" val="3922255865"/>
       </p:ext>
     </p:extLst>
   </p:cSld>
@@ -8520,7 +8538,7 @@
           <a:p>
             <a:r>
               <a:rPr lang="en-US" dirty="0" smtClean="0"/>
-              <a:t>Initialize site</a:t>
+              <a:t>Style the HTML elements</a:t>
             </a:r>
             <a:endParaRPr lang="en-US" dirty="0"/>
           </a:p>
@@ -8528,7 +8546,67 @@
       </p:sp>
       <p:sp>
         <p:nvSpPr>
-          <p:cNvPr id="3" name="Content Placeholder 2"/>
+          <p:cNvPr id="9" name="TextBox 8"/>
+          <p:cNvSpPr txBox="1"/>
+          <p:nvPr/>
+        </p:nvSpPr>
+        <p:spPr>
+          <a:xfrm>
+            <a:off x="4438315" y="1069513"/>
+            <a:ext cx="588209" cy="400110"/>
+          </a:xfrm>
+          <a:prstGeom prst="rect">
+            <a:avLst/>
+          </a:prstGeom>
+          <a:noFill/>
+        </p:spPr>
+        <p:txBody>
+          <a:bodyPr wrap="square" rtlCol="0">
+            <a:spAutoFit/>
+          </a:bodyPr>
+          <a:lstStyle/>
+          <a:p>
+            <a:r>
+              <a:rPr lang="el-GR" sz="2000" dirty="0" smtClean="0"/>
+              <a:t>λ</a:t>
+            </a:r>
+            <a:endParaRPr lang="en-US" sz="2000" dirty="0"/>
+          </a:p>
+        </p:txBody>
+      </p:sp>
+      <p:pic>
+        <p:nvPicPr>
+          <p:cNvPr id="6" name="Picture 5" descr="Screen Shot 2016-05-31 at 3.35.59 PM.png"/>
+          <p:cNvPicPr>
+            <a:picLocks noChangeAspect="1"/>
+          </p:cNvPicPr>
+          <p:nvPr/>
+        </p:nvPicPr>
+        <p:blipFill>
+          <a:blip r:embed="rId2">
+            <a:extLst>
+              <a:ext uri="{28A0092B-C50C-407E-A947-70E740481C1C}">
+                <a14:useLocalDpi xmlns:a14="http://schemas.microsoft.com/office/drawing/2010/main" val="0"/>
+              </a:ext>
+            </a:extLst>
+          </a:blip>
+          <a:stretch>
+            <a:fillRect/>
+          </a:stretch>
+        </p:blipFill>
+        <p:spPr>
+          <a:xfrm>
+            <a:off x="1637965" y="2837447"/>
+            <a:ext cx="5600700" cy="2349500"/>
+          </a:xfrm>
+          <a:prstGeom prst="rect">
+            <a:avLst/>
+          </a:prstGeom>
+        </p:spPr>
+      </p:pic>
+      <p:sp>
+        <p:nvSpPr>
+          <p:cNvPr id="10" name="Content Placeholder 2"/>
           <p:cNvSpPr>
             <a:spLocks noGrp="1"/>
           </p:cNvSpPr>
@@ -8536,7 +8614,12 @@
             <p:ph sz="quarter" idx="1"/>
           </p:nvPr>
         </p:nvSpPr>
-        <p:spPr/>
+        <p:spPr>
+          <a:xfrm>
+            <a:off x="301752" y="1527048"/>
+            <a:ext cx="8503920" cy="4572000"/>
+          </a:xfrm>
+        </p:spPr>
         <p:txBody>
           <a:bodyPr>
             <a:normAutofit/>
@@ -8544,114 +8627,19 @@
           <a:lstStyle/>
           <a:p>
             <a:r>
-              <a:rPr lang="en-US" dirty="0" smtClean="0"/>
-              <a:t>`</a:t>
-            </a:r>
-            <a:r>
-              <a:rPr lang="en-US" dirty="0" err="1" smtClean="0"/>
-              <a:t>blatex</a:t>
-            </a:r>
-            <a:r>
-              <a:rPr lang="en-US" dirty="0" smtClean="0"/>
-              <a:t> </a:t>
-            </a:r>
-            <a:r>
-              <a:rPr lang="en-US" dirty="0" err="1" smtClean="0"/>
-              <a:t>init</a:t>
-            </a:r>
-            <a:r>
-              <a:rPr lang="en-US" dirty="0" smtClean="0"/>
-              <a:t>`</a:t>
-            </a:r>
-          </a:p>
-          <a:p>
-            <a:pPr lvl="1"/>
-            <a:r>
-              <a:rPr lang="en-US" dirty="0" smtClean="0"/>
-              <a:t>`</a:t>
-            </a:r>
-            <a:r>
-              <a:rPr lang="en-US" dirty="0" err="1" smtClean="0"/>
-              <a:t>index.html.bltx</a:t>
-            </a:r>
-            <a:r>
-              <a:rPr lang="en-US" dirty="0" smtClean="0"/>
-              <a:t>`</a:t>
-            </a:r>
-          </a:p>
-          <a:p>
-            <a:pPr lvl="1"/>
-            <a:r>
-              <a:rPr lang="en-US" dirty="0" smtClean="0"/>
-              <a:t>`posts/` directory</a:t>
-            </a:r>
-          </a:p>
-          <a:p>
-            <a:pPr lvl="1"/>
-            <a:r>
-              <a:rPr lang="en-US" dirty="0" smtClean="0"/>
-              <a:t>`posts/example-</a:t>
-            </a:r>
-            <a:r>
-              <a:rPr lang="en-US" dirty="0" err="1" smtClean="0"/>
-              <a:t>post.tex</a:t>
-            </a:r>
-            <a:r>
-              <a:rPr lang="en-US" dirty="0" smtClean="0"/>
-              <a:t>` file</a:t>
-            </a:r>
-          </a:p>
-          <a:p>
-            <a:pPr lvl="1"/>
-            <a:r>
-              <a:rPr lang="en-US" dirty="0" smtClean="0"/>
-              <a:t>`posts/example-</a:t>
-            </a:r>
-            <a:r>
-              <a:rPr lang="en-US" dirty="0" err="1" smtClean="0"/>
-              <a:t>post.pdf</a:t>
-            </a:r>
-            <a:r>
-              <a:rPr lang="en-US" dirty="0" smtClean="0"/>
-              <a:t>` file</a:t>
-            </a:r>
-          </a:p>
-        </p:txBody>
-      </p:sp>
-      <p:sp>
-        <p:nvSpPr>
-          <p:cNvPr id="9" name="TextBox 8"/>
-          <p:cNvSpPr txBox="1"/>
-          <p:nvPr/>
-        </p:nvSpPr>
-        <p:spPr>
-          <a:xfrm>
-            <a:off x="4438315" y="1069513"/>
-            <a:ext cx="588209" cy="400110"/>
-          </a:xfrm>
-          <a:prstGeom prst="rect">
-            <a:avLst/>
-          </a:prstGeom>
-          <a:noFill/>
-        </p:spPr>
-        <p:txBody>
-          <a:bodyPr wrap="square" rtlCol="0">
-            <a:spAutoFit/>
-          </a:bodyPr>
-          <a:lstStyle/>
-          <a:p>
-            <a:r>
-              <a:rPr lang="el-GR" sz="2000" dirty="0" smtClean="0"/>
-              <a:t>λ</a:t>
-            </a:r>
-            <a:endParaRPr lang="en-US" sz="2000" dirty="0"/>
+              <a:rPr lang="en-US" dirty="0"/>
+              <a:t>No interruption of typical workflow</a:t>
+            </a:r>
+          </a:p>
+          <a:p>
+            <a:endParaRPr lang="en-US" dirty="0" smtClean="0"/>
           </a:p>
         </p:txBody>
       </p:sp>
     </p:spTree>
     <p:extLst>
       <p:ext uri="{BB962C8B-B14F-4D97-AF65-F5344CB8AC3E}">
-        <p14:creationId xmlns:p14="http://schemas.microsoft.com/office/powerpoint/2010/main" val="1277433532"/>
+        <p14:creationId xmlns:p14="http://schemas.microsoft.com/office/powerpoint/2010/main" val="1953687082"/>
       </p:ext>
     </p:extLst>
   </p:cSld>

</xml_diff>

<commit_message>
Ran through presentation and timed it
</commit_message>
<xml_diff>
--- a/Presentations/Final_Presentation.pptx
+++ b/Presentations/Final_Presentation.pptx
@@ -9,8 +9,8 @@
   </p:notesMasterIdLst>
   <p:sldIdLst>
     <p:sldId id="268" r:id="rId2"/>
-    <p:sldId id="270" r:id="rId3"/>
-    <p:sldId id="273" r:id="rId4"/>
+    <p:sldId id="273" r:id="rId3"/>
+    <p:sldId id="270" r:id="rId4"/>
     <p:sldId id="274" r:id="rId5"/>
     <p:sldId id="275" r:id="rId6"/>
     <p:sldId id="276" r:id="rId7"/>
@@ -7234,126 +7234,6 @@
           <a:lstStyle/>
           <a:p>
             <a:r>
-              <a:rPr lang="en-US" dirty="0" err="1" smtClean="0"/>
-              <a:t>BlaTeX</a:t>
-            </a:r>
-            <a:endParaRPr lang="en-US" dirty="0"/>
-          </a:p>
-        </p:txBody>
-      </p:sp>
-      <p:sp>
-        <p:nvSpPr>
-          <p:cNvPr id="3" name="Content Placeholder 2"/>
-          <p:cNvSpPr>
-            <a:spLocks noGrp="1"/>
-          </p:cNvSpPr>
-          <p:nvPr>
-            <p:ph sz="quarter" idx="1"/>
-          </p:nvPr>
-        </p:nvSpPr>
-        <p:spPr/>
-        <p:txBody>
-          <a:bodyPr/>
-          <a:lstStyle/>
-          <a:p>
-            <a:r>
-              <a:rPr lang="en-US" dirty="0" smtClean="0"/>
-              <a:t>Static site compiler written in Haskell for </a:t>
-            </a:r>
-            <a:r>
-              <a:rPr lang="en-US" dirty="0" err="1" smtClean="0"/>
-              <a:t>LaTeX</a:t>
-            </a:r>
-            <a:r>
-              <a:rPr lang="en-US" dirty="0" smtClean="0"/>
-              <a:t> documents</a:t>
-            </a:r>
-          </a:p>
-        </p:txBody>
-      </p:sp>
-      <p:sp>
-        <p:nvSpPr>
-          <p:cNvPr id="9" name="TextBox 8"/>
-          <p:cNvSpPr txBox="1"/>
-          <p:nvPr/>
-        </p:nvSpPr>
-        <p:spPr>
-          <a:xfrm>
-            <a:off x="4438315" y="1069513"/>
-            <a:ext cx="588209" cy="400110"/>
-          </a:xfrm>
-          <a:prstGeom prst="rect">
-            <a:avLst/>
-          </a:prstGeom>
-          <a:noFill/>
-        </p:spPr>
-        <p:txBody>
-          <a:bodyPr wrap="square" rtlCol="0">
-            <a:spAutoFit/>
-          </a:bodyPr>
-          <a:lstStyle/>
-          <a:p>
-            <a:r>
-              <a:rPr lang="el-GR" sz="2000" dirty="0" smtClean="0"/>
-              <a:t>λ</a:t>
-            </a:r>
-            <a:endParaRPr lang="en-US" sz="2000" dirty="0"/>
-          </a:p>
-        </p:txBody>
-      </p:sp>
-    </p:spTree>
-    <p:extLst>
-      <p:ext uri="{BB962C8B-B14F-4D97-AF65-F5344CB8AC3E}">
-        <p14:creationId xmlns:p14="http://schemas.microsoft.com/office/powerpoint/2010/main" val="1212657636"/>
-      </p:ext>
-    </p:extLst>
-  </p:cSld>
-  <p:clrMapOvr>
-    <a:masterClrMapping/>
-  </p:clrMapOvr>
-  <p:timing>
-    <p:tnLst>
-      <p:par>
-        <p:cTn xmlns:p14="http://schemas.microsoft.com/office/powerpoint/2010/main" id="1" dur="indefinite" restart="never" nodeType="tmRoot"/>
-      </p:par>
-    </p:tnLst>
-  </p:timing>
-</p:sld>
-</file>
-
-<file path=ppt/slides/slide3.xml><?xml version="1.0" encoding="utf-8"?>
-<p:sld xmlns:a="http://schemas.openxmlformats.org/drawingml/2006/main" xmlns:r="http://schemas.openxmlformats.org/officeDocument/2006/relationships" xmlns:p="http://schemas.openxmlformats.org/presentationml/2006/main">
-  <p:cSld>
-    <p:spTree>
-      <p:nvGrpSpPr>
-        <p:cNvPr id="1" name=""/>
-        <p:cNvGrpSpPr/>
-        <p:nvPr/>
-      </p:nvGrpSpPr>
-      <p:grpSpPr>
-        <a:xfrm>
-          <a:off x="0" y="0"/>
-          <a:ext cx="0" cy="0"/>
-          <a:chOff x="0" y="0"/>
-          <a:chExt cx="0" cy="0"/>
-        </a:xfrm>
-      </p:grpSpPr>
-      <p:sp>
-        <p:nvSpPr>
-          <p:cNvPr id="2" name="Title 1"/>
-          <p:cNvSpPr>
-            <a:spLocks noGrp="1"/>
-          </p:cNvSpPr>
-          <p:nvPr>
-            <p:ph type="title"/>
-          </p:nvPr>
-        </p:nvSpPr>
-        <p:spPr/>
-        <p:txBody>
-          <a:bodyPr/>
-          <a:lstStyle/>
-          <a:p>
-            <a:r>
               <a:rPr lang="en-US" dirty="0" smtClean="0"/>
               <a:t>Background</a:t>
             </a:r>
@@ -7692,6 +7572,126 @@
     <p:extLst>
       <p:ext uri="{BB962C8B-B14F-4D97-AF65-F5344CB8AC3E}">
         <p14:creationId xmlns:p14="http://schemas.microsoft.com/office/powerpoint/2010/main" val="522541982"/>
+      </p:ext>
+    </p:extLst>
+  </p:cSld>
+  <p:clrMapOvr>
+    <a:masterClrMapping/>
+  </p:clrMapOvr>
+  <p:timing>
+    <p:tnLst>
+      <p:par>
+        <p:cTn xmlns:p14="http://schemas.microsoft.com/office/powerpoint/2010/main" id="1" dur="indefinite" restart="never" nodeType="tmRoot"/>
+      </p:par>
+    </p:tnLst>
+  </p:timing>
+</p:sld>
+</file>
+
+<file path=ppt/slides/slide3.xml><?xml version="1.0" encoding="utf-8"?>
+<p:sld xmlns:a="http://schemas.openxmlformats.org/drawingml/2006/main" xmlns:r="http://schemas.openxmlformats.org/officeDocument/2006/relationships" xmlns:p="http://schemas.openxmlformats.org/presentationml/2006/main">
+  <p:cSld>
+    <p:spTree>
+      <p:nvGrpSpPr>
+        <p:cNvPr id="1" name=""/>
+        <p:cNvGrpSpPr/>
+        <p:nvPr/>
+      </p:nvGrpSpPr>
+      <p:grpSpPr>
+        <a:xfrm>
+          <a:off x="0" y="0"/>
+          <a:ext cx="0" cy="0"/>
+          <a:chOff x="0" y="0"/>
+          <a:chExt cx="0" cy="0"/>
+        </a:xfrm>
+      </p:grpSpPr>
+      <p:sp>
+        <p:nvSpPr>
+          <p:cNvPr id="2" name="Title 1"/>
+          <p:cNvSpPr>
+            <a:spLocks noGrp="1"/>
+          </p:cNvSpPr>
+          <p:nvPr>
+            <p:ph type="title"/>
+          </p:nvPr>
+        </p:nvSpPr>
+        <p:spPr/>
+        <p:txBody>
+          <a:bodyPr/>
+          <a:lstStyle/>
+          <a:p>
+            <a:r>
+              <a:rPr lang="en-US" dirty="0" err="1" smtClean="0"/>
+              <a:t>BlaTeX</a:t>
+            </a:r>
+            <a:endParaRPr lang="en-US" dirty="0"/>
+          </a:p>
+        </p:txBody>
+      </p:sp>
+      <p:sp>
+        <p:nvSpPr>
+          <p:cNvPr id="3" name="Content Placeholder 2"/>
+          <p:cNvSpPr>
+            <a:spLocks noGrp="1"/>
+          </p:cNvSpPr>
+          <p:nvPr>
+            <p:ph sz="quarter" idx="1"/>
+          </p:nvPr>
+        </p:nvSpPr>
+        <p:spPr/>
+        <p:txBody>
+          <a:bodyPr/>
+          <a:lstStyle/>
+          <a:p>
+            <a:r>
+              <a:rPr lang="en-US" dirty="0" smtClean="0"/>
+              <a:t>Static site compiler written in Haskell for </a:t>
+            </a:r>
+            <a:r>
+              <a:rPr lang="en-US" dirty="0" err="1" smtClean="0"/>
+              <a:t>LaTeX</a:t>
+            </a:r>
+            <a:r>
+              <a:rPr lang="en-US" dirty="0" smtClean="0"/>
+              <a:t> documents</a:t>
+            </a:r>
+          </a:p>
+        </p:txBody>
+      </p:sp>
+      <p:sp>
+        <p:nvSpPr>
+          <p:cNvPr id="9" name="TextBox 8"/>
+          <p:cNvSpPr txBox="1"/>
+          <p:nvPr/>
+        </p:nvSpPr>
+        <p:spPr>
+          <a:xfrm>
+            <a:off x="4438315" y="1069513"/>
+            <a:ext cx="588209" cy="400110"/>
+          </a:xfrm>
+          <a:prstGeom prst="rect">
+            <a:avLst/>
+          </a:prstGeom>
+          <a:noFill/>
+        </p:spPr>
+        <p:txBody>
+          <a:bodyPr wrap="square" rtlCol="0">
+            <a:spAutoFit/>
+          </a:bodyPr>
+          <a:lstStyle/>
+          <a:p>
+            <a:r>
+              <a:rPr lang="el-GR" sz="2000" dirty="0" smtClean="0"/>
+              <a:t>λ</a:t>
+            </a:r>
+            <a:endParaRPr lang="en-US" sz="2000" dirty="0"/>
+          </a:p>
+        </p:txBody>
+      </p:sp>
+    </p:spTree>
+    <p:extLst>
+      <p:ext uri="{BB962C8B-B14F-4D97-AF65-F5344CB8AC3E}">
+        <p14:creationId xmlns:p14="http://schemas.microsoft.com/office/powerpoint/2010/main" val="1212657636"/>
       </p:ext>
     </p:extLst>
   </p:cSld>

</xml_diff>

<commit_message>
Added some graphics and created PDF of presentation
</commit_message>
<xml_diff>
--- a/Presentations/Final_Presentation.pptx
+++ b/Presentations/Final_Presentation.pptx
@@ -11,7 +11,7 @@
     <p:sldId id="268" r:id="rId2"/>
     <p:sldId id="273" r:id="rId3"/>
     <p:sldId id="270" r:id="rId4"/>
-    <p:sldId id="274" r:id="rId5"/>
+    <p:sldId id="285" r:id="rId5"/>
     <p:sldId id="275" r:id="rId6"/>
     <p:sldId id="276" r:id="rId7"/>
     <p:sldId id="277" r:id="rId8"/>
@@ -6594,83 +6594,6 @@
       </p:sp>
       <p:sp>
         <p:nvSpPr>
-          <p:cNvPr id="3" name="Content Placeholder 2"/>
-          <p:cNvSpPr>
-            <a:spLocks noGrp="1"/>
-          </p:cNvSpPr>
-          <p:nvPr>
-            <p:ph sz="quarter" idx="1"/>
-          </p:nvPr>
-        </p:nvSpPr>
-        <p:spPr/>
-        <p:txBody>
-          <a:bodyPr>
-            <a:normAutofit/>
-          </a:bodyPr>
-          <a:lstStyle/>
-          <a:p>
-            <a:r>
-              <a:rPr lang="en-US" dirty="0" smtClean="0"/>
-              <a:t>`</a:t>
-            </a:r>
-            <a:r>
-              <a:rPr lang="en-US" dirty="0" err="1" smtClean="0"/>
-              <a:t>blatex</a:t>
-            </a:r>
-            <a:r>
-              <a:rPr lang="en-US" dirty="0" smtClean="0"/>
-              <a:t> build`</a:t>
-            </a:r>
-          </a:p>
-          <a:p>
-            <a:pPr lvl="1"/>
-            <a:r>
-              <a:rPr lang="en-US" dirty="0" smtClean="0"/>
-              <a:t>Looks in `posts/` directory</a:t>
-            </a:r>
-            <a:r>
-              <a:rPr lang="en-US" dirty="0"/>
-              <a:t> </a:t>
-            </a:r>
-            <a:r>
-              <a:rPr lang="en-US" dirty="0" smtClean="0"/>
-              <a:t>for posts</a:t>
-            </a:r>
-          </a:p>
-          <a:p>
-            <a:pPr lvl="1"/>
-            <a:r>
-              <a:rPr lang="en-US" dirty="0" smtClean="0"/>
-              <a:t>Looks in `</a:t>
-            </a:r>
-            <a:r>
-              <a:rPr lang="en-US" dirty="0" err="1" smtClean="0"/>
-              <a:t>index.html.bltx</a:t>
-            </a:r>
-            <a:r>
-              <a:rPr lang="en-US" dirty="0" smtClean="0"/>
-              <a:t>` for site template</a:t>
-            </a:r>
-          </a:p>
-          <a:p>
-            <a:pPr lvl="1"/>
-            <a:r>
-              <a:rPr lang="en-US" dirty="0" smtClean="0"/>
-              <a:t>Produces a final static site in `</a:t>
-            </a:r>
-            <a:r>
-              <a:rPr lang="en-US" dirty="0" err="1" smtClean="0"/>
-              <a:t>index.html</a:t>
-            </a:r>
-            <a:r>
-              <a:rPr lang="en-US" dirty="0" smtClean="0"/>
-              <a:t>`</a:t>
-            </a:r>
-          </a:p>
-        </p:txBody>
-      </p:sp>
-      <p:sp>
-        <p:nvSpPr>
           <p:cNvPr id="9" name="TextBox 8"/>
           <p:cNvSpPr txBox="1"/>
           <p:nvPr/>
@@ -6699,6 +6622,36 @@
           </a:p>
         </p:txBody>
       </p:sp>
+      <p:pic>
+        <p:nvPicPr>
+          <p:cNvPr id="5" name="Picture 4" descr="Screen Shot 2016-05-31 at 3.13.15 PM.png"/>
+          <p:cNvPicPr>
+            <a:picLocks noChangeAspect="1"/>
+          </p:cNvPicPr>
+          <p:nvPr/>
+        </p:nvPicPr>
+        <p:blipFill>
+          <a:blip r:embed="rId2">
+            <a:extLst>
+              <a:ext uri="{28A0092B-C50C-407E-A947-70E740481C1C}">
+                <a14:useLocalDpi xmlns:a14="http://schemas.microsoft.com/office/drawing/2010/main" val="0"/>
+              </a:ext>
+            </a:extLst>
+          </a:blip>
+          <a:stretch>
+            <a:fillRect/>
+          </a:stretch>
+        </p:blipFill>
+        <p:spPr>
+          <a:xfrm>
+            <a:off x="1209843" y="2566739"/>
+            <a:ext cx="6622765" cy="2869865"/>
+          </a:xfrm>
+          <a:prstGeom prst="rect">
+            <a:avLst/>
+          </a:prstGeom>
+        </p:spPr>
+      </p:pic>
     </p:spTree>
     <p:extLst>
       <p:ext uri="{BB962C8B-B14F-4D97-AF65-F5344CB8AC3E}">
@@ -6778,15 +6731,26 @@
           <a:p>
             <a:r>
               <a:rPr lang="en-US" dirty="0" smtClean="0"/>
-              <a:t>`Either` as an instance of an Applicative </a:t>
+              <a:t>`Either`</a:t>
+            </a:r>
+          </a:p>
+          <a:p>
+            <a:pPr lvl="1"/>
+            <a:r>
+              <a:rPr lang="en-US" dirty="0" smtClean="0"/>
+              <a:t>Applicative </a:t>
             </a:r>
             <a:r>
               <a:rPr lang="en-US" dirty="0" err="1" smtClean="0"/>
               <a:t>Functor</a:t>
             </a:r>
+            <a:endParaRPr lang="en-US" dirty="0" smtClean="0"/>
+          </a:p>
+          <a:p>
+            <a:pPr lvl="1"/>
             <a:r>
               <a:rPr lang="en-US" dirty="0" smtClean="0"/>
-              <a:t> </a:t>
+              <a:t>Monad</a:t>
             </a:r>
           </a:p>
         </p:txBody>
@@ -6823,7 +6787,7 @@
       </p:sp>
       <p:pic>
         <p:nvPicPr>
-          <p:cNvPr id="7" name="Picture 6" descr="Screen Shot 2016-05-31 at 3.13.15 PM.png"/>
+          <p:cNvPr id="10" name="Picture 9" descr="Screen Shot 2016-05-31 at 9.20.03 PM.png"/>
           <p:cNvPicPr>
             <a:picLocks noChangeAspect="1"/>
           </p:cNvPicPr>
@@ -6843,8 +6807,8 @@
         </p:blipFill>
         <p:spPr>
           <a:xfrm>
-            <a:off x="1249947" y="2620210"/>
-            <a:ext cx="6622765" cy="2869865"/>
+            <a:off x="0" y="3648329"/>
+            <a:ext cx="9144000" cy="1446293"/>
           </a:xfrm>
           <a:prstGeom prst="rect">
             <a:avLst/>
@@ -7688,6 +7652,36 @@
           </a:p>
         </p:txBody>
       </p:sp>
+      <p:pic>
+        <p:nvPicPr>
+          <p:cNvPr id="4" name="Picture 3" descr="Screen Shot 2016-05-31 at 5.50.32 PM.png"/>
+          <p:cNvPicPr>
+            <a:picLocks noChangeAspect="1"/>
+          </p:cNvPicPr>
+          <p:nvPr/>
+        </p:nvPicPr>
+        <p:blipFill>
+          <a:blip r:embed="rId2">
+            <a:extLst>
+              <a:ext uri="{28A0092B-C50C-407E-A947-70E740481C1C}">
+                <a14:useLocalDpi xmlns:a14="http://schemas.microsoft.com/office/drawing/2010/main" val="0"/>
+              </a:ext>
+            </a:extLst>
+          </a:blip>
+          <a:stretch>
+            <a:fillRect/>
+          </a:stretch>
+        </p:blipFill>
+        <p:spPr>
+          <a:xfrm>
+            <a:off x="2481579" y="2030178"/>
+            <a:ext cx="5089890" cy="4226244"/>
+          </a:xfrm>
+          <a:prstGeom prst="rect">
+            <a:avLst/>
+          </a:prstGeom>
+        </p:spPr>
+      </p:pic>
     </p:spTree>
     <p:extLst>
       <p:ext uri="{BB962C8B-B14F-4D97-AF65-F5344CB8AC3E}">
@@ -7750,66 +7744,6 @@
       </p:sp>
       <p:sp>
         <p:nvSpPr>
-          <p:cNvPr id="3" name="Content Placeholder 2"/>
-          <p:cNvSpPr>
-            <a:spLocks noGrp="1"/>
-          </p:cNvSpPr>
-          <p:nvPr>
-            <p:ph sz="quarter" idx="1"/>
-          </p:nvPr>
-        </p:nvSpPr>
-        <p:spPr/>
-        <p:txBody>
-          <a:bodyPr>
-            <a:normAutofit/>
-          </a:bodyPr>
-          <a:lstStyle/>
-          <a:p>
-            <a:r>
-              <a:rPr lang="en-US" dirty="0" smtClean="0"/>
-              <a:t>Install</a:t>
-            </a:r>
-          </a:p>
-          <a:p>
-            <a:r>
-              <a:rPr lang="en-US" dirty="0" smtClean="0"/>
-              <a:t>Initialize</a:t>
-            </a:r>
-            <a:endParaRPr lang="en-US" dirty="0" smtClean="0"/>
-          </a:p>
-          <a:p>
-            <a:r>
-              <a:rPr lang="en-US" dirty="0" smtClean="0"/>
-              <a:t>Write/edit posts</a:t>
-            </a:r>
-          </a:p>
-          <a:p>
-            <a:r>
-              <a:rPr lang="en-US" dirty="0" smtClean="0"/>
-              <a:t>Design website</a:t>
-            </a:r>
-          </a:p>
-          <a:p>
-            <a:r>
-              <a:rPr lang="en-US" dirty="0" smtClean="0"/>
-              <a:t>Compile site</a:t>
-            </a:r>
-            <a:endParaRPr lang="en-US" dirty="0" smtClean="0"/>
-          </a:p>
-          <a:p>
-            <a:r>
-              <a:rPr lang="en-US" dirty="0" smtClean="0"/>
-              <a:t>Host resulting static site</a:t>
-            </a:r>
-            <a:endParaRPr lang="en-US" dirty="0" smtClean="0"/>
-          </a:p>
-          <a:p>
-            <a:endParaRPr lang="en-US" dirty="0" smtClean="0"/>
-          </a:p>
-        </p:txBody>
-      </p:sp>
-      <p:sp>
-        <p:nvSpPr>
           <p:cNvPr id="9" name="TextBox 8"/>
           <p:cNvSpPr txBox="1"/>
           <p:nvPr/>
@@ -7838,10 +7772,517 @@
           </a:p>
         </p:txBody>
       </p:sp>
+      <p:sp>
+        <p:nvSpPr>
+          <p:cNvPr id="4" name="Process 3"/>
+          <p:cNvSpPr/>
+          <p:nvPr/>
+        </p:nvSpPr>
+        <p:spPr>
+          <a:xfrm>
+            <a:off x="836472" y="1711158"/>
+            <a:ext cx="2219159" cy="949158"/>
+          </a:xfrm>
+          <a:prstGeom prst="flowChartProcess">
+            <a:avLst/>
+          </a:prstGeom>
+        </p:spPr>
+        <p:style>
+          <a:lnRef idx="1">
+            <a:schemeClr val="accent1"/>
+          </a:lnRef>
+          <a:fillRef idx="3">
+            <a:schemeClr val="accent1"/>
+          </a:fillRef>
+          <a:effectRef idx="2">
+            <a:schemeClr val="accent1"/>
+          </a:effectRef>
+          <a:fontRef idx="minor">
+            <a:schemeClr val="lt1"/>
+          </a:fontRef>
+        </p:style>
+        <p:txBody>
+          <a:bodyPr rtlCol="0" anchor="ctr"/>
+          <a:lstStyle/>
+          <a:p>
+            <a:pPr algn="ctr"/>
+            <a:r>
+              <a:rPr lang="en-US" dirty="0" smtClean="0"/>
+              <a:t>Install</a:t>
+            </a:r>
+            <a:endParaRPr lang="en-US" dirty="0"/>
+          </a:p>
+        </p:txBody>
+      </p:sp>
+      <p:cxnSp>
+        <p:nvCxnSpPr>
+          <p:cNvPr id="6" name="Straight Arrow Connector 5"/>
+          <p:cNvCxnSpPr>
+            <a:stCxn id="7" idx="2"/>
+            <a:endCxn id="58" idx="0"/>
+          </p:cNvCxnSpPr>
+          <p:nvPr/>
+        </p:nvCxnSpPr>
+        <p:spPr>
+          <a:xfrm flipH="1">
+            <a:off x="3761299" y="2660316"/>
+            <a:ext cx="831701" cy="762000"/>
+          </a:xfrm>
+          <a:prstGeom prst="straightConnector1">
+            <a:avLst/>
+          </a:prstGeom>
+          <a:ln>
+            <a:tailEnd type="arrow"/>
+          </a:ln>
+        </p:spPr>
+        <p:style>
+          <a:lnRef idx="2">
+            <a:schemeClr val="accent1"/>
+          </a:lnRef>
+          <a:fillRef idx="0">
+            <a:schemeClr val="accent1"/>
+          </a:fillRef>
+          <a:effectRef idx="1">
+            <a:schemeClr val="accent1"/>
+          </a:effectRef>
+          <a:fontRef idx="minor">
+            <a:schemeClr val="tx1"/>
+          </a:fontRef>
+        </p:style>
+      </p:cxnSp>
+      <p:sp>
+        <p:nvSpPr>
+          <p:cNvPr id="7" name="Process 6"/>
+          <p:cNvSpPr/>
+          <p:nvPr/>
+        </p:nvSpPr>
+        <p:spPr>
+          <a:xfrm>
+            <a:off x="3483420" y="1711158"/>
+            <a:ext cx="2219159" cy="949158"/>
+          </a:xfrm>
+          <a:prstGeom prst="flowChartProcess">
+            <a:avLst/>
+          </a:prstGeom>
+        </p:spPr>
+        <p:style>
+          <a:lnRef idx="1">
+            <a:schemeClr val="accent1"/>
+          </a:lnRef>
+          <a:fillRef idx="3">
+            <a:schemeClr val="accent1"/>
+          </a:fillRef>
+          <a:effectRef idx="2">
+            <a:schemeClr val="accent1"/>
+          </a:effectRef>
+          <a:fontRef idx="minor">
+            <a:schemeClr val="lt1"/>
+          </a:fontRef>
+        </p:style>
+        <p:txBody>
+          <a:bodyPr rtlCol="0" anchor="ctr"/>
+          <a:lstStyle/>
+          <a:p>
+            <a:pPr algn="ctr"/>
+            <a:r>
+              <a:rPr lang="en-US" dirty="0" smtClean="0"/>
+              <a:t>Initialize</a:t>
+            </a:r>
+            <a:endParaRPr lang="en-US" dirty="0"/>
+          </a:p>
+        </p:txBody>
+      </p:sp>
+      <p:cxnSp>
+        <p:nvCxnSpPr>
+          <p:cNvPr id="12" name="Straight Arrow Connector 11"/>
+          <p:cNvCxnSpPr>
+            <a:stCxn id="4" idx="3"/>
+            <a:endCxn id="7" idx="1"/>
+          </p:cNvCxnSpPr>
+          <p:nvPr/>
+        </p:nvCxnSpPr>
+        <p:spPr>
+          <a:xfrm>
+            <a:off x="3055631" y="2185737"/>
+            <a:ext cx="427789" cy="0"/>
+          </a:xfrm>
+          <a:prstGeom prst="straightConnector1">
+            <a:avLst/>
+          </a:prstGeom>
+          <a:ln>
+            <a:tailEnd type="arrow"/>
+          </a:ln>
+        </p:spPr>
+        <p:style>
+          <a:lnRef idx="2">
+            <a:schemeClr val="accent1"/>
+          </a:lnRef>
+          <a:fillRef idx="0">
+            <a:schemeClr val="accent1"/>
+          </a:fillRef>
+          <a:effectRef idx="1">
+            <a:schemeClr val="accent1"/>
+          </a:effectRef>
+          <a:fontRef idx="minor">
+            <a:schemeClr val="tx1"/>
+          </a:fontRef>
+        </p:style>
+      </p:cxnSp>
+      <p:sp>
+        <p:nvSpPr>
+          <p:cNvPr id="19" name="Connector 18"/>
+          <p:cNvSpPr/>
+          <p:nvPr/>
+        </p:nvSpPr>
+        <p:spPr>
+          <a:xfrm>
+            <a:off x="4593001" y="3422316"/>
+            <a:ext cx="1663402" cy="1336842"/>
+          </a:xfrm>
+          <a:prstGeom prst="flowChartConnector">
+            <a:avLst/>
+          </a:prstGeom>
+          <a:ln/>
+        </p:spPr>
+        <p:style>
+          <a:lnRef idx="2">
+            <a:schemeClr val="accent3">
+              <a:shade val="50000"/>
+            </a:schemeClr>
+          </a:lnRef>
+          <a:fillRef idx="1">
+            <a:schemeClr val="accent3"/>
+          </a:fillRef>
+          <a:effectRef idx="0">
+            <a:schemeClr val="accent3"/>
+          </a:effectRef>
+          <a:fontRef idx="minor">
+            <a:schemeClr val="lt1"/>
+          </a:fontRef>
+        </p:style>
+        <p:txBody>
+          <a:bodyPr rtlCol="0" anchor="ctr"/>
+          <a:lstStyle/>
+          <a:p>
+            <a:pPr algn="ctr"/>
+            <a:r>
+              <a:rPr lang="en-US" dirty="0" smtClean="0"/>
+              <a:t>Template</a:t>
+            </a:r>
+            <a:endParaRPr lang="en-US" dirty="0"/>
+          </a:p>
+        </p:txBody>
+      </p:sp>
+      <p:cxnSp>
+        <p:nvCxnSpPr>
+          <p:cNvPr id="20" name="Straight Arrow Connector 19"/>
+          <p:cNvCxnSpPr>
+            <a:endCxn id="19" idx="0"/>
+          </p:cNvCxnSpPr>
+          <p:nvPr/>
+        </p:nvCxnSpPr>
+        <p:spPr>
+          <a:xfrm>
+            <a:off x="4593000" y="2660316"/>
+            <a:ext cx="831702" cy="762000"/>
+          </a:xfrm>
+          <a:prstGeom prst="straightConnector1">
+            <a:avLst/>
+          </a:prstGeom>
+          <a:ln>
+            <a:tailEnd type="arrow"/>
+          </a:ln>
+        </p:spPr>
+        <p:style>
+          <a:lnRef idx="2">
+            <a:schemeClr val="accent1"/>
+          </a:lnRef>
+          <a:fillRef idx="0">
+            <a:schemeClr val="accent1"/>
+          </a:fillRef>
+          <a:effectRef idx="1">
+            <a:schemeClr val="accent1"/>
+          </a:effectRef>
+          <a:fontRef idx="minor">
+            <a:schemeClr val="tx1"/>
+          </a:fontRef>
+        </p:style>
+      </p:cxnSp>
+      <p:sp>
+        <p:nvSpPr>
+          <p:cNvPr id="25" name="Process 24"/>
+          <p:cNvSpPr/>
+          <p:nvPr/>
+        </p:nvSpPr>
+        <p:spPr>
+          <a:xfrm>
+            <a:off x="6256402" y="1711158"/>
+            <a:ext cx="2219159" cy="949158"/>
+          </a:xfrm>
+          <a:prstGeom prst="flowChartProcess">
+            <a:avLst/>
+          </a:prstGeom>
+        </p:spPr>
+        <p:style>
+          <a:lnRef idx="1">
+            <a:schemeClr val="accent1"/>
+          </a:lnRef>
+          <a:fillRef idx="3">
+            <a:schemeClr val="accent1"/>
+          </a:fillRef>
+          <a:effectRef idx="2">
+            <a:schemeClr val="accent1"/>
+          </a:effectRef>
+          <a:fontRef idx="minor">
+            <a:schemeClr val="lt1"/>
+          </a:fontRef>
+        </p:style>
+        <p:txBody>
+          <a:bodyPr rtlCol="0" anchor="ctr"/>
+          <a:lstStyle/>
+          <a:p>
+            <a:pPr algn="ctr"/>
+            <a:r>
+              <a:rPr lang="en-US" dirty="0" smtClean="0"/>
+              <a:t>Build</a:t>
+            </a:r>
+            <a:endParaRPr lang="en-US" dirty="0"/>
+          </a:p>
+        </p:txBody>
+      </p:sp>
+      <p:cxnSp>
+        <p:nvCxnSpPr>
+          <p:cNvPr id="26" name="Straight Arrow Connector 25"/>
+          <p:cNvCxnSpPr>
+            <a:endCxn id="25" idx="1"/>
+          </p:cNvCxnSpPr>
+          <p:nvPr/>
+        </p:nvCxnSpPr>
+        <p:spPr>
+          <a:xfrm>
+            <a:off x="5702579" y="2185737"/>
+            <a:ext cx="553823" cy="0"/>
+          </a:xfrm>
+          <a:prstGeom prst="straightConnector1">
+            <a:avLst/>
+          </a:prstGeom>
+          <a:ln>
+            <a:tailEnd type="arrow"/>
+          </a:ln>
+        </p:spPr>
+        <p:style>
+          <a:lnRef idx="2">
+            <a:schemeClr val="accent1"/>
+          </a:lnRef>
+          <a:fillRef idx="0">
+            <a:schemeClr val="accent1"/>
+          </a:fillRef>
+          <a:effectRef idx="1">
+            <a:schemeClr val="accent1"/>
+          </a:effectRef>
+          <a:fontRef idx="minor">
+            <a:schemeClr val="tx1"/>
+          </a:fontRef>
+        </p:style>
+      </p:cxnSp>
+      <p:sp>
+        <p:nvSpPr>
+          <p:cNvPr id="28" name="Process 27"/>
+          <p:cNvSpPr/>
+          <p:nvPr/>
+        </p:nvSpPr>
+        <p:spPr>
+          <a:xfrm>
+            <a:off x="836472" y="5066632"/>
+            <a:ext cx="7639089" cy="1163052"/>
+          </a:xfrm>
+          <a:prstGeom prst="flowChartProcess">
+            <a:avLst/>
+          </a:prstGeom>
+        </p:spPr>
+        <p:style>
+          <a:lnRef idx="2">
+            <a:schemeClr val="accent5">
+              <a:shade val="50000"/>
+            </a:schemeClr>
+          </a:lnRef>
+          <a:fillRef idx="1">
+            <a:schemeClr val="accent5"/>
+          </a:fillRef>
+          <a:effectRef idx="0">
+            <a:schemeClr val="accent5"/>
+          </a:effectRef>
+          <a:fontRef idx="minor">
+            <a:schemeClr val="lt1"/>
+          </a:fontRef>
+        </p:style>
+        <p:txBody>
+          <a:bodyPr rtlCol="0" anchor="ctr"/>
+          <a:lstStyle/>
+          <a:p>
+            <a:pPr algn="ctr"/>
+            <a:r>
+              <a:rPr lang="en-US" dirty="0" smtClean="0"/>
+              <a:t>Finished Static Website</a:t>
+            </a:r>
+            <a:endParaRPr lang="en-US" dirty="0"/>
+          </a:p>
+        </p:txBody>
+      </p:sp>
+      <p:cxnSp>
+        <p:nvCxnSpPr>
+          <p:cNvPr id="32" name="Straight Arrow Connector 31"/>
+          <p:cNvCxnSpPr>
+            <a:stCxn id="25" idx="2"/>
+          </p:cNvCxnSpPr>
+          <p:nvPr/>
+        </p:nvCxnSpPr>
+        <p:spPr>
+          <a:xfrm>
+            <a:off x="7365982" y="2660316"/>
+            <a:ext cx="0" cy="2406316"/>
+          </a:xfrm>
+          <a:prstGeom prst="straightConnector1">
+            <a:avLst/>
+          </a:prstGeom>
+          <a:ln>
+            <a:tailEnd type="arrow"/>
+          </a:ln>
+        </p:spPr>
+        <p:style>
+          <a:lnRef idx="2">
+            <a:schemeClr val="accent1"/>
+          </a:lnRef>
+          <a:fillRef idx="0">
+            <a:schemeClr val="accent1"/>
+          </a:fillRef>
+          <a:effectRef idx="1">
+            <a:schemeClr val="accent1"/>
+          </a:effectRef>
+          <a:fontRef idx="minor">
+            <a:schemeClr val="tx1"/>
+          </a:fontRef>
+        </p:style>
+      </p:cxnSp>
+      <p:cxnSp>
+        <p:nvCxnSpPr>
+          <p:cNvPr id="40" name="Straight Arrow Connector 39"/>
+          <p:cNvCxnSpPr>
+            <a:stCxn id="58" idx="4"/>
+          </p:cNvCxnSpPr>
+          <p:nvPr/>
+        </p:nvCxnSpPr>
+        <p:spPr>
+          <a:xfrm>
+            <a:off x="3761299" y="4759158"/>
+            <a:ext cx="0" cy="307474"/>
+          </a:xfrm>
+          <a:prstGeom prst="straightConnector1">
+            <a:avLst/>
+          </a:prstGeom>
+          <a:ln>
+            <a:tailEnd type="arrow"/>
+          </a:ln>
+        </p:spPr>
+        <p:style>
+          <a:lnRef idx="2">
+            <a:schemeClr val="accent1"/>
+          </a:lnRef>
+          <a:fillRef idx="0">
+            <a:schemeClr val="accent1"/>
+          </a:fillRef>
+          <a:effectRef idx="1">
+            <a:schemeClr val="accent1"/>
+          </a:effectRef>
+          <a:fontRef idx="minor">
+            <a:schemeClr val="tx1"/>
+          </a:fontRef>
+        </p:style>
+      </p:cxnSp>
+      <p:cxnSp>
+        <p:nvCxnSpPr>
+          <p:cNvPr id="42" name="Straight Arrow Connector 41"/>
+          <p:cNvCxnSpPr>
+            <a:stCxn id="19" idx="4"/>
+          </p:cNvCxnSpPr>
+          <p:nvPr/>
+        </p:nvCxnSpPr>
+        <p:spPr>
+          <a:xfrm>
+            <a:off x="5424702" y="4759158"/>
+            <a:ext cx="0" cy="307474"/>
+          </a:xfrm>
+          <a:prstGeom prst="straightConnector1">
+            <a:avLst/>
+          </a:prstGeom>
+          <a:ln>
+            <a:tailEnd type="arrow"/>
+          </a:ln>
+        </p:spPr>
+        <p:style>
+          <a:lnRef idx="2">
+            <a:schemeClr val="accent1"/>
+          </a:lnRef>
+          <a:fillRef idx="0">
+            <a:schemeClr val="accent1"/>
+          </a:fillRef>
+          <a:effectRef idx="1">
+            <a:schemeClr val="accent1"/>
+          </a:effectRef>
+          <a:fontRef idx="minor">
+            <a:schemeClr val="tx1"/>
+          </a:fontRef>
+        </p:style>
+      </p:cxnSp>
+      <p:sp>
+        <p:nvSpPr>
+          <p:cNvPr id="58" name="Connector 57"/>
+          <p:cNvSpPr/>
+          <p:nvPr/>
+        </p:nvSpPr>
+        <p:spPr>
+          <a:xfrm>
+            <a:off x="2929598" y="3422316"/>
+            <a:ext cx="1663402" cy="1336842"/>
+          </a:xfrm>
+          <a:prstGeom prst="flowChartConnector">
+            <a:avLst/>
+          </a:prstGeom>
+          <a:ln/>
+        </p:spPr>
+        <p:style>
+          <a:lnRef idx="2">
+            <a:schemeClr val="accent3">
+              <a:shade val="50000"/>
+            </a:schemeClr>
+          </a:lnRef>
+          <a:fillRef idx="1">
+            <a:schemeClr val="accent3"/>
+          </a:fillRef>
+          <a:effectRef idx="0">
+            <a:schemeClr val="accent3"/>
+          </a:effectRef>
+          <a:fontRef idx="minor">
+            <a:schemeClr val="lt1"/>
+          </a:fontRef>
+        </p:style>
+        <p:txBody>
+          <a:bodyPr rtlCol="0" anchor="ctr"/>
+          <a:lstStyle/>
+          <a:p>
+            <a:pPr algn="ctr"/>
+            <a:r>
+              <a:rPr lang="en-US" dirty="0" smtClean="0"/>
+              <a:t>Posts</a:t>
+            </a:r>
+            <a:endParaRPr lang="en-US" dirty="0"/>
+          </a:p>
+        </p:txBody>
+      </p:sp>
     </p:spTree>
     <p:extLst>
       <p:ext uri="{BB962C8B-B14F-4D97-AF65-F5344CB8AC3E}">
-        <p14:creationId xmlns:p14="http://schemas.microsoft.com/office/powerpoint/2010/main" val="1150960263"/>
+        <p14:creationId xmlns:p14="http://schemas.microsoft.com/office/powerpoint/2010/main" val="1826291820"/>
       </p:ext>
     </p:extLst>
   </p:cSld>
@@ -8324,6 +8765,30 @@
           </a:p>
         </p:txBody>
       </p:sp>
+      <p:pic>
+        <p:nvPicPr>
+          <p:cNvPr id="4" name="Picture 3"/>
+          <p:cNvPicPr>
+            <a:picLocks noChangeAspect="1"/>
+          </p:cNvPicPr>
+          <p:nvPr/>
+        </p:nvPicPr>
+        <p:blipFill>
+          <a:blip r:embed="rId2"/>
+          <a:stretch>
+            <a:fillRect/>
+          </a:stretch>
+        </p:blipFill>
+        <p:spPr>
+          <a:xfrm>
+            <a:off x="1760041" y="3489163"/>
+            <a:ext cx="5356547" cy="2231002"/>
+          </a:xfrm>
+          <a:prstGeom prst="rect">
+            <a:avLst/>
+          </a:prstGeom>
+        </p:spPr>
+      </p:pic>
     </p:spTree>
     <p:extLst>
       <p:ext uri="{BB962C8B-B14F-4D97-AF65-F5344CB8AC3E}">
@@ -8484,6 +8949,30 @@
           </a:p>
         </p:txBody>
       </p:sp>
+      <p:pic>
+        <p:nvPicPr>
+          <p:cNvPr id="4" name="Picture 3"/>
+          <p:cNvPicPr>
+            <a:picLocks noChangeAspect="1"/>
+          </p:cNvPicPr>
+          <p:nvPr/>
+        </p:nvPicPr>
+        <p:blipFill>
+          <a:blip r:embed="rId2"/>
+          <a:stretch>
+            <a:fillRect/>
+          </a:stretch>
+        </p:blipFill>
+        <p:spPr>
+          <a:xfrm>
+            <a:off x="2215815" y="3255216"/>
+            <a:ext cx="4445000" cy="2616200"/>
+          </a:xfrm>
+          <a:prstGeom prst="rect">
+            <a:avLst/>
+          </a:prstGeom>
+        </p:spPr>
+      </p:pic>
     </p:spTree>
     <p:extLst>
       <p:ext uri="{BB962C8B-B14F-4D97-AF65-F5344CB8AC3E}">

</xml_diff>